<commit_message>
#33 update categories CD
</commit_message>
<xml_diff>
--- a/docs/COMPONENT-DIAGRAM.pptx
+++ b/docs/COMPONENT-DIAGRAM.pptx
@@ -7,6 +7,7 @@
   <p:sldIdLst>
     <p:sldId id="256" r:id="rId2"/>
     <p:sldId id="258" r:id="rId3"/>
+    <p:sldId id="259" r:id="rId4"/>
   </p:sldIdLst>
   <p:sldSz cx="12192000" cy="6858000"/>
   <p:notesSz cx="6858000" cy="9144000"/>
@@ -105,6 +106,11 @@
       </a:defRPr>
     </a:lvl9pPr>
   </p:defaultTextStyle>
+  <p:extLst>
+    <p:ext uri="{EFAFB233-063F-42B5-8137-9DF3F51BA10A}">
+      <p15:sldGuideLst xmlns:p15="http://schemas.microsoft.com/office/powerpoint/2012/main"/>
+    </p:ext>
+  </p:extLst>
 </p:presentation>
 </file>
 
@@ -150,10 +156,9 @@
           </a:lstStyle>
           <a:p>
             <a:r>
-              <a:rPr lang="en-US" smtClean="0"/>
+              <a:rPr lang="en-US"/>
               <a:t>Click to edit Master title style</a:t>
             </a:r>
-            <a:endParaRPr lang="en-US"/>
           </a:p>
         </p:txBody>
       </p:sp>
@@ -215,10 +220,9 @@
           </a:lstStyle>
           <a:p>
             <a:r>
-              <a:rPr lang="en-US" smtClean="0"/>
+              <a:rPr lang="en-US"/>
               <a:t>Click to edit Master subtitle style</a:t>
             </a:r>
-            <a:endParaRPr lang="en-US"/>
           </a:p>
         </p:txBody>
       </p:sp>
@@ -239,7 +243,7 @@
           <a:p>
             <a:fld id="{28BE630F-C39C-4DB9-8258-0B48CA067079}" type="datetimeFigureOut">
               <a:rPr lang="en-US" smtClean="0"/>
-              <a:t>11/25/2021</a:t>
+              <a:t>11/29/2021</a:t>
             </a:fld>
             <a:endParaRPr lang="en-US"/>
           </a:p>
@@ -333,10 +337,9 @@
           <a:lstStyle/>
           <a:p>
             <a:r>
-              <a:rPr lang="en-US" smtClean="0"/>
+              <a:rPr lang="en-US"/>
               <a:t>Click to edit Master title style</a:t>
             </a:r>
-            <a:endParaRPr lang="en-US"/>
           </a:p>
         </p:txBody>
       </p:sp>
@@ -357,38 +360,37 @@
           <a:p>
             <a:pPr lvl="0"/>
             <a:r>
-              <a:rPr lang="en-US" smtClean="0"/>
+              <a:rPr lang="en-US"/>
               <a:t>Click to edit Master text styles</a:t>
             </a:r>
           </a:p>
           <a:p>
             <a:pPr lvl="1"/>
             <a:r>
-              <a:rPr lang="en-US" smtClean="0"/>
+              <a:rPr lang="en-US"/>
               <a:t>Second level</a:t>
             </a:r>
           </a:p>
           <a:p>
             <a:pPr lvl="2"/>
             <a:r>
-              <a:rPr lang="en-US" smtClean="0"/>
+              <a:rPr lang="en-US"/>
               <a:t>Third level</a:t>
             </a:r>
           </a:p>
           <a:p>
             <a:pPr lvl="3"/>
             <a:r>
-              <a:rPr lang="en-US" smtClean="0"/>
+              <a:rPr lang="en-US"/>
               <a:t>Fourth level</a:t>
             </a:r>
           </a:p>
           <a:p>
             <a:pPr lvl="4"/>
             <a:r>
-              <a:rPr lang="en-US" smtClean="0"/>
+              <a:rPr lang="en-US"/>
               <a:t>Fifth level</a:t>
             </a:r>
-            <a:endParaRPr lang="en-US"/>
           </a:p>
         </p:txBody>
       </p:sp>
@@ -409,7 +411,7 @@
           <a:p>
             <a:fld id="{28BE630F-C39C-4DB9-8258-0B48CA067079}" type="datetimeFigureOut">
               <a:rPr lang="en-US" smtClean="0"/>
-              <a:t>11/25/2021</a:t>
+              <a:t>11/29/2021</a:t>
             </a:fld>
             <a:endParaRPr lang="en-US"/>
           </a:p>
@@ -508,10 +510,9 @@
           <a:lstStyle/>
           <a:p>
             <a:r>
-              <a:rPr lang="en-US" smtClean="0"/>
+              <a:rPr lang="en-US"/>
               <a:t>Click to edit Master title style</a:t>
             </a:r>
-            <a:endParaRPr lang="en-US"/>
           </a:p>
         </p:txBody>
       </p:sp>
@@ -537,38 +538,37 @@
           <a:p>
             <a:pPr lvl="0"/>
             <a:r>
-              <a:rPr lang="en-US" smtClean="0"/>
+              <a:rPr lang="en-US"/>
               <a:t>Click to edit Master text styles</a:t>
             </a:r>
           </a:p>
           <a:p>
             <a:pPr lvl="1"/>
             <a:r>
-              <a:rPr lang="en-US" smtClean="0"/>
+              <a:rPr lang="en-US"/>
               <a:t>Second level</a:t>
             </a:r>
           </a:p>
           <a:p>
             <a:pPr lvl="2"/>
             <a:r>
-              <a:rPr lang="en-US" smtClean="0"/>
+              <a:rPr lang="en-US"/>
               <a:t>Third level</a:t>
             </a:r>
           </a:p>
           <a:p>
             <a:pPr lvl="3"/>
             <a:r>
-              <a:rPr lang="en-US" smtClean="0"/>
+              <a:rPr lang="en-US"/>
               <a:t>Fourth level</a:t>
             </a:r>
           </a:p>
           <a:p>
             <a:pPr lvl="4"/>
             <a:r>
-              <a:rPr lang="en-US" smtClean="0"/>
+              <a:rPr lang="en-US"/>
               <a:t>Fifth level</a:t>
             </a:r>
-            <a:endParaRPr lang="en-US"/>
           </a:p>
         </p:txBody>
       </p:sp>
@@ -589,7 +589,7 @@
           <a:p>
             <a:fld id="{28BE630F-C39C-4DB9-8258-0B48CA067079}" type="datetimeFigureOut">
               <a:rPr lang="en-US" smtClean="0"/>
-              <a:t>11/25/2021</a:t>
+              <a:t>11/29/2021</a:t>
             </a:fld>
             <a:endParaRPr lang="en-US"/>
           </a:p>
@@ -683,10 +683,9 @@
           <a:lstStyle/>
           <a:p>
             <a:r>
-              <a:rPr lang="en-US" smtClean="0"/>
+              <a:rPr lang="en-US"/>
               <a:t>Click to edit Master title style</a:t>
             </a:r>
-            <a:endParaRPr lang="en-US"/>
           </a:p>
         </p:txBody>
       </p:sp>
@@ -707,38 +706,37 @@
           <a:p>
             <a:pPr lvl="0"/>
             <a:r>
-              <a:rPr lang="en-US" smtClean="0"/>
+              <a:rPr lang="en-US"/>
               <a:t>Click to edit Master text styles</a:t>
             </a:r>
           </a:p>
           <a:p>
             <a:pPr lvl="1"/>
             <a:r>
-              <a:rPr lang="en-US" smtClean="0"/>
+              <a:rPr lang="en-US"/>
               <a:t>Second level</a:t>
             </a:r>
           </a:p>
           <a:p>
             <a:pPr lvl="2"/>
             <a:r>
-              <a:rPr lang="en-US" smtClean="0"/>
+              <a:rPr lang="en-US"/>
               <a:t>Third level</a:t>
             </a:r>
           </a:p>
           <a:p>
             <a:pPr lvl="3"/>
             <a:r>
-              <a:rPr lang="en-US" smtClean="0"/>
+              <a:rPr lang="en-US"/>
               <a:t>Fourth level</a:t>
             </a:r>
           </a:p>
           <a:p>
             <a:pPr lvl="4"/>
             <a:r>
-              <a:rPr lang="en-US" smtClean="0"/>
+              <a:rPr lang="en-US"/>
               <a:t>Fifth level</a:t>
             </a:r>
-            <a:endParaRPr lang="en-US"/>
           </a:p>
         </p:txBody>
       </p:sp>
@@ -759,7 +757,7 @@
           <a:p>
             <a:fld id="{28BE630F-C39C-4DB9-8258-0B48CA067079}" type="datetimeFigureOut">
               <a:rPr lang="en-US" smtClean="0"/>
-              <a:t>11/25/2021</a:t>
+              <a:t>11/29/2021</a:t>
             </a:fld>
             <a:endParaRPr lang="en-US"/>
           </a:p>
@@ -862,10 +860,9 @@
           </a:lstStyle>
           <a:p>
             <a:r>
-              <a:rPr lang="en-US" smtClean="0"/>
+              <a:rPr lang="en-US"/>
               <a:t>Click to edit Master title style</a:t>
             </a:r>
-            <a:endParaRPr lang="en-US"/>
           </a:p>
         </p:txBody>
       </p:sp>
@@ -982,7 +979,7 @@
           <a:p>
             <a:pPr lvl="0"/>
             <a:r>
-              <a:rPr lang="en-US" smtClean="0"/>
+              <a:rPr lang="en-US"/>
               <a:t>Click to edit Master text styles</a:t>
             </a:r>
           </a:p>
@@ -1005,7 +1002,7 @@
           <a:p>
             <a:fld id="{28BE630F-C39C-4DB9-8258-0B48CA067079}" type="datetimeFigureOut">
               <a:rPr lang="en-US" smtClean="0"/>
-              <a:t>11/25/2021</a:t>
+              <a:t>11/29/2021</a:t>
             </a:fld>
             <a:endParaRPr lang="en-US"/>
           </a:p>
@@ -1099,10 +1096,9 @@
           <a:lstStyle/>
           <a:p>
             <a:r>
-              <a:rPr lang="en-US" smtClean="0"/>
+              <a:rPr lang="en-US"/>
               <a:t>Click to edit Master title style</a:t>
             </a:r>
-            <a:endParaRPr lang="en-US"/>
           </a:p>
         </p:txBody>
       </p:sp>
@@ -1128,38 +1124,37 @@
           <a:p>
             <a:pPr lvl="0"/>
             <a:r>
-              <a:rPr lang="en-US" smtClean="0"/>
+              <a:rPr lang="en-US"/>
               <a:t>Click to edit Master text styles</a:t>
             </a:r>
           </a:p>
           <a:p>
             <a:pPr lvl="1"/>
             <a:r>
-              <a:rPr lang="en-US" smtClean="0"/>
+              <a:rPr lang="en-US"/>
               <a:t>Second level</a:t>
             </a:r>
           </a:p>
           <a:p>
             <a:pPr lvl="2"/>
             <a:r>
-              <a:rPr lang="en-US" smtClean="0"/>
+              <a:rPr lang="en-US"/>
               <a:t>Third level</a:t>
             </a:r>
           </a:p>
           <a:p>
             <a:pPr lvl="3"/>
             <a:r>
-              <a:rPr lang="en-US" smtClean="0"/>
+              <a:rPr lang="en-US"/>
               <a:t>Fourth level</a:t>
             </a:r>
           </a:p>
           <a:p>
             <a:pPr lvl="4"/>
             <a:r>
-              <a:rPr lang="en-US" smtClean="0"/>
+              <a:rPr lang="en-US"/>
               <a:t>Fifth level</a:t>
             </a:r>
-            <a:endParaRPr lang="en-US"/>
           </a:p>
         </p:txBody>
       </p:sp>
@@ -1185,38 +1180,37 @@
           <a:p>
             <a:pPr lvl="0"/>
             <a:r>
-              <a:rPr lang="en-US" smtClean="0"/>
+              <a:rPr lang="en-US"/>
               <a:t>Click to edit Master text styles</a:t>
             </a:r>
           </a:p>
           <a:p>
             <a:pPr lvl="1"/>
             <a:r>
-              <a:rPr lang="en-US" smtClean="0"/>
+              <a:rPr lang="en-US"/>
               <a:t>Second level</a:t>
             </a:r>
           </a:p>
           <a:p>
             <a:pPr lvl="2"/>
             <a:r>
-              <a:rPr lang="en-US" smtClean="0"/>
+              <a:rPr lang="en-US"/>
               <a:t>Third level</a:t>
             </a:r>
           </a:p>
           <a:p>
             <a:pPr lvl="3"/>
             <a:r>
-              <a:rPr lang="en-US" smtClean="0"/>
+              <a:rPr lang="en-US"/>
               <a:t>Fourth level</a:t>
             </a:r>
           </a:p>
           <a:p>
             <a:pPr lvl="4"/>
             <a:r>
-              <a:rPr lang="en-US" smtClean="0"/>
+              <a:rPr lang="en-US"/>
               <a:t>Fifth level</a:t>
             </a:r>
-            <a:endParaRPr lang="en-US"/>
           </a:p>
         </p:txBody>
       </p:sp>
@@ -1237,7 +1231,7 @@
           <a:p>
             <a:fld id="{28BE630F-C39C-4DB9-8258-0B48CA067079}" type="datetimeFigureOut">
               <a:rPr lang="en-US" smtClean="0"/>
-              <a:t>11/25/2021</a:t>
+              <a:t>11/29/2021</a:t>
             </a:fld>
             <a:endParaRPr lang="en-US"/>
           </a:p>
@@ -1336,10 +1330,9 @@
           <a:lstStyle/>
           <a:p>
             <a:r>
-              <a:rPr lang="en-US" smtClean="0"/>
+              <a:rPr lang="en-US"/>
               <a:t>Click to edit Master title style</a:t>
             </a:r>
-            <a:endParaRPr lang="en-US"/>
           </a:p>
         </p:txBody>
       </p:sp>
@@ -1402,7 +1395,7 @@
           <a:p>
             <a:pPr lvl="0"/>
             <a:r>
-              <a:rPr lang="en-US" smtClean="0"/>
+              <a:rPr lang="en-US"/>
               <a:t>Click to edit Master text styles</a:t>
             </a:r>
           </a:p>
@@ -1430,38 +1423,37 @@
           <a:p>
             <a:pPr lvl="0"/>
             <a:r>
-              <a:rPr lang="en-US" smtClean="0"/>
+              <a:rPr lang="en-US"/>
               <a:t>Click to edit Master text styles</a:t>
             </a:r>
           </a:p>
           <a:p>
             <a:pPr lvl="1"/>
             <a:r>
-              <a:rPr lang="en-US" smtClean="0"/>
+              <a:rPr lang="en-US"/>
               <a:t>Second level</a:t>
             </a:r>
           </a:p>
           <a:p>
             <a:pPr lvl="2"/>
             <a:r>
-              <a:rPr lang="en-US" smtClean="0"/>
+              <a:rPr lang="en-US"/>
               <a:t>Third level</a:t>
             </a:r>
           </a:p>
           <a:p>
             <a:pPr lvl="3"/>
             <a:r>
-              <a:rPr lang="en-US" smtClean="0"/>
+              <a:rPr lang="en-US"/>
               <a:t>Fourth level</a:t>
             </a:r>
           </a:p>
           <a:p>
             <a:pPr lvl="4"/>
             <a:r>
-              <a:rPr lang="en-US" smtClean="0"/>
+              <a:rPr lang="en-US"/>
               <a:t>Fifth level</a:t>
             </a:r>
-            <a:endParaRPr lang="en-US"/>
           </a:p>
         </p:txBody>
       </p:sp>
@@ -1524,7 +1516,7 @@
           <a:p>
             <a:pPr lvl="0"/>
             <a:r>
-              <a:rPr lang="en-US" smtClean="0"/>
+              <a:rPr lang="en-US"/>
               <a:t>Click to edit Master text styles</a:t>
             </a:r>
           </a:p>
@@ -1552,38 +1544,37 @@
           <a:p>
             <a:pPr lvl="0"/>
             <a:r>
-              <a:rPr lang="en-US" smtClean="0"/>
+              <a:rPr lang="en-US"/>
               <a:t>Click to edit Master text styles</a:t>
             </a:r>
           </a:p>
           <a:p>
             <a:pPr lvl="1"/>
             <a:r>
-              <a:rPr lang="en-US" smtClean="0"/>
+              <a:rPr lang="en-US"/>
               <a:t>Second level</a:t>
             </a:r>
           </a:p>
           <a:p>
             <a:pPr lvl="2"/>
             <a:r>
-              <a:rPr lang="en-US" smtClean="0"/>
+              <a:rPr lang="en-US"/>
               <a:t>Third level</a:t>
             </a:r>
           </a:p>
           <a:p>
             <a:pPr lvl="3"/>
             <a:r>
-              <a:rPr lang="en-US" smtClean="0"/>
+              <a:rPr lang="en-US"/>
               <a:t>Fourth level</a:t>
             </a:r>
           </a:p>
           <a:p>
             <a:pPr lvl="4"/>
             <a:r>
-              <a:rPr lang="en-US" smtClean="0"/>
+              <a:rPr lang="en-US"/>
               <a:t>Fifth level</a:t>
             </a:r>
-            <a:endParaRPr lang="en-US"/>
           </a:p>
         </p:txBody>
       </p:sp>
@@ -1604,7 +1595,7 @@
           <a:p>
             <a:fld id="{28BE630F-C39C-4DB9-8258-0B48CA067079}" type="datetimeFigureOut">
               <a:rPr lang="en-US" smtClean="0"/>
-              <a:t>11/25/2021</a:t>
+              <a:t>11/29/2021</a:t>
             </a:fld>
             <a:endParaRPr lang="en-US"/>
           </a:p>
@@ -1698,10 +1689,9 @@
           <a:lstStyle/>
           <a:p>
             <a:r>
-              <a:rPr lang="en-US" smtClean="0"/>
+              <a:rPr lang="en-US"/>
               <a:t>Click to edit Master title style</a:t>
             </a:r>
-            <a:endParaRPr lang="en-US"/>
           </a:p>
         </p:txBody>
       </p:sp>
@@ -1722,7 +1712,7 @@
           <a:p>
             <a:fld id="{28BE630F-C39C-4DB9-8258-0B48CA067079}" type="datetimeFigureOut">
               <a:rPr lang="en-US" smtClean="0"/>
-              <a:t>11/25/2021</a:t>
+              <a:t>11/29/2021</a:t>
             </a:fld>
             <a:endParaRPr lang="en-US"/>
           </a:p>
@@ -1817,7 +1807,7 @@
           <a:p>
             <a:fld id="{28BE630F-C39C-4DB9-8258-0B48CA067079}" type="datetimeFigureOut">
               <a:rPr lang="en-US" smtClean="0"/>
-              <a:t>11/25/2021</a:t>
+              <a:t>11/29/2021</a:t>
             </a:fld>
             <a:endParaRPr lang="en-US"/>
           </a:p>
@@ -1920,10 +1910,9 @@
           </a:lstStyle>
           <a:p>
             <a:r>
-              <a:rPr lang="en-US" smtClean="0"/>
+              <a:rPr lang="en-US"/>
               <a:t>Click to edit Master title style</a:t>
             </a:r>
-            <a:endParaRPr lang="en-US"/>
           </a:p>
         </p:txBody>
       </p:sp>
@@ -1977,38 +1966,37 @@
           <a:p>
             <a:pPr lvl="0"/>
             <a:r>
-              <a:rPr lang="en-US" smtClean="0"/>
+              <a:rPr lang="en-US"/>
               <a:t>Click to edit Master text styles</a:t>
             </a:r>
           </a:p>
           <a:p>
             <a:pPr lvl="1"/>
             <a:r>
-              <a:rPr lang="en-US" smtClean="0"/>
+              <a:rPr lang="en-US"/>
               <a:t>Second level</a:t>
             </a:r>
           </a:p>
           <a:p>
             <a:pPr lvl="2"/>
             <a:r>
-              <a:rPr lang="en-US" smtClean="0"/>
+              <a:rPr lang="en-US"/>
               <a:t>Third level</a:t>
             </a:r>
           </a:p>
           <a:p>
             <a:pPr lvl="3"/>
             <a:r>
-              <a:rPr lang="en-US" smtClean="0"/>
+              <a:rPr lang="en-US"/>
               <a:t>Fourth level</a:t>
             </a:r>
           </a:p>
           <a:p>
             <a:pPr lvl="4"/>
             <a:r>
-              <a:rPr lang="en-US" smtClean="0"/>
+              <a:rPr lang="en-US"/>
               <a:t>Fifth level</a:t>
             </a:r>
-            <a:endParaRPr lang="en-US"/>
           </a:p>
         </p:txBody>
       </p:sp>
@@ -2071,7 +2059,7 @@
           <a:p>
             <a:pPr lvl="0"/>
             <a:r>
-              <a:rPr lang="en-US" smtClean="0"/>
+              <a:rPr lang="en-US"/>
               <a:t>Click to edit Master text styles</a:t>
             </a:r>
           </a:p>
@@ -2094,7 +2082,7 @@
           <a:p>
             <a:fld id="{28BE630F-C39C-4DB9-8258-0B48CA067079}" type="datetimeFigureOut">
               <a:rPr lang="en-US" smtClean="0"/>
-              <a:t>11/25/2021</a:t>
+              <a:t>11/29/2021</a:t>
             </a:fld>
             <a:endParaRPr lang="en-US"/>
           </a:p>
@@ -2197,10 +2185,9 @@
           </a:lstStyle>
           <a:p>
             <a:r>
-              <a:rPr lang="en-US" smtClean="0"/>
+              <a:rPr lang="en-US"/>
               <a:t>Click to edit Master title style</a:t>
             </a:r>
-            <a:endParaRPr lang="en-US"/>
           </a:p>
         </p:txBody>
       </p:sp>
@@ -2324,7 +2311,7 @@
           <a:p>
             <a:pPr lvl="0"/>
             <a:r>
-              <a:rPr lang="en-US" smtClean="0"/>
+              <a:rPr lang="en-US"/>
               <a:t>Click to edit Master text styles</a:t>
             </a:r>
           </a:p>
@@ -2347,7 +2334,7 @@
           <a:p>
             <a:fld id="{28BE630F-C39C-4DB9-8258-0B48CA067079}" type="datetimeFigureOut">
               <a:rPr lang="en-US" smtClean="0"/>
-              <a:t>11/25/2021</a:t>
+              <a:t>11/29/2021</a:t>
             </a:fld>
             <a:endParaRPr lang="en-US"/>
           </a:p>
@@ -2456,10 +2443,9 @@
           <a:lstStyle/>
           <a:p>
             <a:r>
-              <a:rPr lang="en-US" smtClean="0"/>
+              <a:rPr lang="en-US"/>
               <a:t>Click to edit Master title style</a:t>
             </a:r>
-            <a:endParaRPr lang="en-US"/>
           </a:p>
         </p:txBody>
       </p:sp>
@@ -2490,38 +2476,37 @@
           <a:p>
             <a:pPr lvl="0"/>
             <a:r>
-              <a:rPr lang="en-US" smtClean="0"/>
+              <a:rPr lang="en-US"/>
               <a:t>Click to edit Master text styles</a:t>
             </a:r>
           </a:p>
           <a:p>
             <a:pPr lvl="1"/>
             <a:r>
-              <a:rPr lang="en-US" smtClean="0"/>
+              <a:rPr lang="en-US"/>
               <a:t>Second level</a:t>
             </a:r>
           </a:p>
           <a:p>
             <a:pPr lvl="2"/>
             <a:r>
-              <a:rPr lang="en-US" smtClean="0"/>
+              <a:rPr lang="en-US"/>
               <a:t>Third level</a:t>
             </a:r>
           </a:p>
           <a:p>
             <a:pPr lvl="3"/>
             <a:r>
-              <a:rPr lang="en-US" smtClean="0"/>
+              <a:rPr lang="en-US"/>
               <a:t>Fourth level</a:t>
             </a:r>
           </a:p>
           <a:p>
             <a:pPr lvl="4"/>
             <a:r>
-              <a:rPr lang="en-US" smtClean="0"/>
+              <a:rPr lang="en-US"/>
               <a:t>Fifth level</a:t>
             </a:r>
-            <a:endParaRPr lang="en-US"/>
           </a:p>
         </p:txBody>
       </p:sp>
@@ -2560,7 +2545,7 @@
           <a:p>
             <a:fld id="{28BE630F-C39C-4DB9-8258-0B48CA067079}" type="datetimeFigureOut">
               <a:rPr lang="en-US" smtClean="0"/>
-              <a:t>11/25/2021</a:t>
+              <a:t>11/29/2021</a:t>
             </a:fld>
             <a:endParaRPr lang="en-US"/>
           </a:p>
@@ -3323,10 +3308,9 @@
           <a:lstStyle/>
           <a:p>
             <a:r>
-              <a:rPr lang="en-US" sz="1372" dirty="0" smtClean="0"/>
+              <a:rPr lang="en-US" sz="1372" dirty="0"/>
               <a:t>Students[]</a:t>
             </a:r>
-            <a:endParaRPr lang="en-US" sz="1372" dirty="0"/>
           </a:p>
         </p:txBody>
       </p:sp>
@@ -3353,10 +3337,9 @@
           <a:lstStyle/>
           <a:p>
             <a:r>
-              <a:rPr lang="en-US" sz="1372" dirty="0" smtClean="0"/>
+              <a:rPr lang="en-US" sz="1372" dirty="0"/>
               <a:t>// A component with a list of student as data</a:t>
             </a:r>
-            <a:endParaRPr lang="en-US" sz="1372" dirty="0"/>
           </a:p>
         </p:txBody>
       </p:sp>
@@ -3368,7 +3351,7 @@
         </p:nvSpPr>
         <p:spPr>
           <a:xfrm>
-            <a:off x="1009380" y="2556074"/>
+            <a:off x="1009380" y="2560525"/>
             <a:ext cx="639919" cy="303481"/>
           </a:xfrm>
           <a:prstGeom prst="rect">
@@ -3463,10 +3446,9 @@
           <a:lstStyle/>
           <a:p>
             <a:r>
-              <a:rPr lang="en-US" sz="1372" dirty="0" smtClean="0"/>
+              <a:rPr lang="en-US" sz="1372" dirty="0"/>
               <a:t>Students[]</a:t>
             </a:r>
-            <a:endParaRPr lang="en-US" sz="1372" dirty="0"/>
           </a:p>
         </p:txBody>
       </p:sp>
@@ -3493,11 +3475,11 @@
           <a:lstStyle/>
           <a:p>
             <a:r>
-              <a:rPr lang="en-US" sz="1372" dirty="0" smtClean="0"/>
+              <a:rPr lang="en-US" sz="1372" dirty="0"/>
               <a:t>// </a:t>
             </a:r>
             <a:r>
-              <a:rPr lang="en-US" sz="1372" dirty="0" smtClean="0">
+              <a:rPr lang="en-US" sz="1372" dirty="0">
                 <a:solidFill>
                   <a:srgbClr val="FF0000"/>
                 </a:solidFill>
@@ -3505,22 +3487,17 @@
               <a:t>app</a:t>
             </a:r>
             <a:r>
-              <a:rPr lang="en-US" sz="1372" dirty="0" smtClean="0"/>
+              <a:rPr lang="en-US" sz="1372" dirty="0"/>
               <a:t> send student to </a:t>
             </a:r>
             <a:r>
-              <a:rPr lang="en-US" sz="1372" dirty="0" smtClean="0">
+              <a:rPr lang="en-US" sz="1372" dirty="0">
                 <a:solidFill>
                   <a:srgbClr val="FF0000"/>
                 </a:solidFill>
               </a:rPr>
               <a:t>card </a:t>
             </a:r>
-            <a:endParaRPr lang="en-US" sz="1372" dirty="0">
-              <a:solidFill>
-                <a:srgbClr val="FF0000"/>
-              </a:solidFill>
-            </a:endParaRPr>
           </a:p>
         </p:txBody>
       </p:sp>
@@ -3547,18 +3524,13 @@
           <a:lstStyle/>
           <a:p>
             <a:r>
-              <a:rPr lang="en-US" sz="1372" b="1" i="1" dirty="0" smtClean="0">
+              <a:rPr lang="en-US" sz="1372" b="1" i="1" dirty="0">
                 <a:solidFill>
                   <a:srgbClr val="FF0000"/>
                 </a:solidFill>
               </a:rPr>
               <a:t>&lt;parent&gt;</a:t>
             </a:r>
-            <a:endParaRPr lang="en-US" sz="1372" b="1" i="1" dirty="0">
-              <a:solidFill>
-                <a:srgbClr val="FF0000"/>
-              </a:solidFill>
-            </a:endParaRPr>
           </a:p>
         </p:txBody>
       </p:sp>
@@ -3632,10 +3604,9 @@
           <a:lstStyle/>
           <a:p>
             <a:r>
-              <a:rPr lang="en-US" sz="1372" dirty="0" smtClean="0"/>
+              <a:rPr lang="en-US" sz="1372" dirty="0"/>
               <a:t>Students[]</a:t>
             </a:r>
-            <a:endParaRPr lang="en-US" sz="1372" dirty="0"/>
           </a:p>
         </p:txBody>
       </p:sp>
@@ -3662,11 +3633,11 @@
           <a:lstStyle/>
           <a:p>
             <a:r>
-              <a:rPr lang="en-US" sz="1372" dirty="0" smtClean="0"/>
+              <a:rPr lang="en-US" sz="1372" dirty="0"/>
               <a:t>// </a:t>
             </a:r>
             <a:r>
-              <a:rPr lang="en-US" sz="1372" dirty="0" smtClean="0">
+              <a:rPr lang="en-US" sz="1372" dirty="0">
                 <a:solidFill>
                   <a:srgbClr val="FF0000"/>
                 </a:solidFill>
@@ -3674,22 +3645,17 @@
               <a:t>from</a:t>
             </a:r>
             <a:r>
-              <a:rPr lang="en-US" sz="1372" dirty="0" smtClean="0"/>
+              <a:rPr lang="en-US" sz="1372" dirty="0"/>
               <a:t> send the event validated to </a:t>
             </a:r>
             <a:r>
-              <a:rPr lang="en-US" sz="1372" dirty="0" smtClean="0">
+              <a:rPr lang="en-US" sz="1372" dirty="0">
                 <a:solidFill>
                   <a:srgbClr val="FF0000"/>
                 </a:solidFill>
               </a:rPr>
               <a:t>parent</a:t>
             </a:r>
-            <a:endParaRPr lang="en-US" sz="1372" dirty="0">
-              <a:solidFill>
-                <a:srgbClr val="FF0000"/>
-              </a:solidFill>
-            </a:endParaRPr>
           </a:p>
         </p:txBody>
       </p:sp>
@@ -3763,10 +3729,9 @@
           <a:lstStyle/>
           <a:p>
             <a:r>
-              <a:rPr lang="en-US" sz="1372" dirty="0" smtClean="0"/>
+              <a:rPr lang="en-US" sz="1372" dirty="0"/>
               <a:t>Students[]</a:t>
             </a:r>
-            <a:endParaRPr lang="en-US" sz="1372" dirty="0"/>
           </a:p>
         </p:txBody>
       </p:sp>
@@ -3793,18 +3758,13 @@
           <a:lstStyle/>
           <a:p>
             <a:r>
-              <a:rPr lang="en-US" sz="1372" b="1" i="1" dirty="0" smtClean="0">
+              <a:rPr lang="en-US" sz="1372" b="1" i="1" dirty="0">
                 <a:solidFill>
                   <a:srgbClr val="FF0000"/>
                 </a:solidFill>
               </a:rPr>
               <a:t>&lt;from&gt;</a:t>
             </a:r>
-            <a:endParaRPr lang="en-US" sz="1372" b="1" i="1" dirty="0">
-              <a:solidFill>
-                <a:srgbClr val="FF0000"/>
-              </a:solidFill>
-            </a:endParaRPr>
           </a:p>
         </p:txBody>
       </p:sp>
@@ -3878,10 +3838,9 @@
           <a:lstStyle/>
           <a:p>
             <a:r>
-              <a:rPr lang="en-US" sz="1372" dirty="0" smtClean="0"/>
+              <a:rPr lang="en-US" sz="1372" dirty="0"/>
               <a:t>Students[]</a:t>
             </a:r>
-            <a:endParaRPr lang="en-US" sz="1372" dirty="0"/>
           </a:p>
         </p:txBody>
       </p:sp>
@@ -3956,10 +3915,9 @@
           <a:lstStyle/>
           <a:p>
             <a:r>
-              <a:rPr lang="en-US" sz="1372" dirty="0" smtClean="0"/>
+              <a:rPr lang="en-US" sz="1372" dirty="0"/>
               <a:t>student</a:t>
             </a:r>
-            <a:endParaRPr lang="en-US" sz="1372" dirty="0"/>
           </a:p>
         </p:txBody>
       </p:sp>
@@ -3986,18 +3944,13 @@
           <a:lstStyle/>
           <a:p>
             <a:r>
-              <a:rPr lang="en-US" sz="1372" b="1" dirty="0" smtClean="0">
+              <a:rPr lang="en-US" sz="1372" b="1" dirty="0">
                 <a:solidFill>
                   <a:schemeClr val="accent6"/>
                 </a:solidFill>
               </a:rPr>
               <a:t>PROPS</a:t>
             </a:r>
-            <a:endParaRPr lang="en-US" sz="1372" b="1" dirty="0">
-              <a:solidFill>
-                <a:schemeClr val="accent6"/>
-              </a:solidFill>
-            </a:endParaRPr>
           </a:p>
         </p:txBody>
       </p:sp>
@@ -4024,18 +3977,13 @@
           <a:lstStyle/>
           <a:p>
             <a:r>
-              <a:rPr lang="en-US" sz="1372" b="1" i="1" dirty="0" smtClean="0">
+              <a:rPr lang="en-US" sz="1372" b="1" i="1" dirty="0">
                 <a:solidFill>
                   <a:srgbClr val="FF0000"/>
                 </a:solidFill>
               </a:rPr>
               <a:t>&lt;card&gt;</a:t>
             </a:r>
-            <a:endParaRPr lang="en-US" sz="1372" b="1" i="1" dirty="0">
-              <a:solidFill>
-                <a:srgbClr val="FF0000"/>
-              </a:solidFill>
-            </a:endParaRPr>
           </a:p>
         </p:txBody>
       </p:sp>
@@ -4083,7 +4031,7 @@
           <a:lstStyle/>
           <a:p>
             <a:pPr algn="ctr"/>
-            <a:endParaRPr lang="en-US" sz="1372"/>
+            <a:endParaRPr lang="en-US" sz="1372" dirty="0"/>
           </a:p>
         </p:txBody>
       </p:sp>
@@ -4110,7 +4058,7 @@
           <a:lstStyle/>
           <a:p>
             <a:r>
-              <a:rPr lang="en-US" sz="1372" dirty="0" err="1" smtClean="0"/>
+              <a:rPr lang="en-US" sz="1372" dirty="0" err="1"/>
               <a:t>valided</a:t>
             </a:r>
             <a:endParaRPr lang="en-US" sz="1372" dirty="0"/>
@@ -4140,18 +4088,13 @@
           <a:lstStyle/>
           <a:p>
             <a:r>
-              <a:rPr lang="en-US" sz="1372" b="1" dirty="0" smtClean="0">
+              <a:rPr lang="en-US" sz="1372" b="1" dirty="0">
                 <a:solidFill>
                   <a:srgbClr val="FF0000"/>
                 </a:solidFill>
               </a:rPr>
               <a:t>EMIT</a:t>
             </a:r>
-            <a:endParaRPr lang="en-US" sz="1372" b="1" dirty="0">
-              <a:solidFill>
-                <a:srgbClr val="FF0000"/>
-              </a:solidFill>
-            </a:endParaRPr>
           </a:p>
         </p:txBody>
       </p:sp>
@@ -4288,10 +4231,9 @@
           <a:lstStyle/>
           <a:p>
             <a:r>
-              <a:rPr lang="en-US" sz="1372" dirty="0" smtClean="0"/>
+              <a:rPr lang="en-US" sz="1372" dirty="0"/>
               <a:t>Students[]</a:t>
             </a:r>
-            <a:endParaRPr lang="en-US" sz="1372" dirty="0"/>
           </a:p>
         </p:txBody>
       </p:sp>
@@ -4318,11 +4260,11 @@
           <a:lstStyle/>
           <a:p>
             <a:r>
-              <a:rPr lang="en-US" sz="1372" dirty="0" smtClean="0"/>
+              <a:rPr lang="en-US" sz="1372" dirty="0"/>
               <a:t>// </a:t>
             </a:r>
             <a:r>
-              <a:rPr lang="en-US" sz="1372" dirty="0" smtClean="0">
+              <a:rPr lang="en-US" sz="1372" dirty="0">
                 <a:solidFill>
                   <a:srgbClr val="FF0000"/>
                 </a:solidFill>
@@ -4330,7 +4272,7 @@
               <a:t>app</a:t>
             </a:r>
             <a:r>
-              <a:rPr lang="en-US" sz="1372" dirty="0" smtClean="0"/>
+              <a:rPr lang="en-US" sz="1372" dirty="0"/>
               <a:t>  provides students to anymore</a:t>
             </a:r>
             <a:endParaRPr lang="en-US" sz="1372" dirty="0">
@@ -4411,10 +4353,9 @@
           <a:lstStyle/>
           <a:p>
             <a:r>
-              <a:rPr lang="en-US" sz="1372" dirty="0" smtClean="0"/>
+              <a:rPr lang="en-US" sz="1372" dirty="0"/>
               <a:t>Students[]</a:t>
             </a:r>
-            <a:endParaRPr lang="en-US" sz="1372" dirty="0"/>
           </a:p>
         </p:txBody>
       </p:sp>
@@ -4441,18 +4382,13 @@
           <a:lstStyle/>
           <a:p>
             <a:r>
-              <a:rPr lang="en-US" sz="1372" b="1" i="1" dirty="0" smtClean="0">
+              <a:rPr lang="en-US" sz="1372" b="1" i="1" dirty="0">
                 <a:solidFill>
                   <a:srgbClr val="FF0000"/>
                 </a:solidFill>
               </a:rPr>
               <a:t>&lt;dialog&gt;</a:t>
             </a:r>
-            <a:endParaRPr lang="en-US" sz="1372" b="1" i="1" dirty="0">
-              <a:solidFill>
-                <a:srgbClr val="FF0000"/>
-              </a:solidFill>
-            </a:endParaRPr>
           </a:p>
         </p:txBody>
       </p:sp>
@@ -4560,10 +4496,9 @@
           <a:lstStyle/>
           <a:p>
             <a:r>
-              <a:rPr lang="en-US" sz="1372" dirty="0" smtClean="0"/>
+              <a:rPr lang="en-US" sz="1372" dirty="0"/>
               <a:t>Students[]</a:t>
             </a:r>
-            <a:endParaRPr lang="en-US" sz="1372" dirty="0"/>
           </a:p>
         </p:txBody>
       </p:sp>
@@ -4638,18 +4573,13 @@
           <a:lstStyle/>
           <a:p>
             <a:r>
-              <a:rPr lang="en-US" sz="1372" b="1" dirty="0" smtClean="0">
+              <a:rPr lang="en-US" sz="1372" b="1" dirty="0">
                 <a:solidFill>
                   <a:schemeClr val="accent4"/>
                 </a:solidFill>
               </a:rPr>
               <a:t>INJECT</a:t>
             </a:r>
-            <a:endParaRPr lang="en-US" sz="1372" b="1" dirty="0">
-              <a:solidFill>
-                <a:schemeClr val="accent4"/>
-              </a:solidFill>
-            </a:endParaRPr>
           </a:p>
         </p:txBody>
       </p:sp>
@@ -4676,10 +4606,9 @@
           <a:lstStyle/>
           <a:p>
             <a:r>
-              <a:rPr lang="en-US" sz="1372" dirty="0" smtClean="0"/>
+              <a:rPr lang="en-US" sz="1372" dirty="0"/>
               <a:t>Students[]</a:t>
             </a:r>
-            <a:endParaRPr lang="en-US" sz="1372" dirty="0"/>
           </a:p>
         </p:txBody>
       </p:sp>
@@ -4706,11 +4635,11 @@
           <a:lstStyle/>
           <a:p>
             <a:r>
-              <a:rPr lang="en-US" sz="1372" dirty="0" smtClean="0"/>
+              <a:rPr lang="en-US" sz="1372" dirty="0"/>
               <a:t>// </a:t>
             </a:r>
             <a:r>
-              <a:rPr lang="en-US" sz="1372" dirty="0" smtClean="0">
+              <a:rPr lang="en-US" sz="1372" dirty="0">
                 <a:solidFill>
                   <a:srgbClr val="FF0000"/>
                 </a:solidFill>
@@ -4718,7 +4647,7 @@
               <a:t>dialog </a:t>
             </a:r>
             <a:r>
-              <a:rPr lang="en-US" sz="1372" dirty="0" smtClean="0"/>
+              <a:rPr lang="en-US" sz="1372" dirty="0"/>
               <a:t> gets students from a provider</a:t>
             </a:r>
             <a:endParaRPr lang="en-US" sz="1372" dirty="0">
@@ -4832,15 +4761,15 @@
           <a:lstStyle/>
           <a:p>
             <a:r>
-              <a:rPr lang="en-US" sz="1372" dirty="0" smtClean="0"/>
+              <a:rPr lang="en-US" sz="1372" dirty="0"/>
               <a:t>// </a:t>
             </a:r>
             <a:r>
-              <a:rPr lang="en-US" sz="1372" dirty="0" err="1" smtClean="0"/>
+              <a:rPr lang="en-US" sz="1372" dirty="0" err="1"/>
               <a:t>Vue</a:t>
             </a:r>
             <a:r>
-              <a:rPr lang="en-US" sz="1372" dirty="0" smtClean="0"/>
+              <a:rPr lang="en-US" sz="1372" dirty="0"/>
               <a:t> JS built-in component</a:t>
             </a:r>
             <a:endParaRPr lang="en-US" sz="1372" dirty="0">
@@ -4855,6 +4784,1825 @@
     <p:extLst>
       <p:ext uri="{BB962C8B-B14F-4D97-AF65-F5344CB8AC3E}">
         <p14:creationId xmlns:p14="http://schemas.microsoft.com/office/powerpoint/2010/main" val="3109588190"/>
+      </p:ext>
+    </p:extLst>
+  </p:cSld>
+  <p:clrMapOvr>
+    <a:masterClrMapping/>
+  </p:clrMapOvr>
+</p:sld>
+</file>
+
+<file path=ppt/slides/slide3.xml><?xml version="1.0" encoding="utf-8"?>
+<p:sld xmlns:a="http://schemas.openxmlformats.org/drawingml/2006/main" xmlns:r="http://schemas.openxmlformats.org/officeDocument/2006/relationships" xmlns:p="http://schemas.openxmlformats.org/presentationml/2006/main">
+  <p:cSld>
+    <p:spTree>
+      <p:nvGrpSpPr>
+        <p:cNvPr id="1" name=""/>
+        <p:cNvGrpSpPr/>
+        <p:nvPr/>
+      </p:nvGrpSpPr>
+      <p:grpSpPr>
+        <a:xfrm>
+          <a:off x="0" y="0"/>
+          <a:ext cx="0" cy="0"/>
+          <a:chOff x="0" y="0"/>
+          <a:chExt cx="0" cy="0"/>
+        </a:xfrm>
+      </p:grpSpPr>
+      <p:sp>
+        <p:nvSpPr>
+          <p:cNvPr id="6" name="TextBox 5">
+            <a:extLst>
+              <a:ext uri="{FF2B5EF4-FFF2-40B4-BE49-F238E27FC236}">
+                <a16:creationId xmlns:a16="http://schemas.microsoft.com/office/drawing/2014/main" id="{9718F69B-AF95-4BC9-A5A5-B496A7754D41}"/>
+              </a:ext>
+            </a:extLst>
+          </p:cNvPr>
+          <p:cNvSpPr txBox="1"/>
+          <p:nvPr/>
+        </p:nvSpPr>
+        <p:spPr>
+          <a:xfrm>
+            <a:off x="856593" y="311525"/>
+            <a:ext cx="935420" cy="369332"/>
+          </a:xfrm>
+          <a:prstGeom prst="rect">
+            <a:avLst/>
+          </a:prstGeom>
+          <a:noFill/>
+        </p:spPr>
+        <p:txBody>
+          <a:bodyPr wrap="square" rtlCol="0">
+            <a:spAutoFit/>
+          </a:bodyPr>
+          <a:lstStyle/>
+          <a:p>
+            <a:r>
+              <a:rPr lang="en-US" dirty="0">
+                <a:solidFill>
+                  <a:srgbClr val="FF0000"/>
+                </a:solidFill>
+              </a:rPr>
+              <a:t>&lt;App&gt;</a:t>
+            </a:r>
+          </a:p>
+        </p:txBody>
+      </p:sp>
+      <p:sp>
+        <p:nvSpPr>
+          <p:cNvPr id="8" name="TextBox 7">
+            <a:extLst>
+              <a:ext uri="{FF2B5EF4-FFF2-40B4-BE49-F238E27FC236}">
+                <a16:creationId xmlns:a16="http://schemas.microsoft.com/office/drawing/2014/main" id="{7D41E539-CD92-41C6-8395-EE5B5F2E14FF}"/>
+              </a:ext>
+            </a:extLst>
+          </p:cNvPr>
+          <p:cNvSpPr txBox="1"/>
+          <p:nvPr/>
+        </p:nvSpPr>
+        <p:spPr>
+          <a:xfrm>
+            <a:off x="688426" y="852807"/>
+            <a:ext cx="1471449" cy="369332"/>
+          </a:xfrm>
+          <a:prstGeom prst="rect">
+            <a:avLst/>
+          </a:prstGeom>
+          <a:noFill/>
+        </p:spPr>
+        <p:txBody>
+          <a:bodyPr wrap="square" rtlCol="0">
+            <a:spAutoFit/>
+          </a:bodyPr>
+          <a:lstStyle/>
+          <a:p>
+            <a:r>
+              <a:rPr lang="en-US" dirty="0"/>
+              <a:t>Categories[]</a:t>
+            </a:r>
+          </a:p>
+        </p:txBody>
+      </p:sp>
+      <p:cxnSp>
+        <p:nvCxnSpPr>
+          <p:cNvPr id="10" name="Straight Connector 9">
+            <a:extLst>
+              <a:ext uri="{FF2B5EF4-FFF2-40B4-BE49-F238E27FC236}">
+                <a16:creationId xmlns:a16="http://schemas.microsoft.com/office/drawing/2014/main" id="{55D48469-1712-4B1A-80EF-4DC2E6FA9118}"/>
+              </a:ext>
+            </a:extLst>
+          </p:cNvPr>
+          <p:cNvCxnSpPr>
+            <a:cxnSpLocks/>
+          </p:cNvCxnSpPr>
+          <p:nvPr/>
+        </p:nvCxnSpPr>
+        <p:spPr>
+          <a:xfrm>
+            <a:off x="6369269" y="0"/>
+            <a:ext cx="0" cy="6858000"/>
+          </a:xfrm>
+          <a:prstGeom prst="line">
+            <a:avLst/>
+          </a:prstGeom>
+        </p:spPr>
+        <p:style>
+          <a:lnRef idx="1">
+            <a:schemeClr val="accent1"/>
+          </a:lnRef>
+          <a:fillRef idx="0">
+            <a:schemeClr val="accent1"/>
+          </a:fillRef>
+          <a:effectRef idx="0">
+            <a:schemeClr val="accent1"/>
+          </a:effectRef>
+          <a:fontRef idx="minor">
+            <a:schemeClr val="tx1"/>
+          </a:fontRef>
+        </p:style>
+      </p:cxnSp>
+      <p:sp>
+        <p:nvSpPr>
+          <p:cNvPr id="21" name="TextBox 20">
+            <a:extLst>
+              <a:ext uri="{FF2B5EF4-FFF2-40B4-BE49-F238E27FC236}">
+                <a16:creationId xmlns:a16="http://schemas.microsoft.com/office/drawing/2014/main" id="{26952B0E-7E45-4710-B99D-3DAE29776D1F}"/>
+              </a:ext>
+            </a:extLst>
+          </p:cNvPr>
+          <p:cNvSpPr txBox="1"/>
+          <p:nvPr/>
+        </p:nvSpPr>
+        <p:spPr>
+          <a:xfrm>
+            <a:off x="206766" y="1534820"/>
+            <a:ext cx="4793855" cy="369332"/>
+          </a:xfrm>
+          <a:prstGeom prst="rect">
+            <a:avLst/>
+          </a:prstGeom>
+          <a:noFill/>
+        </p:spPr>
+        <p:txBody>
+          <a:bodyPr wrap="square" rtlCol="0">
+            <a:spAutoFit/>
+          </a:bodyPr>
+          <a:lstStyle/>
+          <a:p>
+            <a:r>
+              <a:rPr lang="en-US" dirty="0"/>
+              <a:t>//A component with a list  of Categories as data  </a:t>
+            </a:r>
+          </a:p>
+        </p:txBody>
+      </p:sp>
+      <p:sp>
+        <p:nvSpPr>
+          <p:cNvPr id="22" name="Rounded Rectangle 8">
+            <a:extLst>
+              <a:ext uri="{FF2B5EF4-FFF2-40B4-BE49-F238E27FC236}">
+                <a16:creationId xmlns:a16="http://schemas.microsoft.com/office/drawing/2014/main" id="{BA85B805-4452-4875-9E0C-61485A4550E2}"/>
+              </a:ext>
+            </a:extLst>
+          </p:cNvPr>
+          <p:cNvSpPr/>
+          <p:nvPr/>
+        </p:nvSpPr>
+        <p:spPr>
+          <a:xfrm>
+            <a:off x="476314" y="2002924"/>
+            <a:ext cx="1650319" cy="1166483"/>
+          </a:xfrm>
+          <a:prstGeom prst="roundRect">
+            <a:avLst/>
+          </a:prstGeom>
+          <a:noFill/>
+          <a:ln>
+            <a:solidFill>
+              <a:srgbClr val="FF0000"/>
+            </a:solidFill>
+            <a:prstDash val="lgDash"/>
+          </a:ln>
+        </p:spPr>
+        <p:style>
+          <a:lnRef idx="2">
+            <a:schemeClr val="accent1">
+              <a:shade val="50000"/>
+            </a:schemeClr>
+          </a:lnRef>
+          <a:fillRef idx="1">
+            <a:schemeClr val="accent1"/>
+          </a:fillRef>
+          <a:effectRef idx="0">
+            <a:schemeClr val="accent1"/>
+          </a:effectRef>
+          <a:fontRef idx="minor">
+            <a:schemeClr val="lt1"/>
+          </a:fontRef>
+        </p:style>
+        <p:txBody>
+          <a:bodyPr rtlCol="0" anchor="ctr"/>
+          <a:lstStyle/>
+          <a:p>
+            <a:pPr algn="ctr"/>
+            <a:endParaRPr lang="en-US" sz="1372"/>
+          </a:p>
+        </p:txBody>
+      </p:sp>
+      <p:sp>
+        <p:nvSpPr>
+          <p:cNvPr id="23" name="Rounded Rectangle 8">
+            <a:extLst>
+              <a:ext uri="{FF2B5EF4-FFF2-40B4-BE49-F238E27FC236}">
+                <a16:creationId xmlns:a16="http://schemas.microsoft.com/office/drawing/2014/main" id="{94226D10-2AA1-4A14-A0AF-AC3E9C689D2D}"/>
+              </a:ext>
+            </a:extLst>
+          </p:cNvPr>
+          <p:cNvSpPr/>
+          <p:nvPr/>
+        </p:nvSpPr>
+        <p:spPr>
+          <a:xfrm>
+            <a:off x="495465" y="269565"/>
+            <a:ext cx="1650319" cy="1166483"/>
+          </a:xfrm>
+          <a:prstGeom prst="roundRect">
+            <a:avLst/>
+          </a:prstGeom>
+          <a:noFill/>
+          <a:ln>
+            <a:solidFill>
+              <a:srgbClr val="FF0000"/>
+            </a:solidFill>
+            <a:prstDash val="lgDash"/>
+          </a:ln>
+        </p:spPr>
+        <p:style>
+          <a:lnRef idx="2">
+            <a:schemeClr val="accent1">
+              <a:shade val="50000"/>
+            </a:schemeClr>
+          </a:lnRef>
+          <a:fillRef idx="1">
+            <a:schemeClr val="accent1"/>
+          </a:fillRef>
+          <a:effectRef idx="0">
+            <a:schemeClr val="accent1"/>
+          </a:effectRef>
+          <a:fontRef idx="minor">
+            <a:schemeClr val="lt1"/>
+          </a:fontRef>
+        </p:style>
+        <p:txBody>
+          <a:bodyPr rtlCol="0" anchor="ctr"/>
+          <a:lstStyle/>
+          <a:p>
+            <a:pPr algn="ctr"/>
+            <a:endParaRPr lang="en-US" sz="1372"/>
+          </a:p>
+        </p:txBody>
+      </p:sp>
+      <p:sp>
+        <p:nvSpPr>
+          <p:cNvPr id="24" name="Rounded Rectangle 8">
+            <a:extLst>
+              <a:ext uri="{FF2B5EF4-FFF2-40B4-BE49-F238E27FC236}">
+                <a16:creationId xmlns:a16="http://schemas.microsoft.com/office/drawing/2014/main" id="{6363BB13-08B8-442E-8158-EC1497CFEBF5}"/>
+              </a:ext>
+            </a:extLst>
+          </p:cNvPr>
+          <p:cNvSpPr/>
+          <p:nvPr/>
+        </p:nvSpPr>
+        <p:spPr>
+          <a:xfrm>
+            <a:off x="3580698" y="2002923"/>
+            <a:ext cx="1650319" cy="1166483"/>
+          </a:xfrm>
+          <a:prstGeom prst="roundRect">
+            <a:avLst/>
+          </a:prstGeom>
+          <a:noFill/>
+          <a:ln>
+            <a:solidFill>
+              <a:srgbClr val="FF0000"/>
+            </a:solidFill>
+            <a:prstDash val="lgDash"/>
+          </a:ln>
+        </p:spPr>
+        <p:style>
+          <a:lnRef idx="2">
+            <a:schemeClr val="accent1">
+              <a:shade val="50000"/>
+            </a:schemeClr>
+          </a:lnRef>
+          <a:fillRef idx="1">
+            <a:schemeClr val="accent1"/>
+          </a:fillRef>
+          <a:effectRef idx="0">
+            <a:schemeClr val="accent1"/>
+          </a:effectRef>
+          <a:fontRef idx="minor">
+            <a:schemeClr val="lt1"/>
+          </a:fontRef>
+        </p:style>
+        <p:txBody>
+          <a:bodyPr rtlCol="0" anchor="ctr"/>
+          <a:lstStyle/>
+          <a:p>
+            <a:pPr algn="ctr"/>
+            <a:endParaRPr lang="en-US" sz="1372"/>
+          </a:p>
+        </p:txBody>
+      </p:sp>
+      <p:sp>
+        <p:nvSpPr>
+          <p:cNvPr id="25" name="TextBox 24">
+            <a:extLst>
+              <a:ext uri="{FF2B5EF4-FFF2-40B4-BE49-F238E27FC236}">
+                <a16:creationId xmlns:a16="http://schemas.microsoft.com/office/drawing/2014/main" id="{B8D6A94E-6391-401C-BE0A-AB3BBDB841D7}"/>
+              </a:ext>
+            </a:extLst>
+          </p:cNvPr>
+          <p:cNvSpPr txBox="1"/>
+          <p:nvPr/>
+        </p:nvSpPr>
+        <p:spPr>
+          <a:xfrm>
+            <a:off x="688426" y="2032167"/>
+            <a:ext cx="866394" cy="369332"/>
+          </a:xfrm>
+          <a:prstGeom prst="rect">
+            <a:avLst/>
+          </a:prstGeom>
+          <a:noFill/>
+        </p:spPr>
+        <p:txBody>
+          <a:bodyPr wrap="square" rtlCol="0">
+            <a:spAutoFit/>
+          </a:bodyPr>
+          <a:lstStyle/>
+          <a:p>
+            <a:r>
+              <a:rPr lang="en-US" dirty="0">
+                <a:solidFill>
+                  <a:srgbClr val="FF0000"/>
+                </a:solidFill>
+              </a:rPr>
+              <a:t>&lt;app&gt;</a:t>
+            </a:r>
+          </a:p>
+        </p:txBody>
+      </p:sp>
+      <p:sp>
+        <p:nvSpPr>
+          <p:cNvPr id="26" name="TextBox 25">
+            <a:extLst>
+              <a:ext uri="{FF2B5EF4-FFF2-40B4-BE49-F238E27FC236}">
+                <a16:creationId xmlns:a16="http://schemas.microsoft.com/office/drawing/2014/main" id="{4BA293E2-F73A-4244-9F0E-A4BED7C63D57}"/>
+              </a:ext>
+            </a:extLst>
+          </p:cNvPr>
+          <p:cNvSpPr txBox="1"/>
+          <p:nvPr/>
+        </p:nvSpPr>
+        <p:spPr>
+          <a:xfrm>
+            <a:off x="3953885" y="2110179"/>
+            <a:ext cx="886691" cy="369332"/>
+          </a:xfrm>
+          <a:prstGeom prst="rect">
+            <a:avLst/>
+          </a:prstGeom>
+          <a:noFill/>
+        </p:spPr>
+        <p:txBody>
+          <a:bodyPr wrap="square" rtlCol="0">
+            <a:spAutoFit/>
+          </a:bodyPr>
+          <a:lstStyle/>
+          <a:p>
+            <a:r>
+              <a:rPr lang="en-US" dirty="0">
+                <a:solidFill>
+                  <a:srgbClr val="FF0000"/>
+                </a:solidFill>
+              </a:rPr>
+              <a:t>&lt;card&gt;</a:t>
+            </a:r>
+          </a:p>
+        </p:txBody>
+      </p:sp>
+      <p:sp>
+        <p:nvSpPr>
+          <p:cNvPr id="27" name="TextBox 26">
+            <a:extLst>
+              <a:ext uri="{FF2B5EF4-FFF2-40B4-BE49-F238E27FC236}">
+                <a16:creationId xmlns:a16="http://schemas.microsoft.com/office/drawing/2014/main" id="{FAE34FBD-E89B-4EB9-AF0F-6ED52907CF4B}"/>
+              </a:ext>
+            </a:extLst>
+          </p:cNvPr>
+          <p:cNvSpPr txBox="1"/>
+          <p:nvPr/>
+        </p:nvSpPr>
+        <p:spPr>
+          <a:xfrm>
+            <a:off x="542875" y="2500271"/>
+            <a:ext cx="1359816" cy="369332"/>
+          </a:xfrm>
+          <a:prstGeom prst="rect">
+            <a:avLst/>
+          </a:prstGeom>
+          <a:noFill/>
+        </p:spPr>
+        <p:txBody>
+          <a:bodyPr wrap="square" rtlCol="0">
+            <a:spAutoFit/>
+          </a:bodyPr>
+          <a:lstStyle/>
+          <a:p>
+            <a:r>
+              <a:rPr lang="en-US" dirty="0"/>
+              <a:t>Categories[]</a:t>
+            </a:r>
+          </a:p>
+        </p:txBody>
+      </p:sp>
+      <p:sp>
+        <p:nvSpPr>
+          <p:cNvPr id="28" name="TextBox 27">
+            <a:extLst>
+              <a:ext uri="{FF2B5EF4-FFF2-40B4-BE49-F238E27FC236}">
+                <a16:creationId xmlns:a16="http://schemas.microsoft.com/office/drawing/2014/main" id="{32EF285A-A809-45F6-8DC1-5DC187776782}"/>
+              </a:ext>
+            </a:extLst>
+          </p:cNvPr>
+          <p:cNvSpPr txBox="1"/>
+          <p:nvPr/>
+        </p:nvSpPr>
+        <p:spPr>
+          <a:xfrm>
+            <a:off x="3749966" y="2600786"/>
+            <a:ext cx="1481051" cy="369332"/>
+          </a:xfrm>
+          <a:prstGeom prst="rect">
+            <a:avLst/>
+          </a:prstGeom>
+          <a:noFill/>
+        </p:spPr>
+        <p:txBody>
+          <a:bodyPr wrap="square" rtlCol="0">
+            <a:spAutoFit/>
+          </a:bodyPr>
+          <a:lstStyle/>
+          <a:p>
+            <a:r>
+              <a:rPr lang="en-US" dirty="0"/>
+              <a:t>Categories[]</a:t>
+            </a:r>
+          </a:p>
+        </p:txBody>
+      </p:sp>
+      <p:sp>
+        <p:nvSpPr>
+          <p:cNvPr id="29" name="Arrow: Right 28">
+            <a:extLst>
+              <a:ext uri="{FF2B5EF4-FFF2-40B4-BE49-F238E27FC236}">
+                <a16:creationId xmlns:a16="http://schemas.microsoft.com/office/drawing/2014/main" id="{DD57213F-B742-40AD-9770-13AFDD5DA8ED}"/>
+              </a:ext>
+            </a:extLst>
+          </p:cNvPr>
+          <p:cNvSpPr/>
+          <p:nvPr/>
+        </p:nvSpPr>
+        <p:spPr>
+          <a:xfrm>
+            <a:off x="2159874" y="2401499"/>
+            <a:ext cx="1226637" cy="468104"/>
+          </a:xfrm>
+          <a:prstGeom prst="rightArrow">
+            <a:avLst/>
+          </a:prstGeom>
+          <a:solidFill>
+            <a:schemeClr val="accent6"/>
+          </a:solidFill>
+        </p:spPr>
+        <p:style>
+          <a:lnRef idx="2">
+            <a:schemeClr val="accent6"/>
+          </a:lnRef>
+          <a:fillRef idx="1">
+            <a:schemeClr val="lt1"/>
+          </a:fillRef>
+          <a:effectRef idx="0">
+            <a:schemeClr val="accent6"/>
+          </a:effectRef>
+          <a:fontRef idx="minor">
+            <a:schemeClr val="dk1"/>
+          </a:fontRef>
+        </p:style>
+        <p:txBody>
+          <a:bodyPr rtlCol="0" anchor="ctr"/>
+          <a:lstStyle/>
+          <a:p>
+            <a:pPr algn="ctr"/>
+            <a:endParaRPr lang="en-US"/>
+          </a:p>
+        </p:txBody>
+      </p:sp>
+      <p:sp>
+        <p:nvSpPr>
+          <p:cNvPr id="30" name="TextBox 29">
+            <a:extLst>
+              <a:ext uri="{FF2B5EF4-FFF2-40B4-BE49-F238E27FC236}">
+                <a16:creationId xmlns:a16="http://schemas.microsoft.com/office/drawing/2014/main" id="{725089A0-F26A-4671-9CD9-49DD981FA95F}"/>
+              </a:ext>
+            </a:extLst>
+          </p:cNvPr>
+          <p:cNvSpPr txBox="1"/>
+          <p:nvPr/>
+        </p:nvSpPr>
+        <p:spPr>
+          <a:xfrm flipH="1">
+            <a:off x="2194955" y="2216832"/>
+            <a:ext cx="896424" cy="369332"/>
+          </a:xfrm>
+          <a:prstGeom prst="rect">
+            <a:avLst/>
+          </a:prstGeom>
+          <a:noFill/>
+        </p:spPr>
+        <p:txBody>
+          <a:bodyPr wrap="square" rtlCol="0">
+            <a:spAutoFit/>
+          </a:bodyPr>
+          <a:lstStyle/>
+          <a:p>
+            <a:r>
+              <a:rPr lang="en-US" dirty="0">
+                <a:solidFill>
+                  <a:schemeClr val="accent6"/>
+                </a:solidFill>
+              </a:rPr>
+              <a:t>PROPS</a:t>
+            </a:r>
+          </a:p>
+        </p:txBody>
+      </p:sp>
+      <p:sp>
+        <p:nvSpPr>
+          <p:cNvPr id="32" name="TextBox 31">
+            <a:extLst>
+              <a:ext uri="{FF2B5EF4-FFF2-40B4-BE49-F238E27FC236}">
+                <a16:creationId xmlns:a16="http://schemas.microsoft.com/office/drawing/2014/main" id="{6A61A605-096E-4CCD-84F8-FB60C8CCFBB9}"/>
+              </a:ext>
+            </a:extLst>
+          </p:cNvPr>
+          <p:cNvSpPr txBox="1"/>
+          <p:nvPr/>
+        </p:nvSpPr>
+        <p:spPr>
+          <a:xfrm>
+            <a:off x="2062780" y="2757129"/>
+            <a:ext cx="1420823" cy="369332"/>
+          </a:xfrm>
+          <a:prstGeom prst="rect">
+            <a:avLst/>
+          </a:prstGeom>
+          <a:noFill/>
+        </p:spPr>
+        <p:txBody>
+          <a:bodyPr wrap="square" rtlCol="0">
+            <a:spAutoFit/>
+          </a:bodyPr>
+          <a:lstStyle/>
+          <a:p>
+            <a:r>
+              <a:rPr lang="en-US" dirty="0"/>
+              <a:t>Categories[]</a:t>
+            </a:r>
+          </a:p>
+        </p:txBody>
+      </p:sp>
+      <p:sp>
+        <p:nvSpPr>
+          <p:cNvPr id="33" name="TextBox 32">
+            <a:extLst>
+              <a:ext uri="{FF2B5EF4-FFF2-40B4-BE49-F238E27FC236}">
+                <a16:creationId xmlns:a16="http://schemas.microsoft.com/office/drawing/2014/main" id="{2B2144A2-C390-42E8-B53C-167C1232CA55}"/>
+              </a:ext>
+            </a:extLst>
+          </p:cNvPr>
+          <p:cNvSpPr txBox="1"/>
+          <p:nvPr/>
+        </p:nvSpPr>
+        <p:spPr>
+          <a:xfrm>
+            <a:off x="182735" y="3308420"/>
+            <a:ext cx="3218556" cy="369332"/>
+          </a:xfrm>
+          <a:prstGeom prst="rect">
+            <a:avLst/>
+          </a:prstGeom>
+          <a:noFill/>
+        </p:spPr>
+        <p:txBody>
+          <a:bodyPr wrap="square" rtlCol="0">
+            <a:spAutoFit/>
+          </a:bodyPr>
+          <a:lstStyle/>
+          <a:p>
+            <a:r>
+              <a:rPr lang="en-US" dirty="0"/>
+              <a:t>// </a:t>
+            </a:r>
+            <a:r>
+              <a:rPr lang="en-US" dirty="0">
+                <a:solidFill>
+                  <a:srgbClr val="FF0000"/>
+                </a:solidFill>
+              </a:rPr>
+              <a:t>app</a:t>
+            </a:r>
+            <a:r>
+              <a:rPr lang="en-US" dirty="0"/>
+              <a:t> send categories to </a:t>
+            </a:r>
+            <a:r>
+              <a:rPr lang="en-US" dirty="0">
+                <a:solidFill>
+                  <a:srgbClr val="FF0000"/>
+                </a:solidFill>
+              </a:rPr>
+              <a:t>card</a:t>
+            </a:r>
+          </a:p>
+        </p:txBody>
+      </p:sp>
+      <p:sp>
+        <p:nvSpPr>
+          <p:cNvPr id="34" name="Rounded Rectangle 8">
+            <a:extLst>
+              <a:ext uri="{FF2B5EF4-FFF2-40B4-BE49-F238E27FC236}">
+                <a16:creationId xmlns:a16="http://schemas.microsoft.com/office/drawing/2014/main" id="{8A92D749-30EC-4FE0-9CD8-8A537E21DDE2}"/>
+              </a:ext>
+            </a:extLst>
+          </p:cNvPr>
+          <p:cNvSpPr/>
+          <p:nvPr/>
+        </p:nvSpPr>
+        <p:spPr>
+          <a:xfrm>
+            <a:off x="4397230" y="4081372"/>
+            <a:ext cx="1650319" cy="1166483"/>
+          </a:xfrm>
+          <a:prstGeom prst="roundRect">
+            <a:avLst/>
+          </a:prstGeom>
+          <a:noFill/>
+          <a:ln>
+            <a:solidFill>
+              <a:srgbClr val="FF0000"/>
+            </a:solidFill>
+            <a:prstDash val="lgDash"/>
+          </a:ln>
+        </p:spPr>
+        <p:style>
+          <a:lnRef idx="2">
+            <a:schemeClr val="accent1">
+              <a:shade val="50000"/>
+            </a:schemeClr>
+          </a:lnRef>
+          <a:fillRef idx="1">
+            <a:schemeClr val="accent1"/>
+          </a:fillRef>
+          <a:effectRef idx="0">
+            <a:schemeClr val="accent1"/>
+          </a:effectRef>
+          <a:fontRef idx="minor">
+            <a:schemeClr val="lt1"/>
+          </a:fontRef>
+        </p:style>
+        <p:txBody>
+          <a:bodyPr rtlCol="0" anchor="ctr"/>
+          <a:lstStyle/>
+          <a:p>
+            <a:pPr algn="ctr"/>
+            <a:endParaRPr lang="en-US" sz="1372"/>
+          </a:p>
+        </p:txBody>
+      </p:sp>
+      <p:sp>
+        <p:nvSpPr>
+          <p:cNvPr id="35" name="TextBox 34">
+            <a:extLst>
+              <a:ext uri="{FF2B5EF4-FFF2-40B4-BE49-F238E27FC236}">
+                <a16:creationId xmlns:a16="http://schemas.microsoft.com/office/drawing/2014/main" id="{CFBDA9E6-D873-43CC-B01A-058B5AD74B92}"/>
+              </a:ext>
+            </a:extLst>
+          </p:cNvPr>
+          <p:cNvSpPr txBox="1"/>
+          <p:nvPr/>
+        </p:nvSpPr>
+        <p:spPr>
+          <a:xfrm>
+            <a:off x="1602427" y="4211673"/>
+            <a:ext cx="1206187" cy="369332"/>
+          </a:xfrm>
+          <a:prstGeom prst="rect">
+            <a:avLst/>
+          </a:prstGeom>
+          <a:noFill/>
+        </p:spPr>
+        <p:txBody>
+          <a:bodyPr wrap="square" rtlCol="0">
+            <a:spAutoFit/>
+          </a:bodyPr>
+          <a:lstStyle/>
+          <a:p>
+            <a:r>
+              <a:rPr lang="en-US" dirty="0">
+                <a:solidFill>
+                  <a:srgbClr val="FF0000"/>
+                </a:solidFill>
+              </a:rPr>
+              <a:t>&lt;parent&gt;</a:t>
+            </a:r>
+          </a:p>
+        </p:txBody>
+      </p:sp>
+      <p:sp>
+        <p:nvSpPr>
+          <p:cNvPr id="37" name="TextBox 36">
+            <a:extLst>
+              <a:ext uri="{FF2B5EF4-FFF2-40B4-BE49-F238E27FC236}">
+                <a16:creationId xmlns:a16="http://schemas.microsoft.com/office/drawing/2014/main" id="{A82121FB-22A2-45B6-ADB9-476B11EF5F5F}"/>
+              </a:ext>
+            </a:extLst>
+          </p:cNvPr>
+          <p:cNvSpPr txBox="1"/>
+          <p:nvPr/>
+        </p:nvSpPr>
+        <p:spPr>
+          <a:xfrm>
+            <a:off x="4520931" y="4616370"/>
+            <a:ext cx="1443944" cy="369332"/>
+          </a:xfrm>
+          <a:prstGeom prst="rect">
+            <a:avLst/>
+          </a:prstGeom>
+          <a:noFill/>
+        </p:spPr>
+        <p:txBody>
+          <a:bodyPr wrap="square" rtlCol="0">
+            <a:spAutoFit/>
+          </a:bodyPr>
+          <a:lstStyle/>
+          <a:p>
+            <a:r>
+              <a:rPr lang="en-US" dirty="0"/>
+              <a:t>Categories[]</a:t>
+            </a:r>
+          </a:p>
+        </p:txBody>
+      </p:sp>
+      <p:sp>
+        <p:nvSpPr>
+          <p:cNvPr id="38" name="Rounded Rectangle 8">
+            <a:extLst>
+              <a:ext uri="{FF2B5EF4-FFF2-40B4-BE49-F238E27FC236}">
+                <a16:creationId xmlns:a16="http://schemas.microsoft.com/office/drawing/2014/main" id="{60962F6B-4693-4DD4-9347-F43E43B399D3}"/>
+              </a:ext>
+            </a:extLst>
+          </p:cNvPr>
+          <p:cNvSpPr/>
+          <p:nvPr/>
+        </p:nvSpPr>
+        <p:spPr>
+          <a:xfrm>
+            <a:off x="1361253" y="4156697"/>
+            <a:ext cx="1650319" cy="1166483"/>
+          </a:xfrm>
+          <a:prstGeom prst="roundRect">
+            <a:avLst/>
+          </a:prstGeom>
+          <a:noFill/>
+          <a:ln>
+            <a:solidFill>
+              <a:srgbClr val="FF0000"/>
+            </a:solidFill>
+            <a:prstDash val="lgDash"/>
+          </a:ln>
+        </p:spPr>
+        <p:style>
+          <a:lnRef idx="2">
+            <a:schemeClr val="accent1">
+              <a:shade val="50000"/>
+            </a:schemeClr>
+          </a:lnRef>
+          <a:fillRef idx="1">
+            <a:schemeClr val="accent1"/>
+          </a:fillRef>
+          <a:effectRef idx="0">
+            <a:schemeClr val="accent1"/>
+          </a:effectRef>
+          <a:fontRef idx="minor">
+            <a:schemeClr val="lt1"/>
+          </a:fontRef>
+        </p:style>
+        <p:txBody>
+          <a:bodyPr rtlCol="0" anchor="ctr"/>
+          <a:lstStyle/>
+          <a:p>
+            <a:pPr algn="ctr"/>
+            <a:endParaRPr lang="en-US" sz="1372"/>
+          </a:p>
+        </p:txBody>
+      </p:sp>
+      <p:sp>
+        <p:nvSpPr>
+          <p:cNvPr id="40" name="TextBox 39">
+            <a:extLst>
+              <a:ext uri="{FF2B5EF4-FFF2-40B4-BE49-F238E27FC236}">
+                <a16:creationId xmlns:a16="http://schemas.microsoft.com/office/drawing/2014/main" id="{C888992C-926B-484D-A6D3-EE332E6E4D51}"/>
+              </a:ext>
+            </a:extLst>
+          </p:cNvPr>
+          <p:cNvSpPr txBox="1"/>
+          <p:nvPr/>
+        </p:nvSpPr>
+        <p:spPr>
+          <a:xfrm>
+            <a:off x="44733" y="6097103"/>
+            <a:ext cx="4245926" cy="369332"/>
+          </a:xfrm>
+          <a:prstGeom prst="rect">
+            <a:avLst/>
+          </a:prstGeom>
+          <a:noFill/>
+        </p:spPr>
+        <p:txBody>
+          <a:bodyPr wrap="square" rtlCol="0">
+            <a:spAutoFit/>
+          </a:bodyPr>
+          <a:lstStyle/>
+          <a:p>
+            <a:r>
+              <a:rPr lang="en-US" dirty="0"/>
+              <a:t>// </a:t>
+            </a:r>
+            <a:r>
+              <a:rPr lang="en-US" dirty="0">
+                <a:solidFill>
+                  <a:srgbClr val="FF0000"/>
+                </a:solidFill>
+              </a:rPr>
+              <a:t>from</a:t>
+            </a:r>
+            <a:r>
+              <a:rPr lang="en-US" dirty="0"/>
+              <a:t> send the event validate to </a:t>
+            </a:r>
+            <a:r>
+              <a:rPr lang="en-US" dirty="0">
+                <a:solidFill>
+                  <a:srgbClr val="FF0000"/>
+                </a:solidFill>
+              </a:rPr>
+              <a:t>parent</a:t>
+            </a:r>
+          </a:p>
+        </p:txBody>
+      </p:sp>
+      <p:sp>
+        <p:nvSpPr>
+          <p:cNvPr id="41" name="Rounded Rectangle 8">
+            <a:extLst>
+              <a:ext uri="{FF2B5EF4-FFF2-40B4-BE49-F238E27FC236}">
+                <a16:creationId xmlns:a16="http://schemas.microsoft.com/office/drawing/2014/main" id="{D7B2ABD4-C2B5-49F2-9E1B-AB510272B1FA}"/>
+              </a:ext>
+            </a:extLst>
+          </p:cNvPr>
+          <p:cNvSpPr/>
+          <p:nvPr/>
+        </p:nvSpPr>
+        <p:spPr>
+          <a:xfrm>
+            <a:off x="6912758" y="817654"/>
+            <a:ext cx="1650319" cy="1166483"/>
+          </a:xfrm>
+          <a:prstGeom prst="roundRect">
+            <a:avLst/>
+          </a:prstGeom>
+          <a:noFill/>
+          <a:ln>
+            <a:solidFill>
+              <a:srgbClr val="FF0000"/>
+            </a:solidFill>
+            <a:prstDash val="lgDash"/>
+          </a:ln>
+        </p:spPr>
+        <p:style>
+          <a:lnRef idx="2">
+            <a:schemeClr val="accent1">
+              <a:shade val="50000"/>
+            </a:schemeClr>
+          </a:lnRef>
+          <a:fillRef idx="1">
+            <a:schemeClr val="accent1"/>
+          </a:fillRef>
+          <a:effectRef idx="0">
+            <a:schemeClr val="accent1"/>
+          </a:effectRef>
+          <a:fontRef idx="minor">
+            <a:schemeClr val="lt1"/>
+          </a:fontRef>
+        </p:style>
+        <p:txBody>
+          <a:bodyPr rtlCol="0" anchor="ctr"/>
+          <a:lstStyle/>
+          <a:p>
+            <a:pPr algn="ctr"/>
+            <a:endParaRPr lang="en-US" sz="1372"/>
+          </a:p>
+        </p:txBody>
+      </p:sp>
+      <p:sp>
+        <p:nvSpPr>
+          <p:cNvPr id="42" name="TextBox 41">
+            <a:extLst>
+              <a:ext uri="{FF2B5EF4-FFF2-40B4-BE49-F238E27FC236}">
+                <a16:creationId xmlns:a16="http://schemas.microsoft.com/office/drawing/2014/main" id="{9D1910DE-98A3-4A84-A4D7-3EBFADAF00B1}"/>
+              </a:ext>
+            </a:extLst>
+          </p:cNvPr>
+          <p:cNvSpPr txBox="1"/>
+          <p:nvPr/>
+        </p:nvSpPr>
+        <p:spPr>
+          <a:xfrm flipH="1">
+            <a:off x="7217852" y="882102"/>
+            <a:ext cx="1040131" cy="369332"/>
+          </a:xfrm>
+          <a:prstGeom prst="rect">
+            <a:avLst/>
+          </a:prstGeom>
+          <a:noFill/>
+        </p:spPr>
+        <p:txBody>
+          <a:bodyPr wrap="square" rtlCol="0">
+            <a:spAutoFit/>
+          </a:bodyPr>
+          <a:lstStyle/>
+          <a:p>
+            <a:r>
+              <a:rPr lang="en-US" dirty="0">
+                <a:solidFill>
+                  <a:srgbClr val="FF0000"/>
+                </a:solidFill>
+              </a:rPr>
+              <a:t>&lt;app&gt;</a:t>
+            </a:r>
+          </a:p>
+        </p:txBody>
+      </p:sp>
+      <p:sp>
+        <p:nvSpPr>
+          <p:cNvPr id="43" name="TextBox 42">
+            <a:extLst>
+              <a:ext uri="{FF2B5EF4-FFF2-40B4-BE49-F238E27FC236}">
+                <a16:creationId xmlns:a16="http://schemas.microsoft.com/office/drawing/2014/main" id="{8CAE0832-9E22-4DD5-97EF-3663DB291150}"/>
+              </a:ext>
+            </a:extLst>
+          </p:cNvPr>
+          <p:cNvSpPr txBox="1"/>
+          <p:nvPr/>
+        </p:nvSpPr>
+        <p:spPr>
+          <a:xfrm>
+            <a:off x="7140907" y="1350154"/>
+            <a:ext cx="1422169" cy="369332"/>
+          </a:xfrm>
+          <a:prstGeom prst="rect">
+            <a:avLst/>
+          </a:prstGeom>
+          <a:noFill/>
+        </p:spPr>
+        <p:txBody>
+          <a:bodyPr wrap="square" rtlCol="0">
+            <a:spAutoFit/>
+          </a:bodyPr>
+          <a:lstStyle/>
+          <a:p>
+            <a:r>
+              <a:rPr lang="en-US" dirty="0"/>
+              <a:t>Categories[]</a:t>
+            </a:r>
+          </a:p>
+        </p:txBody>
+      </p:sp>
+      <p:sp>
+        <p:nvSpPr>
+          <p:cNvPr id="44" name="Arrow: Right 43">
+            <a:extLst>
+              <a:ext uri="{FF2B5EF4-FFF2-40B4-BE49-F238E27FC236}">
+                <a16:creationId xmlns:a16="http://schemas.microsoft.com/office/drawing/2014/main" id="{C4BB6547-6200-46D3-8CED-257F31E55875}"/>
+              </a:ext>
+            </a:extLst>
+          </p:cNvPr>
+          <p:cNvSpPr/>
+          <p:nvPr/>
+        </p:nvSpPr>
+        <p:spPr>
+          <a:xfrm>
+            <a:off x="8563076" y="1152221"/>
+            <a:ext cx="752475" cy="497347"/>
+          </a:xfrm>
+          <a:prstGeom prst="rightArrow">
+            <a:avLst/>
+          </a:prstGeom>
+          <a:solidFill>
+            <a:srgbClr val="FFFF00"/>
+          </a:solidFill>
+        </p:spPr>
+        <p:style>
+          <a:lnRef idx="2">
+            <a:schemeClr val="accent1">
+              <a:shade val="50000"/>
+            </a:schemeClr>
+          </a:lnRef>
+          <a:fillRef idx="1">
+            <a:schemeClr val="accent1"/>
+          </a:fillRef>
+          <a:effectRef idx="0">
+            <a:schemeClr val="accent1"/>
+          </a:effectRef>
+          <a:fontRef idx="minor">
+            <a:schemeClr val="lt1"/>
+          </a:fontRef>
+        </p:style>
+        <p:txBody>
+          <a:bodyPr rtlCol="0" anchor="ctr"/>
+          <a:lstStyle/>
+          <a:p>
+            <a:pPr algn="ctr"/>
+            <a:endParaRPr lang="en-US"/>
+          </a:p>
+        </p:txBody>
+      </p:sp>
+      <p:sp>
+        <p:nvSpPr>
+          <p:cNvPr id="45" name="TextBox 44">
+            <a:extLst>
+              <a:ext uri="{FF2B5EF4-FFF2-40B4-BE49-F238E27FC236}">
+                <a16:creationId xmlns:a16="http://schemas.microsoft.com/office/drawing/2014/main" id="{91CA38C8-0131-4EE7-A63E-18BC4294039D}"/>
+              </a:ext>
+            </a:extLst>
+          </p:cNvPr>
+          <p:cNvSpPr txBox="1"/>
+          <p:nvPr/>
+        </p:nvSpPr>
+        <p:spPr>
+          <a:xfrm>
+            <a:off x="8496401" y="913394"/>
+            <a:ext cx="1084084" cy="369332"/>
+          </a:xfrm>
+          <a:prstGeom prst="rect">
+            <a:avLst/>
+          </a:prstGeom>
+          <a:noFill/>
+        </p:spPr>
+        <p:txBody>
+          <a:bodyPr wrap="square" rtlCol="0">
+            <a:spAutoFit/>
+          </a:bodyPr>
+          <a:lstStyle/>
+          <a:p>
+            <a:r>
+              <a:rPr lang="en-US" dirty="0">
+                <a:solidFill>
+                  <a:srgbClr val="FFC000"/>
+                </a:solidFill>
+              </a:rPr>
+              <a:t>PROVIDE</a:t>
+            </a:r>
+          </a:p>
+        </p:txBody>
+      </p:sp>
+      <p:sp>
+        <p:nvSpPr>
+          <p:cNvPr id="46" name="TextBox 45">
+            <a:extLst>
+              <a:ext uri="{FF2B5EF4-FFF2-40B4-BE49-F238E27FC236}">
+                <a16:creationId xmlns:a16="http://schemas.microsoft.com/office/drawing/2014/main" id="{C7A6654D-3FF9-4159-B89F-8F453D822911}"/>
+              </a:ext>
+            </a:extLst>
+          </p:cNvPr>
+          <p:cNvSpPr txBox="1"/>
+          <p:nvPr/>
+        </p:nvSpPr>
+        <p:spPr>
+          <a:xfrm>
+            <a:off x="8538309" y="1562334"/>
+            <a:ext cx="1371593" cy="369332"/>
+          </a:xfrm>
+          <a:prstGeom prst="rect">
+            <a:avLst/>
+          </a:prstGeom>
+          <a:noFill/>
+        </p:spPr>
+        <p:txBody>
+          <a:bodyPr wrap="square" rtlCol="0">
+            <a:spAutoFit/>
+          </a:bodyPr>
+          <a:lstStyle/>
+          <a:p>
+            <a:r>
+              <a:rPr lang="en-US" dirty="0"/>
+              <a:t>Categories[]</a:t>
+            </a:r>
+          </a:p>
+        </p:txBody>
+      </p:sp>
+      <p:sp>
+        <p:nvSpPr>
+          <p:cNvPr id="47" name="TextBox 46">
+            <a:extLst>
+              <a:ext uri="{FF2B5EF4-FFF2-40B4-BE49-F238E27FC236}">
+                <a16:creationId xmlns:a16="http://schemas.microsoft.com/office/drawing/2014/main" id="{5324E605-55C5-4DD0-97E0-59F122DF06DB}"/>
+              </a:ext>
+            </a:extLst>
+          </p:cNvPr>
+          <p:cNvSpPr txBox="1"/>
+          <p:nvPr/>
+        </p:nvSpPr>
+        <p:spPr>
+          <a:xfrm flipH="1">
+            <a:off x="6685082" y="2194236"/>
+            <a:ext cx="3893580" cy="369332"/>
+          </a:xfrm>
+          <a:prstGeom prst="rect">
+            <a:avLst/>
+          </a:prstGeom>
+          <a:noFill/>
+        </p:spPr>
+        <p:txBody>
+          <a:bodyPr wrap="square" rtlCol="0">
+            <a:spAutoFit/>
+          </a:bodyPr>
+          <a:lstStyle/>
+          <a:p>
+            <a:r>
+              <a:rPr lang="en-US" dirty="0"/>
+              <a:t>// </a:t>
+            </a:r>
+            <a:r>
+              <a:rPr lang="en-US" dirty="0">
+                <a:solidFill>
+                  <a:srgbClr val="FF0000"/>
+                </a:solidFill>
+              </a:rPr>
+              <a:t>app</a:t>
+            </a:r>
+            <a:r>
+              <a:rPr lang="en-US" dirty="0"/>
+              <a:t> provides categories to anymore</a:t>
+            </a:r>
+          </a:p>
+        </p:txBody>
+      </p:sp>
+      <p:sp>
+        <p:nvSpPr>
+          <p:cNvPr id="48" name="Rounded Rectangle 8">
+            <a:extLst>
+              <a:ext uri="{FF2B5EF4-FFF2-40B4-BE49-F238E27FC236}">
+                <a16:creationId xmlns:a16="http://schemas.microsoft.com/office/drawing/2014/main" id="{821C2FD5-7828-4F9E-A388-4A98C31CCA96}"/>
+              </a:ext>
+            </a:extLst>
+          </p:cNvPr>
+          <p:cNvSpPr/>
+          <p:nvPr/>
+        </p:nvSpPr>
+        <p:spPr>
+          <a:xfrm>
+            <a:off x="7976928" y="3002674"/>
+            <a:ext cx="1650319" cy="1166483"/>
+          </a:xfrm>
+          <a:prstGeom prst="roundRect">
+            <a:avLst/>
+          </a:prstGeom>
+          <a:noFill/>
+          <a:ln>
+            <a:solidFill>
+              <a:srgbClr val="FF0000"/>
+            </a:solidFill>
+            <a:prstDash val="lgDash"/>
+          </a:ln>
+        </p:spPr>
+        <p:style>
+          <a:lnRef idx="2">
+            <a:schemeClr val="accent1">
+              <a:shade val="50000"/>
+            </a:schemeClr>
+          </a:lnRef>
+          <a:fillRef idx="1">
+            <a:schemeClr val="accent1"/>
+          </a:fillRef>
+          <a:effectRef idx="0">
+            <a:schemeClr val="accent1"/>
+          </a:effectRef>
+          <a:fontRef idx="minor">
+            <a:schemeClr val="lt1"/>
+          </a:fontRef>
+        </p:style>
+        <p:txBody>
+          <a:bodyPr rtlCol="0" anchor="ctr"/>
+          <a:lstStyle/>
+          <a:p>
+            <a:pPr algn="ctr"/>
+            <a:endParaRPr lang="en-US" sz="1372"/>
+          </a:p>
+        </p:txBody>
+      </p:sp>
+      <p:sp>
+        <p:nvSpPr>
+          <p:cNvPr id="49" name="Arrow: Right 48">
+            <a:extLst>
+              <a:ext uri="{FF2B5EF4-FFF2-40B4-BE49-F238E27FC236}">
+                <a16:creationId xmlns:a16="http://schemas.microsoft.com/office/drawing/2014/main" id="{DDB1DDD8-90D8-4424-838C-0EF5DE7972AA}"/>
+              </a:ext>
+            </a:extLst>
+          </p:cNvPr>
+          <p:cNvSpPr/>
+          <p:nvPr/>
+        </p:nvSpPr>
+        <p:spPr>
+          <a:xfrm>
+            <a:off x="7215091" y="3301260"/>
+            <a:ext cx="752475" cy="497347"/>
+          </a:xfrm>
+          <a:prstGeom prst="rightArrow">
+            <a:avLst/>
+          </a:prstGeom>
+          <a:solidFill>
+            <a:srgbClr val="FFFF00"/>
+          </a:solidFill>
+        </p:spPr>
+        <p:style>
+          <a:lnRef idx="2">
+            <a:schemeClr val="accent1">
+              <a:shade val="50000"/>
+            </a:schemeClr>
+          </a:lnRef>
+          <a:fillRef idx="1">
+            <a:schemeClr val="accent1"/>
+          </a:fillRef>
+          <a:effectRef idx="0">
+            <a:schemeClr val="accent1"/>
+          </a:effectRef>
+          <a:fontRef idx="minor">
+            <a:schemeClr val="lt1"/>
+          </a:fontRef>
+        </p:style>
+        <p:txBody>
+          <a:bodyPr rtlCol="0" anchor="ctr"/>
+          <a:lstStyle/>
+          <a:p>
+            <a:pPr algn="ctr"/>
+            <a:endParaRPr lang="en-US"/>
+          </a:p>
+        </p:txBody>
+      </p:sp>
+      <p:sp>
+        <p:nvSpPr>
+          <p:cNvPr id="50" name="TextBox 49">
+            <a:extLst>
+              <a:ext uri="{FF2B5EF4-FFF2-40B4-BE49-F238E27FC236}">
+                <a16:creationId xmlns:a16="http://schemas.microsoft.com/office/drawing/2014/main" id="{3550B5EE-6A95-42F2-8F39-1B658DC1A4EE}"/>
+              </a:ext>
+            </a:extLst>
+          </p:cNvPr>
+          <p:cNvSpPr txBox="1"/>
+          <p:nvPr/>
+        </p:nvSpPr>
+        <p:spPr>
+          <a:xfrm flipH="1">
+            <a:off x="7176791" y="3024302"/>
+            <a:ext cx="752474" cy="369332"/>
+          </a:xfrm>
+          <a:prstGeom prst="rect">
+            <a:avLst/>
+          </a:prstGeom>
+          <a:noFill/>
+        </p:spPr>
+        <p:txBody>
+          <a:bodyPr wrap="square" rtlCol="0">
+            <a:spAutoFit/>
+          </a:bodyPr>
+          <a:lstStyle/>
+          <a:p>
+            <a:r>
+              <a:rPr lang="en-US" dirty="0">
+                <a:solidFill>
+                  <a:srgbClr val="FFC000"/>
+                </a:solidFill>
+              </a:rPr>
+              <a:t>INECT</a:t>
+            </a:r>
+          </a:p>
+        </p:txBody>
+      </p:sp>
+      <p:sp>
+        <p:nvSpPr>
+          <p:cNvPr id="51" name="TextBox 50">
+            <a:extLst>
+              <a:ext uri="{FF2B5EF4-FFF2-40B4-BE49-F238E27FC236}">
+                <a16:creationId xmlns:a16="http://schemas.microsoft.com/office/drawing/2014/main" id="{C1956E4C-491D-485B-B70A-F87E8F7367B6}"/>
+              </a:ext>
+            </a:extLst>
+          </p:cNvPr>
+          <p:cNvSpPr txBox="1"/>
+          <p:nvPr/>
+        </p:nvSpPr>
+        <p:spPr>
+          <a:xfrm>
+            <a:off x="8316167" y="3100106"/>
+            <a:ext cx="1021081" cy="369332"/>
+          </a:xfrm>
+          <a:prstGeom prst="rect">
+            <a:avLst/>
+          </a:prstGeom>
+          <a:noFill/>
+        </p:spPr>
+        <p:txBody>
+          <a:bodyPr wrap="square" rtlCol="0">
+            <a:spAutoFit/>
+          </a:bodyPr>
+          <a:lstStyle/>
+          <a:p>
+            <a:r>
+              <a:rPr lang="en-US" dirty="0">
+                <a:solidFill>
+                  <a:srgbClr val="FF0000"/>
+                </a:solidFill>
+              </a:rPr>
+              <a:t>&lt;dialog&gt;</a:t>
+            </a:r>
+          </a:p>
+        </p:txBody>
+      </p:sp>
+      <p:sp>
+        <p:nvSpPr>
+          <p:cNvPr id="52" name="TextBox 51">
+            <a:extLst>
+              <a:ext uri="{FF2B5EF4-FFF2-40B4-BE49-F238E27FC236}">
+                <a16:creationId xmlns:a16="http://schemas.microsoft.com/office/drawing/2014/main" id="{39DA48CB-7815-428F-AEF5-A47C25D5C3E9}"/>
+              </a:ext>
+            </a:extLst>
+          </p:cNvPr>
+          <p:cNvSpPr txBox="1"/>
+          <p:nvPr/>
+        </p:nvSpPr>
+        <p:spPr>
+          <a:xfrm>
+            <a:off x="6629067" y="3677752"/>
+            <a:ext cx="1371593" cy="369332"/>
+          </a:xfrm>
+          <a:prstGeom prst="rect">
+            <a:avLst/>
+          </a:prstGeom>
+          <a:noFill/>
+        </p:spPr>
+        <p:txBody>
+          <a:bodyPr wrap="square" rtlCol="0">
+            <a:spAutoFit/>
+          </a:bodyPr>
+          <a:lstStyle/>
+          <a:p>
+            <a:r>
+              <a:rPr lang="en-US" dirty="0"/>
+              <a:t>Categories[]</a:t>
+            </a:r>
+          </a:p>
+        </p:txBody>
+      </p:sp>
+      <p:sp>
+        <p:nvSpPr>
+          <p:cNvPr id="53" name="TextBox 52">
+            <a:extLst>
+              <a:ext uri="{FF2B5EF4-FFF2-40B4-BE49-F238E27FC236}">
+                <a16:creationId xmlns:a16="http://schemas.microsoft.com/office/drawing/2014/main" id="{C7CB7237-52B7-4AB9-9F81-FEEDE78D0B7D}"/>
+              </a:ext>
+            </a:extLst>
+          </p:cNvPr>
+          <p:cNvSpPr txBox="1"/>
+          <p:nvPr/>
+        </p:nvSpPr>
+        <p:spPr>
+          <a:xfrm>
+            <a:off x="8257983" y="3566870"/>
+            <a:ext cx="1317241" cy="369332"/>
+          </a:xfrm>
+          <a:prstGeom prst="rect">
+            <a:avLst/>
+          </a:prstGeom>
+          <a:noFill/>
+        </p:spPr>
+        <p:txBody>
+          <a:bodyPr wrap="square" rtlCol="0">
+            <a:spAutoFit/>
+          </a:bodyPr>
+          <a:lstStyle/>
+          <a:p>
+            <a:r>
+              <a:rPr lang="en-US" dirty="0"/>
+              <a:t>Categories</a:t>
+            </a:r>
+          </a:p>
+        </p:txBody>
+      </p:sp>
+      <p:sp>
+        <p:nvSpPr>
+          <p:cNvPr id="54" name="TextBox 53">
+            <a:extLst>
+              <a:ext uri="{FF2B5EF4-FFF2-40B4-BE49-F238E27FC236}">
+                <a16:creationId xmlns:a16="http://schemas.microsoft.com/office/drawing/2014/main" id="{AA0A417B-FD03-421E-B2AB-D0B1EB70E6C1}"/>
+              </a:ext>
+            </a:extLst>
+          </p:cNvPr>
+          <p:cNvSpPr txBox="1"/>
+          <p:nvPr/>
+        </p:nvSpPr>
+        <p:spPr>
+          <a:xfrm>
+            <a:off x="9758978" y="3469438"/>
+            <a:ext cx="2499697" cy="646331"/>
+          </a:xfrm>
+          <a:prstGeom prst="rect">
+            <a:avLst/>
+          </a:prstGeom>
+          <a:noFill/>
+        </p:spPr>
+        <p:txBody>
+          <a:bodyPr wrap="square" rtlCol="0">
+            <a:spAutoFit/>
+          </a:bodyPr>
+          <a:lstStyle/>
+          <a:p>
+            <a:r>
+              <a:rPr lang="en-US" dirty="0"/>
+              <a:t>// </a:t>
+            </a:r>
+            <a:r>
+              <a:rPr lang="en-US" dirty="0">
+                <a:solidFill>
+                  <a:srgbClr val="FF0000"/>
+                </a:solidFill>
+              </a:rPr>
+              <a:t>dialog</a:t>
+            </a:r>
+            <a:r>
+              <a:rPr lang="en-US" dirty="0"/>
+              <a:t> gets categories from a provider</a:t>
+            </a:r>
+          </a:p>
+        </p:txBody>
+      </p:sp>
+      <p:sp>
+        <p:nvSpPr>
+          <p:cNvPr id="56" name="Rounded Rectangle 48">
+            <a:extLst>
+              <a:ext uri="{FF2B5EF4-FFF2-40B4-BE49-F238E27FC236}">
+                <a16:creationId xmlns:a16="http://schemas.microsoft.com/office/drawing/2014/main" id="{80206CFD-DA2E-4FAE-9560-C68FCD308327}"/>
+              </a:ext>
+            </a:extLst>
+          </p:cNvPr>
+          <p:cNvSpPr/>
+          <p:nvPr/>
+        </p:nvSpPr>
+        <p:spPr>
+          <a:xfrm>
+            <a:off x="6656119" y="5507846"/>
+            <a:ext cx="1866945" cy="584334"/>
+          </a:xfrm>
+          <a:prstGeom prst="roundRect">
+            <a:avLst/>
+          </a:prstGeom>
+          <a:noFill/>
+          <a:ln>
+            <a:solidFill>
+              <a:srgbClr val="7030A0"/>
+            </a:solidFill>
+            <a:prstDash val="lgDash"/>
+          </a:ln>
+        </p:spPr>
+        <p:style>
+          <a:lnRef idx="2">
+            <a:schemeClr val="accent1">
+              <a:shade val="50000"/>
+            </a:schemeClr>
+          </a:lnRef>
+          <a:fillRef idx="1">
+            <a:schemeClr val="accent1"/>
+          </a:fillRef>
+          <a:effectRef idx="0">
+            <a:schemeClr val="accent1"/>
+          </a:effectRef>
+          <a:fontRef idx="minor">
+            <a:schemeClr val="lt1"/>
+          </a:fontRef>
+        </p:style>
+        <p:txBody>
+          <a:bodyPr rtlCol="0" anchor="ctr"/>
+          <a:lstStyle/>
+          <a:p>
+            <a:pPr algn="ctr"/>
+            <a:endParaRPr lang="en-US" sz="1372"/>
+          </a:p>
+        </p:txBody>
+      </p:sp>
+      <p:sp>
+        <p:nvSpPr>
+          <p:cNvPr id="58" name="TextBox 57">
+            <a:extLst>
+              <a:ext uri="{FF2B5EF4-FFF2-40B4-BE49-F238E27FC236}">
+                <a16:creationId xmlns:a16="http://schemas.microsoft.com/office/drawing/2014/main" id="{5E21D70E-E626-4479-97BA-F9578067ABBD}"/>
+              </a:ext>
+            </a:extLst>
+          </p:cNvPr>
+          <p:cNvSpPr txBox="1"/>
+          <p:nvPr/>
+        </p:nvSpPr>
+        <p:spPr>
+          <a:xfrm>
+            <a:off x="6716755" y="5616395"/>
+            <a:ext cx="1642217" cy="369332"/>
+          </a:xfrm>
+          <a:prstGeom prst="rect">
+            <a:avLst/>
+          </a:prstGeom>
+          <a:noFill/>
+        </p:spPr>
+        <p:txBody>
+          <a:bodyPr wrap="square">
+            <a:spAutoFit/>
+          </a:bodyPr>
+          <a:lstStyle/>
+          <a:p>
+            <a:r>
+              <a:rPr lang="en-US" sz="1800" b="1" i="1" dirty="0">
+                <a:solidFill>
+                  <a:srgbClr val="7030A0"/>
+                </a:solidFill>
+              </a:rPr>
+              <a:t>&lt;router-view&gt;</a:t>
+            </a:r>
+          </a:p>
+        </p:txBody>
+      </p:sp>
+      <p:sp>
+        <p:nvSpPr>
+          <p:cNvPr id="59" name="TextBox 58">
+            <a:extLst>
+              <a:ext uri="{FF2B5EF4-FFF2-40B4-BE49-F238E27FC236}">
+                <a16:creationId xmlns:a16="http://schemas.microsoft.com/office/drawing/2014/main" id="{0CAEFCDB-C39A-4943-980C-C113E3B5ECB5}"/>
+              </a:ext>
+            </a:extLst>
+          </p:cNvPr>
+          <p:cNvSpPr txBox="1"/>
+          <p:nvPr/>
+        </p:nvSpPr>
+        <p:spPr>
+          <a:xfrm>
+            <a:off x="6656118" y="6381750"/>
+            <a:ext cx="3102859" cy="369332"/>
+          </a:xfrm>
+          <a:prstGeom prst="rect">
+            <a:avLst/>
+          </a:prstGeom>
+          <a:noFill/>
+        </p:spPr>
+        <p:txBody>
+          <a:bodyPr wrap="square" rtlCol="0">
+            <a:spAutoFit/>
+          </a:bodyPr>
+          <a:lstStyle/>
+          <a:p>
+            <a:r>
+              <a:rPr lang="en-US" dirty="0"/>
+              <a:t>// Vue JS built-in component</a:t>
+            </a:r>
+          </a:p>
+        </p:txBody>
+      </p:sp>
+      <p:sp>
+        <p:nvSpPr>
+          <p:cNvPr id="60" name="TextBox 59">
+            <a:extLst>
+              <a:ext uri="{FF2B5EF4-FFF2-40B4-BE49-F238E27FC236}">
+                <a16:creationId xmlns:a16="http://schemas.microsoft.com/office/drawing/2014/main" id="{EAD7A033-9E88-41E3-B5F4-83A1644B6FFE}"/>
+              </a:ext>
+            </a:extLst>
+          </p:cNvPr>
+          <p:cNvSpPr txBox="1"/>
+          <p:nvPr/>
+        </p:nvSpPr>
+        <p:spPr>
+          <a:xfrm>
+            <a:off x="1512998" y="4820477"/>
+            <a:ext cx="1304925" cy="369332"/>
+          </a:xfrm>
+          <a:prstGeom prst="rect">
+            <a:avLst/>
+          </a:prstGeom>
+          <a:noFill/>
+        </p:spPr>
+        <p:txBody>
+          <a:bodyPr wrap="square" rtlCol="0">
+            <a:spAutoFit/>
+          </a:bodyPr>
+          <a:lstStyle/>
+          <a:p>
+            <a:r>
+              <a:rPr lang="en-US" dirty="0"/>
+              <a:t>Categories[]</a:t>
+            </a:r>
+          </a:p>
+        </p:txBody>
+      </p:sp>
+      <p:sp>
+        <p:nvSpPr>
+          <p:cNvPr id="61" name="TextBox 60">
+            <a:extLst>
+              <a:ext uri="{FF2B5EF4-FFF2-40B4-BE49-F238E27FC236}">
+                <a16:creationId xmlns:a16="http://schemas.microsoft.com/office/drawing/2014/main" id="{50618065-883F-4AE8-BC66-88E7AA8BF0E1}"/>
+              </a:ext>
+            </a:extLst>
+          </p:cNvPr>
+          <p:cNvSpPr txBox="1"/>
+          <p:nvPr/>
+        </p:nvSpPr>
+        <p:spPr>
+          <a:xfrm>
+            <a:off x="4779043" y="4138578"/>
+            <a:ext cx="886691" cy="369332"/>
+          </a:xfrm>
+          <a:prstGeom prst="rect">
+            <a:avLst/>
+          </a:prstGeom>
+          <a:noFill/>
+        </p:spPr>
+        <p:txBody>
+          <a:bodyPr wrap="square" rtlCol="0">
+            <a:spAutoFit/>
+          </a:bodyPr>
+          <a:lstStyle/>
+          <a:p>
+            <a:r>
+              <a:rPr lang="en-US" dirty="0">
+                <a:solidFill>
+                  <a:srgbClr val="FF0000"/>
+                </a:solidFill>
+              </a:rPr>
+              <a:t>&lt;from&gt;</a:t>
+            </a:r>
+          </a:p>
+        </p:txBody>
+      </p:sp>
+      <p:sp>
+        <p:nvSpPr>
+          <p:cNvPr id="63" name="TextBox 62">
+            <a:extLst>
+              <a:ext uri="{FF2B5EF4-FFF2-40B4-BE49-F238E27FC236}">
+                <a16:creationId xmlns:a16="http://schemas.microsoft.com/office/drawing/2014/main" id="{B71B7E5F-8508-42DA-9883-0DCC85660B9A}"/>
+              </a:ext>
+            </a:extLst>
+          </p:cNvPr>
+          <p:cNvSpPr txBox="1"/>
+          <p:nvPr/>
+        </p:nvSpPr>
+        <p:spPr>
+          <a:xfrm>
+            <a:off x="3731698" y="4169551"/>
+            <a:ext cx="1073346" cy="369332"/>
+          </a:xfrm>
+          <a:prstGeom prst="rect">
+            <a:avLst/>
+          </a:prstGeom>
+          <a:noFill/>
+        </p:spPr>
+        <p:txBody>
+          <a:bodyPr wrap="square">
+            <a:spAutoFit/>
+          </a:bodyPr>
+          <a:lstStyle/>
+          <a:p>
+            <a:r>
+              <a:rPr lang="en-US" sz="1800" b="1" dirty="0">
+                <a:solidFill>
+                  <a:srgbClr val="FF0000"/>
+                </a:solidFill>
+              </a:rPr>
+              <a:t>EMIT</a:t>
+            </a:r>
+          </a:p>
+        </p:txBody>
+      </p:sp>
+      <p:sp>
+        <p:nvSpPr>
+          <p:cNvPr id="64" name="Right Arrow 25">
+            <a:extLst>
+              <a:ext uri="{FF2B5EF4-FFF2-40B4-BE49-F238E27FC236}">
+                <a16:creationId xmlns:a16="http://schemas.microsoft.com/office/drawing/2014/main" id="{71E91C7D-1CF2-4863-8F18-59516C80593D}"/>
+              </a:ext>
+            </a:extLst>
+          </p:cNvPr>
+          <p:cNvSpPr/>
+          <p:nvPr/>
+        </p:nvSpPr>
+        <p:spPr>
+          <a:xfrm flipH="1">
+            <a:off x="3589709" y="4416349"/>
+            <a:ext cx="792424" cy="400041"/>
+          </a:xfrm>
+          <a:prstGeom prst="rightArrow">
+            <a:avLst/>
+          </a:prstGeom>
+          <a:solidFill>
+            <a:srgbClr val="FF0000"/>
+          </a:solidFill>
+        </p:spPr>
+        <p:style>
+          <a:lnRef idx="2">
+            <a:schemeClr val="accent1">
+              <a:shade val="50000"/>
+            </a:schemeClr>
+          </a:lnRef>
+          <a:fillRef idx="1">
+            <a:schemeClr val="accent1"/>
+          </a:fillRef>
+          <a:effectRef idx="0">
+            <a:schemeClr val="accent1"/>
+          </a:effectRef>
+          <a:fontRef idx="minor">
+            <a:schemeClr val="lt1"/>
+          </a:fontRef>
+        </p:style>
+        <p:txBody>
+          <a:bodyPr rot="0" spcFirstLastPara="0" vertOverflow="overflow" horzOverflow="overflow" vert="horz" wrap="square" lIns="69681" tIns="34840" rIns="69681" bIns="34840" numCol="1" spcCol="0" rtlCol="0" fromWordArt="0" anchor="ctr" anchorCtr="0" forceAA="0" compatLnSpc="1">
+            <a:prstTxWarp prst="textNoShape">
+              <a:avLst/>
+            </a:prstTxWarp>
+            <a:noAutofit/>
+          </a:bodyPr>
+          <a:lstStyle/>
+          <a:p>
+            <a:pPr algn="ctr"/>
+            <a:endParaRPr lang="en-US" sz="1372" dirty="0"/>
+          </a:p>
+        </p:txBody>
+      </p:sp>
+      <p:sp>
+        <p:nvSpPr>
+          <p:cNvPr id="66" name="TextBox 65">
+            <a:extLst>
+              <a:ext uri="{FF2B5EF4-FFF2-40B4-BE49-F238E27FC236}">
+                <a16:creationId xmlns:a16="http://schemas.microsoft.com/office/drawing/2014/main" id="{AE3FD9DE-F10F-4AC2-AA44-5D12006DB5C2}"/>
+              </a:ext>
+            </a:extLst>
+          </p:cNvPr>
+          <p:cNvSpPr txBox="1"/>
+          <p:nvPr/>
+        </p:nvSpPr>
+        <p:spPr>
+          <a:xfrm>
+            <a:off x="3580698" y="4704549"/>
+            <a:ext cx="1419923" cy="369332"/>
+          </a:xfrm>
+          <a:prstGeom prst="rect">
+            <a:avLst/>
+          </a:prstGeom>
+          <a:noFill/>
+        </p:spPr>
+        <p:txBody>
+          <a:bodyPr wrap="square">
+            <a:spAutoFit/>
+          </a:bodyPr>
+          <a:lstStyle/>
+          <a:p>
+            <a:r>
+              <a:rPr lang="en-US" sz="1800" dirty="0" err="1"/>
+              <a:t>valided</a:t>
+            </a:r>
+            <a:endParaRPr lang="en-US" sz="1800" dirty="0"/>
+          </a:p>
+        </p:txBody>
+      </p:sp>
+    </p:spTree>
+    <p:extLst>
+      <p:ext uri="{BB962C8B-B14F-4D97-AF65-F5344CB8AC3E}">
+        <p14:creationId xmlns:p14="http://schemas.microsoft.com/office/powerpoint/2010/main" val="890173393"/>
       </p:ext>
     </p:extLst>
   </p:cSld>

</xml_diff>

<commit_message>
remove Event from categoris
</commit_message>
<xml_diff>
--- a/docs/COMPONENT-DIAGRAM.pptx
+++ b/docs/COMPONENT-DIAGRAM.pptx
@@ -243,7 +243,7 @@
           <a:p>
             <a:fld id="{28BE630F-C39C-4DB9-8258-0B48CA067079}" type="datetimeFigureOut">
               <a:rPr lang="en-US" smtClean="0"/>
-              <a:t>11/29/2021</a:t>
+              <a:t>12/2/2021</a:t>
             </a:fld>
             <a:endParaRPr lang="en-US"/>
           </a:p>
@@ -411,7 +411,7 @@
           <a:p>
             <a:fld id="{28BE630F-C39C-4DB9-8258-0B48CA067079}" type="datetimeFigureOut">
               <a:rPr lang="en-US" smtClean="0"/>
-              <a:t>11/29/2021</a:t>
+              <a:t>12/2/2021</a:t>
             </a:fld>
             <a:endParaRPr lang="en-US"/>
           </a:p>
@@ -589,7 +589,7 @@
           <a:p>
             <a:fld id="{28BE630F-C39C-4DB9-8258-0B48CA067079}" type="datetimeFigureOut">
               <a:rPr lang="en-US" smtClean="0"/>
-              <a:t>11/29/2021</a:t>
+              <a:t>12/2/2021</a:t>
             </a:fld>
             <a:endParaRPr lang="en-US"/>
           </a:p>
@@ -757,7 +757,7 @@
           <a:p>
             <a:fld id="{28BE630F-C39C-4DB9-8258-0B48CA067079}" type="datetimeFigureOut">
               <a:rPr lang="en-US" smtClean="0"/>
-              <a:t>11/29/2021</a:t>
+              <a:t>12/2/2021</a:t>
             </a:fld>
             <a:endParaRPr lang="en-US"/>
           </a:p>
@@ -1002,7 +1002,7 @@
           <a:p>
             <a:fld id="{28BE630F-C39C-4DB9-8258-0B48CA067079}" type="datetimeFigureOut">
               <a:rPr lang="en-US" smtClean="0"/>
-              <a:t>11/29/2021</a:t>
+              <a:t>12/2/2021</a:t>
             </a:fld>
             <a:endParaRPr lang="en-US"/>
           </a:p>
@@ -1231,7 +1231,7 @@
           <a:p>
             <a:fld id="{28BE630F-C39C-4DB9-8258-0B48CA067079}" type="datetimeFigureOut">
               <a:rPr lang="en-US" smtClean="0"/>
-              <a:t>11/29/2021</a:t>
+              <a:t>12/2/2021</a:t>
             </a:fld>
             <a:endParaRPr lang="en-US"/>
           </a:p>
@@ -1595,7 +1595,7 @@
           <a:p>
             <a:fld id="{28BE630F-C39C-4DB9-8258-0B48CA067079}" type="datetimeFigureOut">
               <a:rPr lang="en-US" smtClean="0"/>
-              <a:t>11/29/2021</a:t>
+              <a:t>12/2/2021</a:t>
             </a:fld>
             <a:endParaRPr lang="en-US"/>
           </a:p>
@@ -1712,7 +1712,7 @@
           <a:p>
             <a:fld id="{28BE630F-C39C-4DB9-8258-0B48CA067079}" type="datetimeFigureOut">
               <a:rPr lang="en-US" smtClean="0"/>
-              <a:t>11/29/2021</a:t>
+              <a:t>12/2/2021</a:t>
             </a:fld>
             <a:endParaRPr lang="en-US"/>
           </a:p>
@@ -1807,7 +1807,7 @@
           <a:p>
             <a:fld id="{28BE630F-C39C-4DB9-8258-0B48CA067079}" type="datetimeFigureOut">
               <a:rPr lang="en-US" smtClean="0"/>
-              <a:t>11/29/2021</a:t>
+              <a:t>12/2/2021</a:t>
             </a:fld>
             <a:endParaRPr lang="en-US"/>
           </a:p>
@@ -2082,7 +2082,7 @@
           <a:p>
             <a:fld id="{28BE630F-C39C-4DB9-8258-0B48CA067079}" type="datetimeFigureOut">
               <a:rPr lang="en-US" smtClean="0"/>
-              <a:t>11/29/2021</a:t>
+              <a:t>12/2/2021</a:t>
             </a:fld>
             <a:endParaRPr lang="en-US"/>
           </a:p>
@@ -2334,7 +2334,7 @@
           <a:p>
             <a:fld id="{28BE630F-C39C-4DB9-8258-0B48CA067079}" type="datetimeFigureOut">
               <a:rPr lang="en-US" smtClean="0"/>
-              <a:t>11/29/2021</a:t>
+              <a:t>12/2/2021</a:t>
             </a:fld>
             <a:endParaRPr lang="en-US"/>
           </a:p>
@@ -2545,7 +2545,7 @@
           <a:p>
             <a:fld id="{28BE630F-C39C-4DB9-8258-0B48CA067079}" type="datetimeFigureOut">
               <a:rPr lang="en-US" smtClean="0"/>
-              <a:t>11/29/2021</a:t>
+              <a:t>12/2/2021</a:t>
             </a:fld>
             <a:endParaRPr lang="en-US"/>
           </a:p>
@@ -3246,7 +3246,7 @@
         </p:nvSpPr>
         <p:spPr>
           <a:xfrm>
-            <a:off x="523323" y="309043"/>
+            <a:off x="523323" y="282539"/>
             <a:ext cx="1650319" cy="1166483"/>
           </a:xfrm>
           <a:prstGeom prst="roundRect">
@@ -3351,7 +3351,7 @@
         </p:nvSpPr>
         <p:spPr>
           <a:xfrm>
-            <a:off x="1009380" y="2560525"/>
+            <a:off x="1009380" y="2556074"/>
             <a:ext cx="639919" cy="303481"/>
           </a:xfrm>
           <a:prstGeom prst="rect">
@@ -3714,7 +3714,7 @@
         </p:nvSpPr>
         <p:spPr>
           <a:xfrm>
-            <a:off x="3418703" y="2992027"/>
+            <a:off x="3458459" y="2912514"/>
             <a:ext cx="926857" cy="303481"/>
           </a:xfrm>
           <a:prstGeom prst="rect">
@@ -4031,7 +4031,7 @@
           <a:lstStyle/>
           <a:p>
             <a:pPr algn="ctr"/>
-            <a:endParaRPr lang="en-US" sz="1372" dirty="0"/>
+            <a:endParaRPr lang="en-US" sz="1372"/>
           </a:p>
         </p:txBody>
       </p:sp>
@@ -4812,10 +4812,10 @@
       </p:grpSpPr>
       <p:sp>
         <p:nvSpPr>
-          <p:cNvPr id="6" name="TextBox 5">
+          <p:cNvPr id="4" name="TextBox 3">
             <a:extLst>
               <a:ext uri="{FF2B5EF4-FFF2-40B4-BE49-F238E27FC236}">
-                <a16:creationId xmlns:a16="http://schemas.microsoft.com/office/drawing/2014/main" id="{9718F69B-AF95-4BC9-A5A5-B496A7754D41}"/>
+                <a16:creationId xmlns:a16="http://schemas.microsoft.com/office/drawing/2014/main" id="{F603D8F1-08EF-4443-9F17-275E6EDFE94D}"/>
               </a:ext>
             </a:extLst>
           </p:cNvPr>
@@ -4824,8 +4824,8 @@
         </p:nvSpPr>
         <p:spPr>
           <a:xfrm>
-            <a:off x="856593" y="311525"/>
-            <a:ext cx="935420" cy="369332"/>
+            <a:off x="1009380" y="479624"/>
+            <a:ext cx="639919" cy="303481"/>
           </a:xfrm>
           <a:prstGeom prst="rect">
             <a:avLst/>
@@ -4833,136 +4833,28 @@
           <a:noFill/>
         </p:spPr>
         <p:txBody>
-          <a:bodyPr wrap="square" rtlCol="0">
+          <a:bodyPr wrap="none" rtlCol="0">
             <a:spAutoFit/>
           </a:bodyPr>
           <a:lstStyle/>
           <a:p>
             <a:r>
-              <a:rPr lang="en-US" dirty="0">
+              <a:rPr lang="en-US" sz="1372" b="1" i="1" dirty="0">
                 <a:solidFill>
                   <a:srgbClr val="FF0000"/>
                 </a:solidFill>
               </a:rPr>
-              <a:t>&lt;App&gt;</a:t>
-            </a:r>
-          </a:p>
-        </p:txBody>
-      </p:sp>
-      <p:sp>
-        <p:nvSpPr>
-          <p:cNvPr id="8" name="TextBox 7">
+              <a:t>&lt;app&gt;</a:t>
+            </a:r>
+          </a:p>
+        </p:txBody>
+      </p:sp>
+      <p:sp>
+        <p:nvSpPr>
+          <p:cNvPr id="5" name="Rounded Rectangle 4">
             <a:extLst>
               <a:ext uri="{FF2B5EF4-FFF2-40B4-BE49-F238E27FC236}">
-                <a16:creationId xmlns:a16="http://schemas.microsoft.com/office/drawing/2014/main" id="{7D41E539-CD92-41C6-8395-EE5B5F2E14FF}"/>
-              </a:ext>
-            </a:extLst>
-          </p:cNvPr>
-          <p:cNvSpPr txBox="1"/>
-          <p:nvPr/>
-        </p:nvSpPr>
-        <p:spPr>
-          <a:xfrm>
-            <a:off x="688426" y="852807"/>
-            <a:ext cx="1471449" cy="369332"/>
-          </a:xfrm>
-          <a:prstGeom prst="rect">
-            <a:avLst/>
-          </a:prstGeom>
-          <a:noFill/>
-        </p:spPr>
-        <p:txBody>
-          <a:bodyPr wrap="square" rtlCol="0">
-            <a:spAutoFit/>
-          </a:bodyPr>
-          <a:lstStyle/>
-          <a:p>
-            <a:r>
-              <a:rPr lang="en-US" dirty="0"/>
-              <a:t>Categories[]</a:t>
-            </a:r>
-          </a:p>
-        </p:txBody>
-      </p:sp>
-      <p:cxnSp>
-        <p:nvCxnSpPr>
-          <p:cNvPr id="10" name="Straight Connector 9">
-            <a:extLst>
-              <a:ext uri="{FF2B5EF4-FFF2-40B4-BE49-F238E27FC236}">
-                <a16:creationId xmlns:a16="http://schemas.microsoft.com/office/drawing/2014/main" id="{55D48469-1712-4B1A-80EF-4DC2E6FA9118}"/>
-              </a:ext>
-            </a:extLst>
-          </p:cNvPr>
-          <p:cNvCxnSpPr>
-            <a:cxnSpLocks/>
-          </p:cNvCxnSpPr>
-          <p:nvPr/>
-        </p:nvCxnSpPr>
-        <p:spPr>
-          <a:xfrm>
-            <a:off x="6369269" y="0"/>
-            <a:ext cx="0" cy="6858000"/>
-          </a:xfrm>
-          <a:prstGeom prst="line">
-            <a:avLst/>
-          </a:prstGeom>
-        </p:spPr>
-        <p:style>
-          <a:lnRef idx="1">
-            <a:schemeClr val="accent1"/>
-          </a:lnRef>
-          <a:fillRef idx="0">
-            <a:schemeClr val="accent1"/>
-          </a:fillRef>
-          <a:effectRef idx="0">
-            <a:schemeClr val="accent1"/>
-          </a:effectRef>
-          <a:fontRef idx="minor">
-            <a:schemeClr val="tx1"/>
-          </a:fontRef>
-        </p:style>
-      </p:cxnSp>
-      <p:sp>
-        <p:nvSpPr>
-          <p:cNvPr id="21" name="TextBox 20">
-            <a:extLst>
-              <a:ext uri="{FF2B5EF4-FFF2-40B4-BE49-F238E27FC236}">
-                <a16:creationId xmlns:a16="http://schemas.microsoft.com/office/drawing/2014/main" id="{26952B0E-7E45-4710-B99D-3DAE29776D1F}"/>
-              </a:ext>
-            </a:extLst>
-          </p:cNvPr>
-          <p:cNvSpPr txBox="1"/>
-          <p:nvPr/>
-        </p:nvSpPr>
-        <p:spPr>
-          <a:xfrm>
-            <a:off x="206766" y="1534820"/>
-            <a:ext cx="4793855" cy="369332"/>
-          </a:xfrm>
-          <a:prstGeom prst="rect">
-            <a:avLst/>
-          </a:prstGeom>
-          <a:noFill/>
-        </p:spPr>
-        <p:txBody>
-          <a:bodyPr wrap="square" rtlCol="0">
-            <a:spAutoFit/>
-          </a:bodyPr>
-          <a:lstStyle/>
-          <a:p>
-            <a:r>
-              <a:rPr lang="en-US" dirty="0"/>
-              <a:t>//A component with a list  of Categories as data  </a:t>
-            </a:r>
-          </a:p>
-        </p:txBody>
-      </p:sp>
-      <p:sp>
-        <p:nvSpPr>
-          <p:cNvPr id="22" name="Rounded Rectangle 8">
-            <a:extLst>
-              <a:ext uri="{FF2B5EF4-FFF2-40B4-BE49-F238E27FC236}">
-                <a16:creationId xmlns:a16="http://schemas.microsoft.com/office/drawing/2014/main" id="{BA85B805-4452-4875-9E0C-61485A4550E2}"/>
+                <a16:creationId xmlns:a16="http://schemas.microsoft.com/office/drawing/2014/main" id="{AECBDDFC-704F-4D47-861E-4627B16C1267}"/>
               </a:ext>
             </a:extLst>
           </p:cNvPr>
@@ -4971,7 +4863,7 @@
         </p:nvSpPr>
         <p:spPr>
           <a:xfrm>
-            <a:off x="476314" y="2002924"/>
+            <a:off x="523323" y="282539"/>
             <a:ext cx="1650319" cy="1166483"/>
           </a:xfrm>
           <a:prstGeom prst="roundRect">
@@ -5012,10 +4904,84 @@
       </p:sp>
       <p:sp>
         <p:nvSpPr>
-          <p:cNvPr id="23" name="Rounded Rectangle 8">
+          <p:cNvPr id="6" name="TextBox 5">
             <a:extLst>
               <a:ext uri="{FF2B5EF4-FFF2-40B4-BE49-F238E27FC236}">
-                <a16:creationId xmlns:a16="http://schemas.microsoft.com/office/drawing/2014/main" id="{94226D10-2AA1-4A14-A0AF-AC3E9C689D2D}"/>
+                <a16:creationId xmlns:a16="http://schemas.microsoft.com/office/drawing/2014/main" id="{21ED7FC0-EB76-4812-8A1D-4F713A4B3A31}"/>
+              </a:ext>
+            </a:extLst>
+          </p:cNvPr>
+          <p:cNvSpPr txBox="1"/>
+          <p:nvPr/>
+        </p:nvSpPr>
+        <p:spPr>
+          <a:xfrm>
+            <a:off x="885053" y="892284"/>
+            <a:ext cx="762325" cy="303481"/>
+          </a:xfrm>
+          <a:prstGeom prst="rect">
+            <a:avLst/>
+          </a:prstGeom>
+          <a:noFill/>
+        </p:spPr>
+        <p:txBody>
+          <a:bodyPr wrap="none" rtlCol="0">
+            <a:spAutoFit/>
+          </a:bodyPr>
+          <a:lstStyle/>
+          <a:p>
+            <a:r>
+              <a:rPr lang="en-US" sz="1372" dirty="0"/>
+              <a:t>Events[]</a:t>
+            </a:r>
+          </a:p>
+        </p:txBody>
+      </p:sp>
+      <p:sp>
+        <p:nvSpPr>
+          <p:cNvPr id="7" name="TextBox 6">
+            <a:extLst>
+              <a:ext uri="{FF2B5EF4-FFF2-40B4-BE49-F238E27FC236}">
+                <a16:creationId xmlns:a16="http://schemas.microsoft.com/office/drawing/2014/main" id="{2C01FD8A-77C6-4BE9-BA6A-60695FF603E6}"/>
+              </a:ext>
+            </a:extLst>
+          </p:cNvPr>
+          <p:cNvSpPr txBox="1"/>
+          <p:nvPr/>
+        </p:nvSpPr>
+        <p:spPr>
+          <a:xfrm>
+            <a:off x="1009380" y="2556074"/>
+            <a:ext cx="639919" cy="303481"/>
+          </a:xfrm>
+          <a:prstGeom prst="rect">
+            <a:avLst/>
+          </a:prstGeom>
+          <a:noFill/>
+        </p:spPr>
+        <p:txBody>
+          <a:bodyPr wrap="none" rtlCol="0">
+            <a:spAutoFit/>
+          </a:bodyPr>
+          <a:lstStyle/>
+          <a:p>
+            <a:r>
+              <a:rPr lang="en-US" sz="1372" b="1" i="1" dirty="0">
+                <a:solidFill>
+                  <a:srgbClr val="FF0000"/>
+                </a:solidFill>
+              </a:rPr>
+              <a:t>&lt;app&gt;</a:t>
+            </a:r>
+          </a:p>
+        </p:txBody>
+      </p:sp>
+      <p:sp>
+        <p:nvSpPr>
+          <p:cNvPr id="8" name="Rounded Rectangle 8">
+            <a:extLst>
+              <a:ext uri="{FF2B5EF4-FFF2-40B4-BE49-F238E27FC236}">
+                <a16:creationId xmlns:a16="http://schemas.microsoft.com/office/drawing/2014/main" id="{5984B409-21D7-4717-A495-F99B1FC32C44}"/>
               </a:ext>
             </a:extLst>
           </p:cNvPr>
@@ -5024,7 +4990,7 @@
         </p:nvSpPr>
         <p:spPr>
           <a:xfrm>
-            <a:off x="495465" y="269565"/>
+            <a:off x="523323" y="2385493"/>
             <a:ext cx="1650319" cy="1166483"/>
           </a:xfrm>
           <a:prstGeom prst="roundRect">
@@ -5065,10 +5031,139 @@
       </p:sp>
       <p:sp>
         <p:nvSpPr>
-          <p:cNvPr id="24" name="Rounded Rectangle 8">
+          <p:cNvPr id="9" name="TextBox 8">
             <a:extLst>
               <a:ext uri="{FF2B5EF4-FFF2-40B4-BE49-F238E27FC236}">
-                <a16:creationId xmlns:a16="http://schemas.microsoft.com/office/drawing/2014/main" id="{6363BB13-08B8-442E-8158-EC1497CFEBF5}"/>
+                <a16:creationId xmlns:a16="http://schemas.microsoft.com/office/drawing/2014/main" id="{F28F50CC-A10C-4D74-8764-49F22B341157}"/>
+              </a:ext>
+            </a:extLst>
+          </p:cNvPr>
+          <p:cNvSpPr txBox="1"/>
+          <p:nvPr/>
+        </p:nvSpPr>
+        <p:spPr>
+          <a:xfrm>
+            <a:off x="885053" y="2968734"/>
+            <a:ext cx="762325" cy="303481"/>
+          </a:xfrm>
+          <a:prstGeom prst="rect">
+            <a:avLst/>
+          </a:prstGeom>
+          <a:noFill/>
+        </p:spPr>
+        <p:txBody>
+          <a:bodyPr wrap="none" rtlCol="0">
+            <a:spAutoFit/>
+          </a:bodyPr>
+          <a:lstStyle/>
+          <a:p>
+            <a:r>
+              <a:rPr lang="en-US" sz="1372" dirty="0"/>
+              <a:t>Events[]</a:t>
+            </a:r>
+          </a:p>
+        </p:txBody>
+      </p:sp>
+      <p:sp>
+        <p:nvSpPr>
+          <p:cNvPr id="10" name="TextBox 9">
+            <a:extLst>
+              <a:ext uri="{FF2B5EF4-FFF2-40B4-BE49-F238E27FC236}">
+                <a16:creationId xmlns:a16="http://schemas.microsoft.com/office/drawing/2014/main" id="{4A07FDCD-08F5-4A0B-ABDB-FB2831955B94}"/>
+              </a:ext>
+            </a:extLst>
+          </p:cNvPr>
+          <p:cNvSpPr txBox="1"/>
+          <p:nvPr/>
+        </p:nvSpPr>
+        <p:spPr>
+          <a:xfrm>
+            <a:off x="464251" y="3703715"/>
+            <a:ext cx="2183996" cy="303481"/>
+          </a:xfrm>
+          <a:prstGeom prst="rect">
+            <a:avLst/>
+          </a:prstGeom>
+          <a:noFill/>
+        </p:spPr>
+        <p:txBody>
+          <a:bodyPr wrap="none" rtlCol="0">
+            <a:spAutoFit/>
+          </a:bodyPr>
+          <a:lstStyle/>
+          <a:p>
+            <a:r>
+              <a:rPr lang="en-US" sz="1372" dirty="0"/>
+              <a:t>// </a:t>
+            </a:r>
+            <a:r>
+              <a:rPr lang="en-US" sz="1372" dirty="0">
+                <a:solidFill>
+                  <a:srgbClr val="FF0000"/>
+                </a:solidFill>
+              </a:rPr>
+              <a:t>app</a:t>
+            </a:r>
+            <a:r>
+              <a:rPr lang="en-US" sz="1372" dirty="0"/>
+              <a:t> send student to </a:t>
+            </a:r>
+            <a:r>
+              <a:rPr lang="en-US" sz="1372" dirty="0">
+                <a:solidFill>
+                  <a:srgbClr val="FF0000"/>
+                </a:solidFill>
+              </a:rPr>
+              <a:t>card </a:t>
+            </a:r>
+          </a:p>
+        </p:txBody>
+      </p:sp>
+      <p:sp>
+        <p:nvSpPr>
+          <p:cNvPr id="11" name="TextBox 10">
+            <a:extLst>
+              <a:ext uri="{FF2B5EF4-FFF2-40B4-BE49-F238E27FC236}">
+                <a16:creationId xmlns:a16="http://schemas.microsoft.com/office/drawing/2014/main" id="{8F9A62E3-3FD7-4862-8D55-5360353FFB08}"/>
+              </a:ext>
+            </a:extLst>
+          </p:cNvPr>
+          <p:cNvSpPr txBox="1"/>
+          <p:nvPr/>
+        </p:nvSpPr>
+        <p:spPr>
+          <a:xfrm>
+            <a:off x="929930" y="4751361"/>
+            <a:ext cx="848309" cy="303481"/>
+          </a:xfrm>
+          <a:prstGeom prst="rect">
+            <a:avLst/>
+          </a:prstGeom>
+          <a:noFill/>
+        </p:spPr>
+        <p:txBody>
+          <a:bodyPr wrap="none" rtlCol="0">
+            <a:spAutoFit/>
+          </a:bodyPr>
+          <a:lstStyle/>
+          <a:p>
+            <a:r>
+              <a:rPr lang="en-US" sz="1372" b="1" i="1" dirty="0">
+                <a:solidFill>
+                  <a:srgbClr val="FF0000"/>
+                </a:solidFill>
+              </a:rPr>
+              <a:t>&lt;parent&gt;</a:t>
+            </a:r>
+          </a:p>
+        </p:txBody>
+      </p:sp>
+      <p:sp>
+        <p:nvSpPr>
+          <p:cNvPr id="12" name="Rounded Rectangle 12">
+            <a:extLst>
+              <a:ext uri="{FF2B5EF4-FFF2-40B4-BE49-F238E27FC236}">
+                <a16:creationId xmlns:a16="http://schemas.microsoft.com/office/drawing/2014/main" id="{10C24EC5-4E49-4585-8FDF-ACE40734C13B}"/>
               </a:ext>
             </a:extLst>
           </p:cNvPr>
@@ -5077,7 +5172,7 @@
         </p:nvSpPr>
         <p:spPr>
           <a:xfrm>
-            <a:off x="3580698" y="2002923"/>
+            <a:off x="523323" y="4632524"/>
             <a:ext cx="1650319" cy="1166483"/>
           </a:xfrm>
           <a:prstGeom prst="roundRect">
@@ -5118,10 +5213,10 @@
       </p:sp>
       <p:sp>
         <p:nvSpPr>
-          <p:cNvPr id="25" name="TextBox 24">
+          <p:cNvPr id="13" name="TextBox 12">
             <a:extLst>
               <a:ext uri="{FF2B5EF4-FFF2-40B4-BE49-F238E27FC236}">
-                <a16:creationId xmlns:a16="http://schemas.microsoft.com/office/drawing/2014/main" id="{B8D6A94E-6391-401C-BE0A-AB3BBDB841D7}"/>
+                <a16:creationId xmlns:a16="http://schemas.microsoft.com/office/drawing/2014/main" id="{2861285A-F449-4BAB-848D-211DDB9D5552}"/>
               </a:ext>
             </a:extLst>
           </p:cNvPr>
@@ -5130,8 +5225,8 @@
         </p:nvSpPr>
         <p:spPr>
           <a:xfrm>
-            <a:off x="688426" y="2032167"/>
-            <a:ext cx="866394" cy="369332"/>
+            <a:off x="885053" y="5215765"/>
+            <a:ext cx="762325" cy="303481"/>
           </a:xfrm>
           <a:prstGeom prst="rect">
             <a:avLst/>
@@ -5139,137 +5234,79 @@
           <a:noFill/>
         </p:spPr>
         <p:txBody>
-          <a:bodyPr wrap="square" rtlCol="0">
+          <a:bodyPr wrap="none" rtlCol="0">
             <a:spAutoFit/>
           </a:bodyPr>
           <a:lstStyle/>
           <a:p>
             <a:r>
-              <a:rPr lang="en-US" dirty="0">
+              <a:rPr lang="en-US" sz="1372" dirty="0"/>
+              <a:t>Events[]</a:t>
+            </a:r>
+          </a:p>
+        </p:txBody>
+      </p:sp>
+      <p:sp>
+        <p:nvSpPr>
+          <p:cNvPr id="14" name="TextBox 13">
+            <a:extLst>
+              <a:ext uri="{FF2B5EF4-FFF2-40B4-BE49-F238E27FC236}">
+                <a16:creationId xmlns:a16="http://schemas.microsoft.com/office/drawing/2014/main" id="{67CC9793-504B-4339-85E3-E3EBD0C5FE65}"/>
+              </a:ext>
+            </a:extLst>
+          </p:cNvPr>
+          <p:cNvSpPr txBox="1"/>
+          <p:nvPr/>
+        </p:nvSpPr>
+        <p:spPr>
+          <a:xfrm>
+            <a:off x="394083" y="6064417"/>
+            <a:ext cx="3216522" cy="303481"/>
+          </a:xfrm>
+          <a:prstGeom prst="rect">
+            <a:avLst/>
+          </a:prstGeom>
+          <a:noFill/>
+        </p:spPr>
+        <p:txBody>
+          <a:bodyPr wrap="none" rtlCol="0">
+            <a:spAutoFit/>
+          </a:bodyPr>
+          <a:lstStyle/>
+          <a:p>
+            <a:r>
+              <a:rPr lang="en-US" sz="1372" dirty="0"/>
+              <a:t>// </a:t>
+            </a:r>
+            <a:r>
+              <a:rPr lang="en-US" sz="1372" dirty="0">
                 <a:solidFill>
                   <a:srgbClr val="FF0000"/>
                 </a:solidFill>
               </a:rPr>
-              <a:t>&lt;app&gt;</a:t>
-            </a:r>
-          </a:p>
-        </p:txBody>
-      </p:sp>
-      <p:sp>
-        <p:nvSpPr>
-          <p:cNvPr id="26" name="TextBox 25">
-            <a:extLst>
-              <a:ext uri="{FF2B5EF4-FFF2-40B4-BE49-F238E27FC236}">
-                <a16:creationId xmlns:a16="http://schemas.microsoft.com/office/drawing/2014/main" id="{4BA293E2-F73A-4244-9F0E-A4BED7C63D57}"/>
-              </a:ext>
-            </a:extLst>
-          </p:cNvPr>
-          <p:cNvSpPr txBox="1"/>
-          <p:nvPr/>
-        </p:nvSpPr>
-        <p:spPr>
-          <a:xfrm>
-            <a:off x="3953885" y="2110179"/>
-            <a:ext cx="886691" cy="369332"/>
-          </a:xfrm>
-          <a:prstGeom prst="rect">
-            <a:avLst/>
-          </a:prstGeom>
-          <a:noFill/>
-        </p:spPr>
-        <p:txBody>
-          <a:bodyPr wrap="square" rtlCol="0">
-            <a:spAutoFit/>
-          </a:bodyPr>
-          <a:lstStyle/>
-          <a:p>
-            <a:r>
-              <a:rPr lang="en-US" dirty="0">
+              <a:t>from</a:t>
+            </a:r>
+            <a:r>
+              <a:rPr lang="en-US" sz="1372" dirty="0"/>
+              <a:t> send the event validated to </a:t>
+            </a:r>
+            <a:r>
+              <a:rPr lang="en-US" sz="1372" dirty="0">
                 <a:solidFill>
                   <a:srgbClr val="FF0000"/>
                 </a:solidFill>
               </a:rPr>
-              <a:t>&lt;card&gt;</a:t>
-            </a:r>
-          </a:p>
-        </p:txBody>
-      </p:sp>
-      <p:sp>
-        <p:nvSpPr>
-          <p:cNvPr id="27" name="TextBox 26">
+              <a:t>parent</a:t>
+            </a:r>
+          </a:p>
+        </p:txBody>
+      </p:sp>
+      <p:sp>
+        <p:nvSpPr>
+          <p:cNvPr id="15" name="Rounded Rectangle 16">
             <a:extLst>
               <a:ext uri="{FF2B5EF4-FFF2-40B4-BE49-F238E27FC236}">
-                <a16:creationId xmlns:a16="http://schemas.microsoft.com/office/drawing/2014/main" id="{FAE34FBD-E89B-4EB9-AF0F-6ED52907CF4B}"/>
-              </a:ext>
-            </a:extLst>
-          </p:cNvPr>
-          <p:cNvSpPr txBox="1"/>
-          <p:nvPr/>
-        </p:nvSpPr>
-        <p:spPr>
-          <a:xfrm>
-            <a:off x="542875" y="2500271"/>
-            <a:ext cx="1359816" cy="369332"/>
-          </a:xfrm>
-          <a:prstGeom prst="rect">
-            <a:avLst/>
-          </a:prstGeom>
-          <a:noFill/>
-        </p:spPr>
-        <p:txBody>
-          <a:bodyPr wrap="square" rtlCol="0">
-            <a:spAutoFit/>
-          </a:bodyPr>
-          <a:lstStyle/>
-          <a:p>
-            <a:r>
-              <a:rPr lang="en-US" dirty="0"/>
-              <a:t>Categories[]</a:t>
-            </a:r>
-          </a:p>
-        </p:txBody>
-      </p:sp>
-      <p:sp>
-        <p:nvSpPr>
-          <p:cNvPr id="28" name="TextBox 27">
-            <a:extLst>
-              <a:ext uri="{FF2B5EF4-FFF2-40B4-BE49-F238E27FC236}">
-                <a16:creationId xmlns:a16="http://schemas.microsoft.com/office/drawing/2014/main" id="{32EF285A-A809-45F6-8DC1-5DC187776782}"/>
-              </a:ext>
-            </a:extLst>
-          </p:cNvPr>
-          <p:cNvSpPr txBox="1"/>
-          <p:nvPr/>
-        </p:nvSpPr>
-        <p:spPr>
-          <a:xfrm>
-            <a:off x="3749966" y="2600786"/>
-            <a:ext cx="1481051" cy="369332"/>
-          </a:xfrm>
-          <a:prstGeom prst="rect">
-            <a:avLst/>
-          </a:prstGeom>
-          <a:noFill/>
-        </p:spPr>
-        <p:txBody>
-          <a:bodyPr wrap="square" rtlCol="0">
-            <a:spAutoFit/>
-          </a:bodyPr>
-          <a:lstStyle/>
-          <a:p>
-            <a:r>
-              <a:rPr lang="en-US" dirty="0"/>
-              <a:t>Categories[]</a:t>
-            </a:r>
-          </a:p>
-        </p:txBody>
-      </p:sp>
-      <p:sp>
-        <p:nvSpPr>
-          <p:cNvPr id="29" name="Arrow: Right 28">
-            <a:extLst>
-              <a:ext uri="{FF2B5EF4-FFF2-40B4-BE49-F238E27FC236}">
-                <a16:creationId xmlns:a16="http://schemas.microsoft.com/office/drawing/2014/main" id="{DD57213F-B742-40AD-9770-13AFDD5DA8ED}"/>
+                <a16:creationId xmlns:a16="http://schemas.microsoft.com/office/drawing/2014/main" id="{3F82F921-2F1B-460E-B619-CE94DFD8296B}"/>
               </a:ext>
             </a:extLst>
           </p:cNvPr>
@@ -5278,183 +5315,7 @@
         </p:nvSpPr>
         <p:spPr>
           <a:xfrm>
-            <a:off x="2159874" y="2401499"/>
-            <a:ext cx="1226637" cy="468104"/>
-          </a:xfrm>
-          <a:prstGeom prst="rightArrow">
-            <a:avLst/>
-          </a:prstGeom>
-          <a:solidFill>
-            <a:schemeClr val="accent6"/>
-          </a:solidFill>
-        </p:spPr>
-        <p:style>
-          <a:lnRef idx="2">
-            <a:schemeClr val="accent6"/>
-          </a:lnRef>
-          <a:fillRef idx="1">
-            <a:schemeClr val="lt1"/>
-          </a:fillRef>
-          <a:effectRef idx="0">
-            <a:schemeClr val="accent6"/>
-          </a:effectRef>
-          <a:fontRef idx="minor">
-            <a:schemeClr val="dk1"/>
-          </a:fontRef>
-        </p:style>
-        <p:txBody>
-          <a:bodyPr rtlCol="0" anchor="ctr"/>
-          <a:lstStyle/>
-          <a:p>
-            <a:pPr algn="ctr"/>
-            <a:endParaRPr lang="en-US"/>
-          </a:p>
-        </p:txBody>
-      </p:sp>
-      <p:sp>
-        <p:nvSpPr>
-          <p:cNvPr id="30" name="TextBox 29">
-            <a:extLst>
-              <a:ext uri="{FF2B5EF4-FFF2-40B4-BE49-F238E27FC236}">
-                <a16:creationId xmlns:a16="http://schemas.microsoft.com/office/drawing/2014/main" id="{725089A0-F26A-4671-9CD9-49DD981FA95F}"/>
-              </a:ext>
-            </a:extLst>
-          </p:cNvPr>
-          <p:cNvSpPr txBox="1"/>
-          <p:nvPr/>
-        </p:nvSpPr>
-        <p:spPr>
-          <a:xfrm flipH="1">
-            <a:off x="2194955" y="2216832"/>
-            <a:ext cx="896424" cy="369332"/>
-          </a:xfrm>
-          <a:prstGeom prst="rect">
-            <a:avLst/>
-          </a:prstGeom>
-          <a:noFill/>
-        </p:spPr>
-        <p:txBody>
-          <a:bodyPr wrap="square" rtlCol="0">
-            <a:spAutoFit/>
-          </a:bodyPr>
-          <a:lstStyle/>
-          <a:p>
-            <a:r>
-              <a:rPr lang="en-US" dirty="0">
-                <a:solidFill>
-                  <a:schemeClr val="accent6"/>
-                </a:solidFill>
-              </a:rPr>
-              <a:t>PROPS</a:t>
-            </a:r>
-          </a:p>
-        </p:txBody>
-      </p:sp>
-      <p:sp>
-        <p:nvSpPr>
-          <p:cNvPr id="32" name="TextBox 31">
-            <a:extLst>
-              <a:ext uri="{FF2B5EF4-FFF2-40B4-BE49-F238E27FC236}">
-                <a16:creationId xmlns:a16="http://schemas.microsoft.com/office/drawing/2014/main" id="{6A61A605-096E-4CCD-84F8-FB60C8CCFBB9}"/>
-              </a:ext>
-            </a:extLst>
-          </p:cNvPr>
-          <p:cNvSpPr txBox="1"/>
-          <p:nvPr/>
-        </p:nvSpPr>
-        <p:spPr>
-          <a:xfrm>
-            <a:off x="2062780" y="2757129"/>
-            <a:ext cx="1420823" cy="369332"/>
-          </a:xfrm>
-          <a:prstGeom prst="rect">
-            <a:avLst/>
-          </a:prstGeom>
-          <a:noFill/>
-        </p:spPr>
-        <p:txBody>
-          <a:bodyPr wrap="square" rtlCol="0">
-            <a:spAutoFit/>
-          </a:bodyPr>
-          <a:lstStyle/>
-          <a:p>
-            <a:r>
-              <a:rPr lang="en-US" dirty="0"/>
-              <a:t>Categories[]</a:t>
-            </a:r>
-          </a:p>
-        </p:txBody>
-      </p:sp>
-      <p:sp>
-        <p:nvSpPr>
-          <p:cNvPr id="33" name="TextBox 32">
-            <a:extLst>
-              <a:ext uri="{FF2B5EF4-FFF2-40B4-BE49-F238E27FC236}">
-                <a16:creationId xmlns:a16="http://schemas.microsoft.com/office/drawing/2014/main" id="{2B2144A2-C390-42E8-B53C-167C1232CA55}"/>
-              </a:ext>
-            </a:extLst>
-          </p:cNvPr>
-          <p:cNvSpPr txBox="1"/>
-          <p:nvPr/>
-        </p:nvSpPr>
-        <p:spPr>
-          <a:xfrm>
-            <a:off x="182735" y="3308420"/>
-            <a:ext cx="3218556" cy="369332"/>
-          </a:xfrm>
-          <a:prstGeom prst="rect">
-            <a:avLst/>
-          </a:prstGeom>
-          <a:noFill/>
-        </p:spPr>
-        <p:txBody>
-          <a:bodyPr wrap="square" rtlCol="0">
-            <a:spAutoFit/>
-          </a:bodyPr>
-          <a:lstStyle/>
-          <a:p>
-            <a:r>
-              <a:rPr lang="en-US" dirty="0"/>
-              <a:t>// </a:t>
-            </a:r>
-            <a:r>
-              <a:rPr lang="en-US" dirty="0">
-                <a:solidFill>
-                  <a:srgbClr val="FF0000"/>
-                </a:solidFill>
-              </a:rPr>
-              <a:t>app</a:t>
-            </a:r>
-            <a:r>
-              <a:rPr lang="en-US" dirty="0"/>
-              <a:t> send categories to </a:t>
-            </a:r>
-            <a:r>
-              <a:rPr lang="en-US" dirty="0">
-                <a:solidFill>
-                  <a:srgbClr val="FF0000"/>
-                </a:solidFill>
-              </a:rPr>
-              <a:t>card</a:t>
-            </a:r>
-          </a:p>
-        </p:txBody>
-      </p:sp>
-      <p:sp>
-        <p:nvSpPr>
-          <p:cNvPr id="34" name="Rounded Rectangle 8">
-            <a:extLst>
-              <a:ext uri="{FF2B5EF4-FFF2-40B4-BE49-F238E27FC236}">
-                <a16:creationId xmlns:a16="http://schemas.microsoft.com/office/drawing/2014/main" id="{8A92D749-30EC-4FE0-9CD8-8A537E21DDE2}"/>
-              </a:ext>
-            </a:extLst>
-          </p:cNvPr>
-          <p:cNvSpPr/>
-          <p:nvPr/>
-        </p:nvSpPr>
-        <p:spPr>
-          <a:xfrm>
-            <a:off x="4397230" y="4081372"/>
+            <a:off x="3056973" y="2408786"/>
             <a:ext cx="1650319" cy="1166483"/>
           </a:xfrm>
           <a:prstGeom prst="roundRect">
@@ -5495,10 +5356,10 @@
       </p:sp>
       <p:sp>
         <p:nvSpPr>
-          <p:cNvPr id="35" name="TextBox 34">
+          <p:cNvPr id="16" name="TextBox 15">
             <a:extLst>
               <a:ext uri="{FF2B5EF4-FFF2-40B4-BE49-F238E27FC236}">
-                <a16:creationId xmlns:a16="http://schemas.microsoft.com/office/drawing/2014/main" id="{CFBDA9E6-D873-43CC-B01A-058B5AD74B92}"/>
+                <a16:creationId xmlns:a16="http://schemas.microsoft.com/office/drawing/2014/main" id="{6B6A179B-3BA4-4771-96A7-50B411075F6D}"/>
               </a:ext>
             </a:extLst>
           </p:cNvPr>
@@ -5507,8 +5368,8 @@
         </p:nvSpPr>
         <p:spPr>
           <a:xfrm>
-            <a:off x="1602427" y="4211673"/>
-            <a:ext cx="1206187" cy="369332"/>
+            <a:off x="3458459" y="2912514"/>
+            <a:ext cx="762325" cy="303481"/>
           </a:xfrm>
           <a:prstGeom prst="rect">
             <a:avLst/>
@@ -5516,63 +5377,63 @@
           <a:noFill/>
         </p:spPr>
         <p:txBody>
-          <a:bodyPr wrap="square" rtlCol="0">
+          <a:bodyPr wrap="none" rtlCol="0">
             <a:spAutoFit/>
           </a:bodyPr>
           <a:lstStyle/>
           <a:p>
             <a:r>
-              <a:rPr lang="en-US" dirty="0">
+              <a:rPr lang="en-US" sz="1372" dirty="0"/>
+              <a:t>Events[]</a:t>
+            </a:r>
+          </a:p>
+        </p:txBody>
+      </p:sp>
+      <p:sp>
+        <p:nvSpPr>
+          <p:cNvPr id="17" name="TextBox 16">
+            <a:extLst>
+              <a:ext uri="{FF2B5EF4-FFF2-40B4-BE49-F238E27FC236}">
+                <a16:creationId xmlns:a16="http://schemas.microsoft.com/office/drawing/2014/main" id="{885C61FA-3FD2-4114-AC30-D26143615622}"/>
+              </a:ext>
+            </a:extLst>
+          </p:cNvPr>
+          <p:cNvSpPr txBox="1"/>
+          <p:nvPr/>
+        </p:nvSpPr>
+        <p:spPr>
+          <a:xfrm>
+            <a:off x="3463716" y="4744084"/>
+            <a:ext cx="1174168" cy="303481"/>
+          </a:xfrm>
+          <a:prstGeom prst="rect">
+            <a:avLst/>
+          </a:prstGeom>
+          <a:noFill/>
+        </p:spPr>
+        <p:txBody>
+          <a:bodyPr wrap="none" rtlCol="0">
+            <a:spAutoFit/>
+          </a:bodyPr>
+          <a:lstStyle/>
+          <a:p>
+            <a:r>
+              <a:rPr lang="en-US" sz="1372" b="1" i="1" dirty="0">
                 <a:solidFill>
                   <a:srgbClr val="FF0000"/>
                 </a:solidFill>
               </a:rPr>
-              <a:t>&lt;parent&gt;</a:t>
-            </a:r>
-          </a:p>
-        </p:txBody>
-      </p:sp>
-      <p:sp>
-        <p:nvSpPr>
-          <p:cNvPr id="37" name="TextBox 36">
+              <a:t>&lt;event-form&gt;</a:t>
+            </a:r>
+          </a:p>
+        </p:txBody>
+      </p:sp>
+      <p:sp>
+        <p:nvSpPr>
+          <p:cNvPr id="18" name="Rounded Rectangle 19">
             <a:extLst>
               <a:ext uri="{FF2B5EF4-FFF2-40B4-BE49-F238E27FC236}">
-                <a16:creationId xmlns:a16="http://schemas.microsoft.com/office/drawing/2014/main" id="{A82121FB-22A2-45B6-ADB9-476B11EF5F5F}"/>
-              </a:ext>
-            </a:extLst>
-          </p:cNvPr>
-          <p:cNvSpPr txBox="1"/>
-          <p:nvPr/>
-        </p:nvSpPr>
-        <p:spPr>
-          <a:xfrm>
-            <a:off x="4520931" y="4616370"/>
-            <a:ext cx="1443944" cy="369332"/>
-          </a:xfrm>
-          <a:prstGeom prst="rect">
-            <a:avLst/>
-          </a:prstGeom>
-          <a:noFill/>
-        </p:spPr>
-        <p:txBody>
-          <a:bodyPr wrap="square" rtlCol="0">
-            <a:spAutoFit/>
-          </a:bodyPr>
-          <a:lstStyle/>
-          <a:p>
-            <a:r>
-              <a:rPr lang="en-US" dirty="0"/>
-              <a:t>Categories[]</a:t>
-            </a:r>
-          </a:p>
-        </p:txBody>
-      </p:sp>
-      <p:sp>
-        <p:nvSpPr>
-          <p:cNvPr id="38" name="Rounded Rectangle 8">
-            <a:extLst>
-              <a:ext uri="{FF2B5EF4-FFF2-40B4-BE49-F238E27FC236}">
-                <a16:creationId xmlns:a16="http://schemas.microsoft.com/office/drawing/2014/main" id="{60962F6B-4693-4DD4-9347-F43E43B399D3}"/>
+                <a16:creationId xmlns:a16="http://schemas.microsoft.com/office/drawing/2014/main" id="{4A62E5E1-EBA4-4FD0-8F8D-FCDE381FC4C6}"/>
               </a:ext>
             </a:extLst>
           </p:cNvPr>
@@ -5581,7 +5442,7 @@
         </p:nvSpPr>
         <p:spPr>
           <a:xfrm>
-            <a:off x="1361253" y="4156697"/>
+            <a:off x="3180026" y="4608861"/>
             <a:ext cx="1650319" cy="1166483"/>
           </a:xfrm>
           <a:prstGeom prst="roundRect">
@@ -5622,10 +5483,10 @@
       </p:sp>
       <p:sp>
         <p:nvSpPr>
-          <p:cNvPr id="40" name="TextBox 39">
+          <p:cNvPr id="19" name="TextBox 18">
             <a:extLst>
               <a:ext uri="{FF2B5EF4-FFF2-40B4-BE49-F238E27FC236}">
-                <a16:creationId xmlns:a16="http://schemas.microsoft.com/office/drawing/2014/main" id="{C888992C-926B-484D-A6D3-EE332E6E4D51}"/>
+                <a16:creationId xmlns:a16="http://schemas.microsoft.com/office/drawing/2014/main" id="{AD9DFF90-40BF-48BB-9835-46540EB06982}"/>
               </a:ext>
             </a:extLst>
           </p:cNvPr>
@@ -5634,8 +5495,8 @@
         </p:nvSpPr>
         <p:spPr>
           <a:xfrm>
-            <a:off x="44733" y="6097103"/>
-            <a:ext cx="4245926" cy="369332"/>
+            <a:off x="3541756" y="5192102"/>
+            <a:ext cx="762325" cy="303481"/>
           </a:xfrm>
           <a:prstGeom prst="rect">
             <a:avLst/>
@@ -5643,44 +5504,24 @@
           <a:noFill/>
         </p:spPr>
         <p:txBody>
-          <a:bodyPr wrap="square" rtlCol="0">
+          <a:bodyPr wrap="none" rtlCol="0">
             <a:spAutoFit/>
           </a:bodyPr>
           <a:lstStyle/>
           <a:p>
             <a:r>
-              <a:rPr lang="en-US" dirty="0"/>
-              <a:t>// </a:t>
-            </a:r>
-            <a:r>
-              <a:rPr lang="en-US" dirty="0">
-                <a:solidFill>
-                  <a:srgbClr val="FF0000"/>
-                </a:solidFill>
-              </a:rPr>
-              <a:t>from</a:t>
-            </a:r>
-            <a:r>
-              <a:rPr lang="en-US" dirty="0"/>
-              <a:t> send the event validate to </a:t>
-            </a:r>
-            <a:r>
-              <a:rPr lang="en-US" dirty="0">
-                <a:solidFill>
-                  <a:srgbClr val="FF0000"/>
-                </a:solidFill>
-              </a:rPr>
-              <a:t>parent</a:t>
-            </a:r>
-          </a:p>
-        </p:txBody>
-      </p:sp>
-      <p:sp>
-        <p:nvSpPr>
-          <p:cNvPr id="41" name="Rounded Rectangle 8">
+              <a:rPr lang="en-US" sz="1372" dirty="0"/>
+              <a:t>Events[]</a:t>
+            </a:r>
+          </a:p>
+        </p:txBody>
+      </p:sp>
+      <p:sp>
+        <p:nvSpPr>
+          <p:cNvPr id="20" name="Right Arrow 21">
             <a:extLst>
               <a:ext uri="{FF2B5EF4-FFF2-40B4-BE49-F238E27FC236}">
-                <a16:creationId xmlns:a16="http://schemas.microsoft.com/office/drawing/2014/main" id="{D7B2ABD4-C2B5-49F2-9E1B-AB510272B1FA}"/>
+                <a16:creationId xmlns:a16="http://schemas.microsoft.com/office/drawing/2014/main" id="{1AE346E5-C89E-44CF-BA1B-48EF9EAA99C9}"/>
               </a:ext>
             </a:extLst>
           </p:cNvPr>
@@ -5689,19 +5530,15 @@
         </p:nvSpPr>
         <p:spPr>
           <a:xfrm>
-            <a:off x="6912758" y="817654"/>
-            <a:ext cx="1650319" cy="1166483"/>
-          </a:xfrm>
-          <a:prstGeom prst="roundRect">
-            <a:avLst/>
-          </a:prstGeom>
-          <a:noFill/>
-          <a:ln>
-            <a:solidFill>
-              <a:srgbClr val="FF0000"/>
-            </a:solidFill>
-            <a:prstDash val="lgDash"/>
-          </a:ln>
+            <a:off x="2197551" y="2768367"/>
+            <a:ext cx="696809" cy="333683"/>
+          </a:xfrm>
+          <a:prstGeom prst="rightArrow">
+            <a:avLst/>
+          </a:prstGeom>
+          <a:solidFill>
+            <a:schemeClr val="accent6"/>
+          </a:solidFill>
         </p:spPr>
         <p:style>
           <a:lnRef idx="2">
@@ -5720,7 +5557,12 @@
           </a:fontRef>
         </p:style>
         <p:txBody>
-          <a:bodyPr rtlCol="0" anchor="ctr"/>
+          <a:bodyPr rot="0" spcFirstLastPara="0" vertOverflow="overflow" horzOverflow="overflow" vert="horz" wrap="square" lIns="69681" tIns="34840" rIns="69681" bIns="34840" numCol="1" spcCol="0" rtlCol="0" fromWordArt="0" anchor="ctr" anchorCtr="0" forceAA="0" compatLnSpc="1">
+            <a:prstTxWarp prst="textNoShape">
+              <a:avLst/>
+            </a:prstTxWarp>
+            <a:noAutofit/>
+          </a:bodyPr>
           <a:lstStyle/>
           <a:p>
             <a:pPr algn="ctr"/>
@@ -5730,10 +5572,10 @@
       </p:sp>
       <p:sp>
         <p:nvSpPr>
-          <p:cNvPr id="42" name="TextBox 41">
+          <p:cNvPr id="21" name="TextBox 20">
             <a:extLst>
               <a:ext uri="{FF2B5EF4-FFF2-40B4-BE49-F238E27FC236}">
-                <a16:creationId xmlns:a16="http://schemas.microsoft.com/office/drawing/2014/main" id="{9D1910DE-98A3-4A84-A4D7-3EBFADAF00B1}"/>
+                <a16:creationId xmlns:a16="http://schemas.microsoft.com/office/drawing/2014/main" id="{26AA752D-49DB-4177-AF62-D293FC172DBA}"/>
               </a:ext>
             </a:extLst>
           </p:cNvPr>
@@ -5741,9 +5583,9 @@
           <p:nvPr/>
         </p:nvSpPr>
         <p:spPr>
-          <a:xfrm flipH="1">
-            <a:off x="7217852" y="882102"/>
-            <a:ext cx="1040131" cy="369332"/>
+          <a:xfrm>
+            <a:off x="2169858" y="3120474"/>
+            <a:ext cx="584391" cy="303481"/>
           </a:xfrm>
           <a:prstGeom prst="rect">
             <a:avLst/>
@@ -5751,63 +5593,102 @@
           <a:noFill/>
         </p:spPr>
         <p:txBody>
-          <a:bodyPr wrap="square" rtlCol="0">
+          <a:bodyPr wrap="none" rtlCol="0">
             <a:spAutoFit/>
           </a:bodyPr>
           <a:lstStyle/>
           <a:p>
             <a:r>
-              <a:rPr lang="en-US" dirty="0">
+              <a:rPr lang="en-US" sz="1372" dirty="0"/>
+              <a:t>Event</a:t>
+            </a:r>
+          </a:p>
+        </p:txBody>
+      </p:sp>
+      <p:sp>
+        <p:nvSpPr>
+          <p:cNvPr id="22" name="TextBox 21">
+            <a:extLst>
+              <a:ext uri="{FF2B5EF4-FFF2-40B4-BE49-F238E27FC236}">
+                <a16:creationId xmlns:a16="http://schemas.microsoft.com/office/drawing/2014/main" id="{BFB16E60-D49E-453C-8642-6DE51DB34CEF}"/>
+              </a:ext>
+            </a:extLst>
+          </p:cNvPr>
+          <p:cNvSpPr txBox="1"/>
+          <p:nvPr/>
+        </p:nvSpPr>
+        <p:spPr>
+          <a:xfrm>
+            <a:off x="2188492" y="2550268"/>
+            <a:ext cx="670248" cy="303481"/>
+          </a:xfrm>
+          <a:prstGeom prst="rect">
+            <a:avLst/>
+          </a:prstGeom>
+          <a:noFill/>
+        </p:spPr>
+        <p:txBody>
+          <a:bodyPr wrap="none" rtlCol="0">
+            <a:spAutoFit/>
+          </a:bodyPr>
+          <a:lstStyle/>
+          <a:p>
+            <a:r>
+              <a:rPr lang="en-US" sz="1372" b="1" dirty="0">
+                <a:solidFill>
+                  <a:schemeClr val="accent6"/>
+                </a:solidFill>
+              </a:rPr>
+              <a:t>PROPS</a:t>
+            </a:r>
+          </a:p>
+        </p:txBody>
+      </p:sp>
+      <p:sp>
+        <p:nvSpPr>
+          <p:cNvPr id="23" name="TextBox 22">
+            <a:extLst>
+              <a:ext uri="{FF2B5EF4-FFF2-40B4-BE49-F238E27FC236}">
+                <a16:creationId xmlns:a16="http://schemas.microsoft.com/office/drawing/2014/main" id="{52B88FF8-B492-4024-A72C-09F3B513FC0F}"/>
+              </a:ext>
+            </a:extLst>
+          </p:cNvPr>
+          <p:cNvSpPr txBox="1"/>
+          <p:nvPr/>
+        </p:nvSpPr>
+        <p:spPr>
+          <a:xfrm>
+            <a:off x="3562171" y="2587817"/>
+            <a:ext cx="1142044" cy="303481"/>
+          </a:xfrm>
+          <a:prstGeom prst="rect">
+            <a:avLst/>
+          </a:prstGeom>
+          <a:noFill/>
+        </p:spPr>
+        <p:txBody>
+          <a:bodyPr wrap="none" rtlCol="0">
+            <a:spAutoFit/>
+          </a:bodyPr>
+          <a:lstStyle/>
+          <a:p>
+            <a:r>
+              <a:rPr lang="en-US" sz="1372" b="1" i="1" dirty="0">
                 <a:solidFill>
                   <a:srgbClr val="FF0000"/>
                 </a:solidFill>
               </a:rPr>
-              <a:t>&lt;app&gt;</a:t>
-            </a:r>
-          </a:p>
-        </p:txBody>
-      </p:sp>
-      <p:sp>
-        <p:nvSpPr>
-          <p:cNvPr id="43" name="TextBox 42">
+              <a:t>&lt;event-card&gt;</a:t>
+            </a:r>
+          </a:p>
+        </p:txBody>
+      </p:sp>
+      <p:sp>
+        <p:nvSpPr>
+          <p:cNvPr id="24" name="Right Arrow 25">
             <a:extLst>
               <a:ext uri="{FF2B5EF4-FFF2-40B4-BE49-F238E27FC236}">
-                <a16:creationId xmlns:a16="http://schemas.microsoft.com/office/drawing/2014/main" id="{8CAE0832-9E22-4DD5-97EF-3663DB291150}"/>
-              </a:ext>
-            </a:extLst>
-          </p:cNvPr>
-          <p:cNvSpPr txBox="1"/>
-          <p:nvPr/>
-        </p:nvSpPr>
-        <p:spPr>
-          <a:xfrm>
-            <a:off x="7140907" y="1350154"/>
-            <a:ext cx="1422169" cy="369332"/>
-          </a:xfrm>
-          <a:prstGeom prst="rect">
-            <a:avLst/>
-          </a:prstGeom>
-          <a:noFill/>
-        </p:spPr>
-        <p:txBody>
-          <a:bodyPr wrap="square" rtlCol="0">
-            <a:spAutoFit/>
-          </a:bodyPr>
-          <a:lstStyle/>
-          <a:p>
-            <a:r>
-              <a:rPr lang="en-US" dirty="0"/>
-              <a:t>Categories[]</a:t>
-            </a:r>
-          </a:p>
-        </p:txBody>
-      </p:sp>
-      <p:sp>
-        <p:nvSpPr>
-          <p:cNvPr id="44" name="Arrow: Right 43">
-            <a:extLst>
-              <a:ext uri="{FF2B5EF4-FFF2-40B4-BE49-F238E27FC236}">
-                <a16:creationId xmlns:a16="http://schemas.microsoft.com/office/drawing/2014/main" id="{C4BB6547-6200-46D3-8CED-257F31E55875}"/>
+                <a16:creationId xmlns:a16="http://schemas.microsoft.com/office/drawing/2014/main" id="{14FB65C7-2CAB-47C0-A4C1-61260D11309F}"/>
               </a:ext>
             </a:extLst>
           </p:cNvPr>
@@ -5815,15 +5696,15 @@
           <p:nvPr/>
         </p:nvSpPr>
         <p:spPr>
-          <a:xfrm>
-            <a:off x="8563076" y="1152221"/>
-            <a:ext cx="752475" cy="497347"/>
+          <a:xfrm flipH="1">
+            <a:off x="2387600" y="5000637"/>
+            <a:ext cx="792424" cy="400041"/>
           </a:xfrm>
           <a:prstGeom prst="rightArrow">
             <a:avLst/>
           </a:prstGeom>
           <a:solidFill>
-            <a:srgbClr val="FFFF00"/>
+            <a:srgbClr val="FF0000"/>
           </a:solidFill>
         </p:spPr>
         <p:style>
@@ -5843,20 +5724,25 @@
           </a:fontRef>
         </p:style>
         <p:txBody>
-          <a:bodyPr rtlCol="0" anchor="ctr"/>
+          <a:bodyPr rot="0" spcFirstLastPara="0" vertOverflow="overflow" horzOverflow="overflow" vert="horz" wrap="square" lIns="69681" tIns="34840" rIns="69681" bIns="34840" numCol="1" spcCol="0" rtlCol="0" fromWordArt="0" anchor="ctr" anchorCtr="0" forceAA="0" compatLnSpc="1">
+            <a:prstTxWarp prst="textNoShape">
+              <a:avLst/>
+            </a:prstTxWarp>
+            <a:noAutofit/>
+          </a:bodyPr>
           <a:lstStyle/>
           <a:p>
             <a:pPr algn="ctr"/>
-            <a:endParaRPr lang="en-US"/>
-          </a:p>
-        </p:txBody>
-      </p:sp>
-      <p:sp>
-        <p:nvSpPr>
-          <p:cNvPr id="45" name="TextBox 44">
+            <a:endParaRPr lang="en-US" sz="1372"/>
+          </a:p>
+        </p:txBody>
+      </p:sp>
+      <p:sp>
+        <p:nvSpPr>
+          <p:cNvPr id="25" name="TextBox 24">
             <a:extLst>
               <a:ext uri="{FF2B5EF4-FFF2-40B4-BE49-F238E27FC236}">
-                <a16:creationId xmlns:a16="http://schemas.microsoft.com/office/drawing/2014/main" id="{91CA38C8-0131-4EE7-A63E-18BC4294039D}"/>
+                <a16:creationId xmlns:a16="http://schemas.microsoft.com/office/drawing/2014/main" id="{DCC24B8B-B5D8-45EA-BD56-5C727002CD7E}"/>
               </a:ext>
             </a:extLst>
           </p:cNvPr>
@@ -5865,8 +5751,8 @@
         </p:nvSpPr>
         <p:spPr>
           <a:xfrm>
-            <a:off x="8496401" y="913394"/>
-            <a:ext cx="1084084" cy="369332"/>
+            <a:off x="2523616" y="5336639"/>
+            <a:ext cx="701474" cy="303481"/>
           </a:xfrm>
           <a:prstGeom prst="rect">
             <a:avLst/>
@@ -5874,28 +5760,25 @@
           <a:noFill/>
         </p:spPr>
         <p:txBody>
-          <a:bodyPr wrap="square" rtlCol="0">
+          <a:bodyPr wrap="none" rtlCol="0">
             <a:spAutoFit/>
           </a:bodyPr>
           <a:lstStyle/>
           <a:p>
             <a:r>
-              <a:rPr lang="en-US" dirty="0">
-                <a:solidFill>
-                  <a:srgbClr val="FFC000"/>
-                </a:solidFill>
-              </a:rPr>
-              <a:t>PROVIDE</a:t>
-            </a:r>
-          </a:p>
-        </p:txBody>
-      </p:sp>
-      <p:sp>
-        <p:nvSpPr>
-          <p:cNvPr id="46" name="TextBox 45">
+              <a:rPr lang="en-US" sz="1372" dirty="0" err="1"/>
+              <a:t>valided</a:t>
+            </a:r>
+            <a:endParaRPr lang="en-US" sz="1372" dirty="0"/>
+          </a:p>
+        </p:txBody>
+      </p:sp>
+      <p:sp>
+        <p:nvSpPr>
+          <p:cNvPr id="26" name="TextBox 25">
             <a:extLst>
               <a:ext uri="{FF2B5EF4-FFF2-40B4-BE49-F238E27FC236}">
-                <a16:creationId xmlns:a16="http://schemas.microsoft.com/office/drawing/2014/main" id="{C7A6654D-3FF9-4159-B89F-8F453D822911}"/>
+                <a16:creationId xmlns:a16="http://schemas.microsoft.com/office/drawing/2014/main" id="{DEC490E0-F349-4269-B29E-D5427C91AE10}"/>
               </a:ext>
             </a:extLst>
           </p:cNvPr>
@@ -5904,8 +5787,8 @@
         </p:nvSpPr>
         <p:spPr>
           <a:xfrm>
-            <a:off x="8538309" y="1562334"/>
-            <a:ext cx="1371593" cy="369332"/>
+            <a:off x="2574806" y="4621286"/>
+            <a:ext cx="558166" cy="303481"/>
           </a:xfrm>
           <a:prstGeom prst="rect">
             <a:avLst/>
@@ -5913,24 +5796,28 @@
           <a:noFill/>
         </p:spPr>
         <p:txBody>
-          <a:bodyPr wrap="square" rtlCol="0">
+          <a:bodyPr wrap="none" rtlCol="0">
             <a:spAutoFit/>
           </a:bodyPr>
           <a:lstStyle/>
           <a:p>
             <a:r>
-              <a:rPr lang="en-US" dirty="0"/>
-              <a:t>Categories[]</a:t>
-            </a:r>
-          </a:p>
-        </p:txBody>
-      </p:sp>
-      <p:sp>
-        <p:nvSpPr>
-          <p:cNvPr id="47" name="TextBox 46">
+              <a:rPr lang="en-US" sz="1372" b="1" dirty="0">
+                <a:solidFill>
+                  <a:srgbClr val="FF0000"/>
+                </a:solidFill>
+              </a:rPr>
+              <a:t>EMIT</a:t>
+            </a:r>
+          </a:p>
+        </p:txBody>
+      </p:sp>
+      <p:sp>
+        <p:nvSpPr>
+          <p:cNvPr id="27" name="TextBox 26">
             <a:extLst>
               <a:ext uri="{FF2B5EF4-FFF2-40B4-BE49-F238E27FC236}">
-                <a16:creationId xmlns:a16="http://schemas.microsoft.com/office/drawing/2014/main" id="{5324E605-55C5-4DD0-97E0-59F122DF06DB}"/>
+                <a16:creationId xmlns:a16="http://schemas.microsoft.com/office/drawing/2014/main" id="{E5A6B4D5-31FE-4678-B125-54A638CA0E0D}"/>
               </a:ext>
             </a:extLst>
           </p:cNvPr>
@@ -5938,9 +5825,9 @@
           <p:nvPr/>
         </p:nvSpPr>
         <p:spPr>
-          <a:xfrm flipH="1">
-            <a:off x="6685082" y="2194236"/>
-            <a:ext cx="3893580" cy="369332"/>
+          <a:xfrm>
+            <a:off x="6720447" y="481416"/>
+            <a:ext cx="639919" cy="303481"/>
           </a:xfrm>
           <a:prstGeom prst="rect">
             <a:avLst/>
@@ -5948,36 +5835,28 @@
           <a:noFill/>
         </p:spPr>
         <p:txBody>
-          <a:bodyPr wrap="square" rtlCol="0">
+          <a:bodyPr wrap="none" rtlCol="0">
             <a:spAutoFit/>
           </a:bodyPr>
           <a:lstStyle/>
           <a:p>
             <a:r>
-              <a:rPr lang="en-US" dirty="0"/>
-              <a:t>// </a:t>
-            </a:r>
-            <a:r>
-              <a:rPr lang="en-US" dirty="0">
+              <a:rPr lang="en-US" sz="1372" b="1" i="1" dirty="0">
                 <a:solidFill>
                   <a:srgbClr val="FF0000"/>
                 </a:solidFill>
               </a:rPr>
-              <a:t>app</a:t>
-            </a:r>
-            <a:r>
-              <a:rPr lang="en-US" dirty="0"/>
-              <a:t> provides categories to anymore</a:t>
-            </a:r>
-          </a:p>
-        </p:txBody>
-      </p:sp>
-      <p:sp>
-        <p:nvSpPr>
-          <p:cNvPr id="48" name="Rounded Rectangle 8">
+              <a:t>&lt;app&gt;</a:t>
+            </a:r>
+          </a:p>
+        </p:txBody>
+      </p:sp>
+      <p:sp>
+        <p:nvSpPr>
+          <p:cNvPr id="28" name="Rounded Rectangle 31">
             <a:extLst>
               <a:ext uri="{FF2B5EF4-FFF2-40B4-BE49-F238E27FC236}">
-                <a16:creationId xmlns:a16="http://schemas.microsoft.com/office/drawing/2014/main" id="{821C2FD5-7828-4F9E-A388-4A98C31CCA96}"/>
+                <a16:creationId xmlns:a16="http://schemas.microsoft.com/office/drawing/2014/main" id="{3DDA17AA-AEA5-4451-A024-305A338C5E18}"/>
               </a:ext>
             </a:extLst>
           </p:cNvPr>
@@ -5986,7 +5865,7 @@
         </p:nvSpPr>
         <p:spPr>
           <a:xfrm>
-            <a:off x="7976928" y="3002674"/>
+            <a:off x="6234390" y="310835"/>
             <a:ext cx="1650319" cy="1166483"/>
           </a:xfrm>
           <a:prstGeom prst="roundRect">
@@ -6027,10 +5906,97 @@
       </p:sp>
       <p:sp>
         <p:nvSpPr>
-          <p:cNvPr id="49" name="Arrow: Right 48">
+          <p:cNvPr id="29" name="TextBox 28">
             <a:extLst>
               <a:ext uri="{FF2B5EF4-FFF2-40B4-BE49-F238E27FC236}">
-                <a16:creationId xmlns:a16="http://schemas.microsoft.com/office/drawing/2014/main" id="{DDB1DDD8-90D8-4424-838C-0EF5DE7972AA}"/>
+                <a16:creationId xmlns:a16="http://schemas.microsoft.com/office/drawing/2014/main" id="{B032FF65-07A2-499A-9575-36A5730BD3E7}"/>
+              </a:ext>
+            </a:extLst>
+          </p:cNvPr>
+          <p:cNvSpPr txBox="1"/>
+          <p:nvPr/>
+        </p:nvSpPr>
+        <p:spPr>
+          <a:xfrm>
+            <a:off x="6596120" y="894076"/>
+            <a:ext cx="762325" cy="303481"/>
+          </a:xfrm>
+          <a:prstGeom prst="rect">
+            <a:avLst/>
+          </a:prstGeom>
+          <a:noFill/>
+        </p:spPr>
+        <p:txBody>
+          <a:bodyPr wrap="none" rtlCol="0">
+            <a:spAutoFit/>
+          </a:bodyPr>
+          <a:lstStyle/>
+          <a:p>
+            <a:r>
+              <a:rPr lang="en-US" sz="1372" dirty="0"/>
+              <a:t>Events[]</a:t>
+            </a:r>
+          </a:p>
+        </p:txBody>
+      </p:sp>
+      <p:sp>
+        <p:nvSpPr>
+          <p:cNvPr id="30" name="TextBox 29">
+            <a:extLst>
+              <a:ext uri="{FF2B5EF4-FFF2-40B4-BE49-F238E27FC236}">
+                <a16:creationId xmlns:a16="http://schemas.microsoft.com/office/drawing/2014/main" id="{A43B898F-1933-40A0-AF61-6ECFE0627369}"/>
+              </a:ext>
+            </a:extLst>
+          </p:cNvPr>
+          <p:cNvSpPr txBox="1"/>
+          <p:nvPr/>
+        </p:nvSpPr>
+        <p:spPr>
+          <a:xfrm>
+            <a:off x="6234390" y="1613780"/>
+            <a:ext cx="2858411" cy="303481"/>
+          </a:xfrm>
+          <a:prstGeom prst="rect">
+            <a:avLst/>
+          </a:prstGeom>
+          <a:noFill/>
+        </p:spPr>
+        <p:txBody>
+          <a:bodyPr wrap="none" rtlCol="0">
+            <a:spAutoFit/>
+          </a:bodyPr>
+          <a:lstStyle/>
+          <a:p>
+            <a:r>
+              <a:rPr lang="en-US" sz="1372" dirty="0"/>
+              <a:t>// </a:t>
+            </a:r>
+            <a:r>
+              <a:rPr lang="en-US" sz="1372" dirty="0">
+                <a:solidFill>
+                  <a:srgbClr val="FF0000"/>
+                </a:solidFill>
+              </a:rPr>
+              <a:t>app</a:t>
+            </a:r>
+            <a:r>
+              <a:rPr lang="en-US" sz="1372" dirty="0"/>
+              <a:t>  provides students to anymore</a:t>
+            </a:r>
+            <a:endParaRPr lang="en-US" sz="1372" dirty="0">
+              <a:solidFill>
+                <a:srgbClr val="FF0000"/>
+              </a:solidFill>
+            </a:endParaRPr>
+          </a:p>
+        </p:txBody>
+      </p:sp>
+      <p:sp>
+        <p:nvSpPr>
+          <p:cNvPr id="31" name="Rounded Rectangle 34">
+            <a:extLst>
+              <a:ext uri="{FF2B5EF4-FFF2-40B4-BE49-F238E27FC236}">
+                <a16:creationId xmlns:a16="http://schemas.microsoft.com/office/drawing/2014/main" id="{71A78962-D323-4DA7-BD16-EA69A6DFE80D}"/>
               </a:ext>
             </a:extLst>
           </p:cNvPr>
@@ -6039,15 +6005,19 @@
         </p:nvSpPr>
         <p:spPr>
           <a:xfrm>
-            <a:off x="7215091" y="3301260"/>
-            <a:ext cx="752475" cy="497347"/>
-          </a:xfrm>
-          <a:prstGeom prst="rightArrow">
-            <a:avLst/>
-          </a:prstGeom>
-          <a:solidFill>
-            <a:srgbClr val="FFFF00"/>
-          </a:solidFill>
+            <a:off x="9792269" y="2129025"/>
+            <a:ext cx="1650319" cy="1166483"/>
+          </a:xfrm>
+          <a:prstGeom prst="roundRect">
+            <a:avLst/>
+          </a:prstGeom>
+          <a:noFill/>
+          <a:ln>
+            <a:solidFill>
+              <a:srgbClr val="FF0000"/>
+            </a:solidFill>
+            <a:prstDash val="lgDash"/>
+          </a:ln>
         </p:spPr>
         <p:style>
           <a:lnRef idx="2">
@@ -6070,16 +6040,16 @@
           <a:lstStyle/>
           <a:p>
             <a:pPr algn="ctr"/>
-            <a:endParaRPr lang="en-US"/>
-          </a:p>
-        </p:txBody>
-      </p:sp>
-      <p:sp>
-        <p:nvSpPr>
-          <p:cNvPr id="50" name="TextBox 49">
+            <a:endParaRPr lang="en-US" sz="1372"/>
+          </a:p>
+        </p:txBody>
+      </p:sp>
+      <p:sp>
+        <p:nvSpPr>
+          <p:cNvPr id="32" name="TextBox 31">
             <a:extLst>
               <a:ext uri="{FF2B5EF4-FFF2-40B4-BE49-F238E27FC236}">
-                <a16:creationId xmlns:a16="http://schemas.microsoft.com/office/drawing/2014/main" id="{3550B5EE-6A95-42F2-8F39-1B658DC1A4EE}"/>
+                <a16:creationId xmlns:a16="http://schemas.microsoft.com/office/drawing/2014/main" id="{9AD87C48-555C-41CE-A5EB-0A9F751EFC1D}"/>
               </a:ext>
             </a:extLst>
           </p:cNvPr>
@@ -6087,9 +6057,9 @@
           <p:nvPr/>
         </p:nvSpPr>
         <p:spPr>
-          <a:xfrm flipH="1">
-            <a:off x="7176791" y="3024302"/>
-            <a:ext cx="752474" cy="369332"/>
+          <a:xfrm>
+            <a:off x="10153999" y="2712266"/>
+            <a:ext cx="762325" cy="303481"/>
           </a:xfrm>
           <a:prstGeom prst="rect">
             <a:avLst/>
@@ -6097,28 +6067,24 @@
           <a:noFill/>
         </p:spPr>
         <p:txBody>
-          <a:bodyPr wrap="square" rtlCol="0">
+          <a:bodyPr wrap="none" rtlCol="0">
             <a:spAutoFit/>
           </a:bodyPr>
           <a:lstStyle/>
           <a:p>
             <a:r>
-              <a:rPr lang="en-US" dirty="0">
-                <a:solidFill>
-                  <a:srgbClr val="FFC000"/>
-                </a:solidFill>
-              </a:rPr>
-              <a:t>INECT</a:t>
-            </a:r>
-          </a:p>
-        </p:txBody>
-      </p:sp>
-      <p:sp>
-        <p:nvSpPr>
-          <p:cNvPr id="51" name="TextBox 50">
+              <a:rPr lang="en-US" sz="1372" dirty="0"/>
+              <a:t>Events[]</a:t>
+            </a:r>
+          </a:p>
+        </p:txBody>
+      </p:sp>
+      <p:sp>
+        <p:nvSpPr>
+          <p:cNvPr id="33" name="TextBox 32">
             <a:extLst>
               <a:ext uri="{FF2B5EF4-FFF2-40B4-BE49-F238E27FC236}">
-                <a16:creationId xmlns:a16="http://schemas.microsoft.com/office/drawing/2014/main" id="{C1956E4C-491D-485B-B70A-F87E8F7367B6}"/>
+                <a16:creationId xmlns:a16="http://schemas.microsoft.com/office/drawing/2014/main" id="{F990A852-5C56-4224-BE32-243CDA6EC202}"/>
               </a:ext>
             </a:extLst>
           </p:cNvPr>
@@ -6127,8 +6093,8 @@
         </p:nvSpPr>
         <p:spPr>
           <a:xfrm>
-            <a:off x="8316167" y="3100106"/>
-            <a:ext cx="1021081" cy="369332"/>
+            <a:off x="10016532" y="2324576"/>
+            <a:ext cx="1166088" cy="303481"/>
           </a:xfrm>
           <a:prstGeom prst="rect">
             <a:avLst/>
@@ -6136,145 +6102,28 @@
           <a:noFill/>
         </p:spPr>
         <p:txBody>
-          <a:bodyPr wrap="square" rtlCol="0">
+          <a:bodyPr wrap="none" rtlCol="0">
             <a:spAutoFit/>
           </a:bodyPr>
           <a:lstStyle/>
           <a:p>
             <a:r>
-              <a:rPr lang="en-US" dirty="0">
+              <a:rPr lang="en-US" sz="1372" b="1" i="1" dirty="0">
                 <a:solidFill>
                   <a:srgbClr val="FF0000"/>
                 </a:solidFill>
               </a:rPr>
-              <a:t>&lt;dialog&gt;</a:t>
-            </a:r>
-          </a:p>
-        </p:txBody>
-      </p:sp>
-      <p:sp>
-        <p:nvSpPr>
-          <p:cNvPr id="52" name="TextBox 51">
+              <a:t>&lt;event-view&gt;</a:t>
+            </a:r>
+          </a:p>
+        </p:txBody>
+      </p:sp>
+      <p:sp>
+        <p:nvSpPr>
+          <p:cNvPr id="34" name="Right Arrow 40">
             <a:extLst>
               <a:ext uri="{FF2B5EF4-FFF2-40B4-BE49-F238E27FC236}">
-                <a16:creationId xmlns:a16="http://schemas.microsoft.com/office/drawing/2014/main" id="{39DA48CB-7815-428F-AEF5-A47C25D5C3E9}"/>
-              </a:ext>
-            </a:extLst>
-          </p:cNvPr>
-          <p:cNvSpPr txBox="1"/>
-          <p:nvPr/>
-        </p:nvSpPr>
-        <p:spPr>
-          <a:xfrm>
-            <a:off x="6629067" y="3677752"/>
-            <a:ext cx="1371593" cy="369332"/>
-          </a:xfrm>
-          <a:prstGeom prst="rect">
-            <a:avLst/>
-          </a:prstGeom>
-          <a:noFill/>
-        </p:spPr>
-        <p:txBody>
-          <a:bodyPr wrap="square" rtlCol="0">
-            <a:spAutoFit/>
-          </a:bodyPr>
-          <a:lstStyle/>
-          <a:p>
-            <a:r>
-              <a:rPr lang="en-US" dirty="0"/>
-              <a:t>Categories[]</a:t>
-            </a:r>
-          </a:p>
-        </p:txBody>
-      </p:sp>
-      <p:sp>
-        <p:nvSpPr>
-          <p:cNvPr id="53" name="TextBox 52">
-            <a:extLst>
-              <a:ext uri="{FF2B5EF4-FFF2-40B4-BE49-F238E27FC236}">
-                <a16:creationId xmlns:a16="http://schemas.microsoft.com/office/drawing/2014/main" id="{C7CB7237-52B7-4AB9-9F81-FEEDE78D0B7D}"/>
-              </a:ext>
-            </a:extLst>
-          </p:cNvPr>
-          <p:cNvSpPr txBox="1"/>
-          <p:nvPr/>
-        </p:nvSpPr>
-        <p:spPr>
-          <a:xfrm>
-            <a:off x="8257983" y="3566870"/>
-            <a:ext cx="1317241" cy="369332"/>
-          </a:xfrm>
-          <a:prstGeom prst="rect">
-            <a:avLst/>
-          </a:prstGeom>
-          <a:noFill/>
-        </p:spPr>
-        <p:txBody>
-          <a:bodyPr wrap="square" rtlCol="0">
-            <a:spAutoFit/>
-          </a:bodyPr>
-          <a:lstStyle/>
-          <a:p>
-            <a:r>
-              <a:rPr lang="en-US" dirty="0"/>
-              <a:t>Categories</a:t>
-            </a:r>
-          </a:p>
-        </p:txBody>
-      </p:sp>
-      <p:sp>
-        <p:nvSpPr>
-          <p:cNvPr id="54" name="TextBox 53">
-            <a:extLst>
-              <a:ext uri="{FF2B5EF4-FFF2-40B4-BE49-F238E27FC236}">
-                <a16:creationId xmlns:a16="http://schemas.microsoft.com/office/drawing/2014/main" id="{AA0A417B-FD03-421E-B2AB-D0B1EB70E6C1}"/>
-              </a:ext>
-            </a:extLst>
-          </p:cNvPr>
-          <p:cNvSpPr txBox="1"/>
-          <p:nvPr/>
-        </p:nvSpPr>
-        <p:spPr>
-          <a:xfrm>
-            <a:off x="9758978" y="3469438"/>
-            <a:ext cx="2499697" cy="646331"/>
-          </a:xfrm>
-          <a:prstGeom prst="rect">
-            <a:avLst/>
-          </a:prstGeom>
-          <a:noFill/>
-        </p:spPr>
-        <p:txBody>
-          <a:bodyPr wrap="square" rtlCol="0">
-            <a:spAutoFit/>
-          </a:bodyPr>
-          <a:lstStyle/>
-          <a:p>
-            <a:r>
-              <a:rPr lang="en-US" dirty="0"/>
-              <a:t>// </a:t>
-            </a:r>
-            <a:r>
-              <a:rPr lang="en-US" dirty="0">
-                <a:solidFill>
-                  <a:srgbClr val="FF0000"/>
-                </a:solidFill>
-              </a:rPr>
-              <a:t>dialog</a:t>
-            </a:r>
-            <a:r>
-              <a:rPr lang="en-US" dirty="0"/>
-              <a:t> gets categories from a provider</a:t>
-            </a:r>
-          </a:p>
-        </p:txBody>
-      </p:sp>
-      <p:sp>
-        <p:nvSpPr>
-          <p:cNvPr id="56" name="Rounded Rectangle 48">
-            <a:extLst>
-              <a:ext uri="{FF2B5EF4-FFF2-40B4-BE49-F238E27FC236}">
-                <a16:creationId xmlns:a16="http://schemas.microsoft.com/office/drawing/2014/main" id="{80206CFD-DA2E-4FAE-9560-C68FCD308327}"/>
+                <a16:creationId xmlns:a16="http://schemas.microsoft.com/office/drawing/2014/main" id="{62EE12C7-CFC8-4C19-BA1B-36AA3458BD4E}"/>
               </a:ext>
             </a:extLst>
           </p:cNvPr>
@@ -6283,19 +6132,15 @@
         </p:nvSpPr>
         <p:spPr>
           <a:xfrm>
-            <a:off x="6656119" y="5507846"/>
-            <a:ext cx="1866945" cy="584334"/>
-          </a:xfrm>
-          <a:prstGeom prst="roundRect">
-            <a:avLst/>
-          </a:prstGeom>
-          <a:noFill/>
-          <a:ln>
-            <a:solidFill>
-              <a:srgbClr val="7030A0"/>
-            </a:solidFill>
-            <a:prstDash val="lgDash"/>
-          </a:ln>
+            <a:off x="7925935" y="727951"/>
+            <a:ext cx="696809" cy="333683"/>
+          </a:xfrm>
+          <a:prstGeom prst="rightArrow">
+            <a:avLst/>
+          </a:prstGeom>
+          <a:solidFill>
+            <a:srgbClr val="FFFF00"/>
+          </a:solidFill>
         </p:spPr>
         <p:style>
           <a:lnRef idx="2">
@@ -6314,7 +6159,12 @@
           </a:fontRef>
         </p:style>
         <p:txBody>
-          <a:bodyPr rtlCol="0" anchor="ctr"/>
+          <a:bodyPr rot="0" spcFirstLastPara="0" vertOverflow="overflow" horzOverflow="overflow" vert="horz" wrap="square" lIns="69681" tIns="34840" rIns="69681" bIns="34840" numCol="1" spcCol="0" rtlCol="0" fromWordArt="0" anchor="ctr" anchorCtr="0" forceAA="0" compatLnSpc="1">
+            <a:prstTxWarp prst="textNoShape">
+              <a:avLst/>
+            </a:prstTxWarp>
+            <a:noAutofit/>
+          </a:bodyPr>
           <a:lstStyle/>
           <a:p>
             <a:pPr algn="ctr"/>
@@ -6324,10 +6174,10 @@
       </p:sp>
       <p:sp>
         <p:nvSpPr>
-          <p:cNvPr id="58" name="TextBox 57">
+          <p:cNvPr id="35" name="TextBox 34">
             <a:extLst>
               <a:ext uri="{FF2B5EF4-FFF2-40B4-BE49-F238E27FC236}">
-                <a16:creationId xmlns:a16="http://schemas.microsoft.com/office/drawing/2014/main" id="{5E21D70E-E626-4479-97BA-F9578067ABBD}"/>
+                <a16:creationId xmlns:a16="http://schemas.microsoft.com/office/drawing/2014/main" id="{E93B8676-5F44-4FDE-BE80-8F8D45350188}"/>
               </a:ext>
             </a:extLst>
           </p:cNvPr>
@@ -6336,8 +6186,8 @@
         </p:nvSpPr>
         <p:spPr>
           <a:xfrm>
-            <a:off x="6716755" y="5616395"/>
-            <a:ext cx="1642217" cy="369332"/>
+            <a:off x="7837364" y="509852"/>
+            <a:ext cx="838756" cy="303481"/>
           </a:xfrm>
           <a:prstGeom prst="rect">
             <a:avLst/>
@@ -6345,28 +6195,28 @@
           <a:noFill/>
         </p:spPr>
         <p:txBody>
-          <a:bodyPr wrap="square">
+          <a:bodyPr wrap="none" rtlCol="0">
             <a:spAutoFit/>
           </a:bodyPr>
           <a:lstStyle/>
           <a:p>
             <a:r>
-              <a:rPr lang="en-US" sz="1800" b="1" i="1" dirty="0">
+              <a:rPr lang="en-US" sz="1372" b="1" dirty="0">
                 <a:solidFill>
-                  <a:srgbClr val="7030A0"/>
+                  <a:schemeClr val="accent4"/>
                 </a:solidFill>
               </a:rPr>
-              <a:t>&lt;router-view&gt;</a:t>
-            </a:r>
-          </a:p>
-        </p:txBody>
-      </p:sp>
-      <p:sp>
-        <p:nvSpPr>
-          <p:cNvPr id="59" name="TextBox 58">
+              <a:t>PROVIDE</a:t>
+            </a:r>
+          </a:p>
+        </p:txBody>
+      </p:sp>
+      <p:sp>
+        <p:nvSpPr>
+          <p:cNvPr id="36" name="TextBox 35">
             <a:extLst>
               <a:ext uri="{FF2B5EF4-FFF2-40B4-BE49-F238E27FC236}">
-                <a16:creationId xmlns:a16="http://schemas.microsoft.com/office/drawing/2014/main" id="{0CAEFCDB-C39A-4943-980C-C113E3B5ECB5}"/>
+                <a16:creationId xmlns:a16="http://schemas.microsoft.com/office/drawing/2014/main" id="{BEB0F35D-F1FB-4A43-B459-1FFB6F4662B0}"/>
               </a:ext>
             </a:extLst>
           </p:cNvPr>
@@ -6375,8 +6225,8 @@
         </p:nvSpPr>
         <p:spPr>
           <a:xfrm>
-            <a:off x="6656118" y="6381750"/>
-            <a:ext cx="3102859" cy="369332"/>
+            <a:off x="7991050" y="1073307"/>
+            <a:ext cx="762325" cy="303481"/>
           </a:xfrm>
           <a:prstGeom prst="rect">
             <a:avLst/>
@@ -6384,137 +6234,24 @@
           <a:noFill/>
         </p:spPr>
         <p:txBody>
-          <a:bodyPr wrap="square" rtlCol="0">
+          <a:bodyPr wrap="none" rtlCol="0">
             <a:spAutoFit/>
           </a:bodyPr>
           <a:lstStyle/>
           <a:p>
             <a:r>
-              <a:rPr lang="en-US" dirty="0"/>
-              <a:t>// Vue JS built-in component</a:t>
-            </a:r>
-          </a:p>
-        </p:txBody>
-      </p:sp>
-      <p:sp>
-        <p:nvSpPr>
-          <p:cNvPr id="60" name="TextBox 59">
+              <a:rPr lang="en-US" sz="1372" dirty="0"/>
+              <a:t>Events[]</a:t>
+            </a:r>
+          </a:p>
+        </p:txBody>
+      </p:sp>
+      <p:sp>
+        <p:nvSpPr>
+          <p:cNvPr id="37" name="Right Arrow 43">
             <a:extLst>
               <a:ext uri="{FF2B5EF4-FFF2-40B4-BE49-F238E27FC236}">
-                <a16:creationId xmlns:a16="http://schemas.microsoft.com/office/drawing/2014/main" id="{EAD7A033-9E88-41E3-B5F4-83A1644B6FFE}"/>
-              </a:ext>
-            </a:extLst>
-          </p:cNvPr>
-          <p:cNvSpPr txBox="1"/>
-          <p:nvPr/>
-        </p:nvSpPr>
-        <p:spPr>
-          <a:xfrm>
-            <a:off x="1512998" y="4820477"/>
-            <a:ext cx="1304925" cy="369332"/>
-          </a:xfrm>
-          <a:prstGeom prst="rect">
-            <a:avLst/>
-          </a:prstGeom>
-          <a:noFill/>
-        </p:spPr>
-        <p:txBody>
-          <a:bodyPr wrap="square" rtlCol="0">
-            <a:spAutoFit/>
-          </a:bodyPr>
-          <a:lstStyle/>
-          <a:p>
-            <a:r>
-              <a:rPr lang="en-US" dirty="0"/>
-              <a:t>Categories[]</a:t>
-            </a:r>
-          </a:p>
-        </p:txBody>
-      </p:sp>
-      <p:sp>
-        <p:nvSpPr>
-          <p:cNvPr id="61" name="TextBox 60">
-            <a:extLst>
-              <a:ext uri="{FF2B5EF4-FFF2-40B4-BE49-F238E27FC236}">
-                <a16:creationId xmlns:a16="http://schemas.microsoft.com/office/drawing/2014/main" id="{50618065-883F-4AE8-BC66-88E7AA8BF0E1}"/>
-              </a:ext>
-            </a:extLst>
-          </p:cNvPr>
-          <p:cNvSpPr txBox="1"/>
-          <p:nvPr/>
-        </p:nvSpPr>
-        <p:spPr>
-          <a:xfrm>
-            <a:off x="4779043" y="4138578"/>
-            <a:ext cx="886691" cy="369332"/>
-          </a:xfrm>
-          <a:prstGeom prst="rect">
-            <a:avLst/>
-          </a:prstGeom>
-          <a:noFill/>
-        </p:spPr>
-        <p:txBody>
-          <a:bodyPr wrap="square" rtlCol="0">
-            <a:spAutoFit/>
-          </a:bodyPr>
-          <a:lstStyle/>
-          <a:p>
-            <a:r>
-              <a:rPr lang="en-US" dirty="0">
-                <a:solidFill>
-                  <a:srgbClr val="FF0000"/>
-                </a:solidFill>
-              </a:rPr>
-              <a:t>&lt;from&gt;</a:t>
-            </a:r>
-          </a:p>
-        </p:txBody>
-      </p:sp>
-      <p:sp>
-        <p:nvSpPr>
-          <p:cNvPr id="63" name="TextBox 62">
-            <a:extLst>
-              <a:ext uri="{FF2B5EF4-FFF2-40B4-BE49-F238E27FC236}">
-                <a16:creationId xmlns:a16="http://schemas.microsoft.com/office/drawing/2014/main" id="{B71B7E5F-8508-42DA-9883-0DCC85660B9A}"/>
-              </a:ext>
-            </a:extLst>
-          </p:cNvPr>
-          <p:cNvSpPr txBox="1"/>
-          <p:nvPr/>
-        </p:nvSpPr>
-        <p:spPr>
-          <a:xfrm>
-            <a:off x="3731698" y="4169551"/>
-            <a:ext cx="1073346" cy="369332"/>
-          </a:xfrm>
-          <a:prstGeom prst="rect">
-            <a:avLst/>
-          </a:prstGeom>
-          <a:noFill/>
-        </p:spPr>
-        <p:txBody>
-          <a:bodyPr wrap="square">
-            <a:spAutoFit/>
-          </a:bodyPr>
-          <a:lstStyle/>
-          <a:p>
-            <a:r>
-              <a:rPr lang="en-US" sz="1800" b="1" dirty="0">
-                <a:solidFill>
-                  <a:srgbClr val="FF0000"/>
-                </a:solidFill>
-              </a:rPr>
-              <a:t>EMIT</a:t>
-            </a:r>
-          </a:p>
-        </p:txBody>
-      </p:sp>
-      <p:sp>
-        <p:nvSpPr>
-          <p:cNvPr id="64" name="Right Arrow 25">
-            <a:extLst>
-              <a:ext uri="{FF2B5EF4-FFF2-40B4-BE49-F238E27FC236}">
-                <a16:creationId xmlns:a16="http://schemas.microsoft.com/office/drawing/2014/main" id="{71E91C7D-1CF2-4863-8F18-59516C80593D}"/>
+                <a16:creationId xmlns:a16="http://schemas.microsoft.com/office/drawing/2014/main" id="{36802B00-754D-413F-BE51-8EEC1E69D5D4}"/>
               </a:ext>
             </a:extLst>
           </p:cNvPr>
@@ -6522,15 +6259,15 @@
           <p:nvPr/>
         </p:nvSpPr>
         <p:spPr>
-          <a:xfrm flipH="1">
-            <a:off x="3589709" y="4416349"/>
-            <a:ext cx="792424" cy="400041"/>
+          <a:xfrm>
+            <a:off x="9056276" y="2542676"/>
+            <a:ext cx="696809" cy="333683"/>
           </a:xfrm>
           <a:prstGeom prst="rightArrow">
             <a:avLst/>
           </a:prstGeom>
           <a:solidFill>
-            <a:srgbClr val="FF0000"/>
+            <a:srgbClr val="FFFF00"/>
           </a:solidFill>
         </p:spPr>
         <p:style>
@@ -6559,16 +6296,16 @@
           <a:lstStyle/>
           <a:p>
             <a:pPr algn="ctr"/>
-            <a:endParaRPr lang="en-US" sz="1372" dirty="0"/>
-          </a:p>
-        </p:txBody>
-      </p:sp>
-      <p:sp>
-        <p:nvSpPr>
-          <p:cNvPr id="66" name="TextBox 65">
+            <a:endParaRPr lang="en-US" sz="1372"/>
+          </a:p>
+        </p:txBody>
+      </p:sp>
+      <p:sp>
+        <p:nvSpPr>
+          <p:cNvPr id="38" name="TextBox 37">
             <a:extLst>
               <a:ext uri="{FF2B5EF4-FFF2-40B4-BE49-F238E27FC236}">
-                <a16:creationId xmlns:a16="http://schemas.microsoft.com/office/drawing/2014/main" id="{AE3FD9DE-F10F-4AC2-AA44-5D12006DB5C2}"/>
+                <a16:creationId xmlns:a16="http://schemas.microsoft.com/office/drawing/2014/main" id="{D64004A6-8FB7-4A6A-BC68-6E69536D243A}"/>
               </a:ext>
             </a:extLst>
           </p:cNvPr>
@@ -6577,8 +6314,8 @@
         </p:nvSpPr>
         <p:spPr>
           <a:xfrm>
-            <a:off x="3580698" y="4704549"/>
-            <a:ext cx="1419923" cy="369332"/>
+            <a:off x="9126729" y="2324577"/>
+            <a:ext cx="668645" cy="303481"/>
           </a:xfrm>
           <a:prstGeom prst="rect">
             <a:avLst/>
@@ -6586,23 +6323,324 @@
           <a:noFill/>
         </p:spPr>
         <p:txBody>
-          <a:bodyPr wrap="square">
+          <a:bodyPr wrap="none" rtlCol="0">
             <a:spAutoFit/>
           </a:bodyPr>
           <a:lstStyle/>
           <a:p>
             <a:r>
-              <a:rPr lang="en-US" sz="1800" dirty="0" err="1"/>
-              <a:t>valided</a:t>
-            </a:r>
-            <a:endParaRPr lang="en-US" sz="1800" dirty="0"/>
-          </a:p>
-        </p:txBody>
-      </p:sp>
+              <a:rPr lang="en-US" sz="1372" b="1" dirty="0">
+                <a:solidFill>
+                  <a:schemeClr val="accent4"/>
+                </a:solidFill>
+              </a:rPr>
+              <a:t>INJECT</a:t>
+            </a:r>
+          </a:p>
+        </p:txBody>
+      </p:sp>
+      <p:sp>
+        <p:nvSpPr>
+          <p:cNvPr id="39" name="TextBox 38">
+            <a:extLst>
+              <a:ext uri="{FF2B5EF4-FFF2-40B4-BE49-F238E27FC236}">
+                <a16:creationId xmlns:a16="http://schemas.microsoft.com/office/drawing/2014/main" id="{EC51937E-0894-4702-BAF9-DDC3613800B7}"/>
+              </a:ext>
+            </a:extLst>
+          </p:cNvPr>
+          <p:cNvSpPr txBox="1"/>
+          <p:nvPr/>
+        </p:nvSpPr>
+        <p:spPr>
+          <a:xfrm>
+            <a:off x="9077787" y="2891298"/>
+            <a:ext cx="762325" cy="303481"/>
+          </a:xfrm>
+          <a:prstGeom prst="rect">
+            <a:avLst/>
+          </a:prstGeom>
+          <a:noFill/>
+        </p:spPr>
+        <p:txBody>
+          <a:bodyPr wrap="none" rtlCol="0">
+            <a:spAutoFit/>
+          </a:bodyPr>
+          <a:lstStyle/>
+          <a:p>
+            <a:r>
+              <a:rPr lang="en-US" sz="1372" dirty="0"/>
+              <a:t>Events[]</a:t>
+            </a:r>
+          </a:p>
+        </p:txBody>
+      </p:sp>
+      <p:sp>
+        <p:nvSpPr>
+          <p:cNvPr id="40" name="TextBox 39">
+            <a:extLst>
+              <a:ext uri="{FF2B5EF4-FFF2-40B4-BE49-F238E27FC236}">
+                <a16:creationId xmlns:a16="http://schemas.microsoft.com/office/drawing/2014/main" id="{88F645A0-03D0-44F6-890E-FB056E5D46D4}"/>
+              </a:ext>
+            </a:extLst>
+          </p:cNvPr>
+          <p:cNvSpPr txBox="1"/>
+          <p:nvPr/>
+        </p:nvSpPr>
+        <p:spPr>
+          <a:xfrm>
+            <a:off x="8917907" y="3423528"/>
+            <a:ext cx="2987100" cy="303481"/>
+          </a:xfrm>
+          <a:prstGeom prst="rect">
+            <a:avLst/>
+          </a:prstGeom>
+          <a:noFill/>
+        </p:spPr>
+        <p:txBody>
+          <a:bodyPr wrap="none" rtlCol="0">
+            <a:spAutoFit/>
+          </a:bodyPr>
+          <a:lstStyle/>
+          <a:p>
+            <a:r>
+              <a:rPr lang="en-US" sz="1372" dirty="0"/>
+              <a:t>// </a:t>
+            </a:r>
+            <a:r>
+              <a:rPr lang="en-US" sz="1372" dirty="0">
+                <a:solidFill>
+                  <a:srgbClr val="FF0000"/>
+                </a:solidFill>
+              </a:rPr>
+              <a:t>dialog </a:t>
+            </a:r>
+            <a:r>
+              <a:rPr lang="en-US" sz="1372" dirty="0"/>
+              <a:t> gets students from a provider</a:t>
+            </a:r>
+            <a:endParaRPr lang="en-US" sz="1372" dirty="0">
+              <a:solidFill>
+                <a:srgbClr val="FF0000"/>
+              </a:solidFill>
+            </a:endParaRPr>
+          </a:p>
+        </p:txBody>
+      </p:sp>
+      <p:sp>
+        <p:nvSpPr>
+          <p:cNvPr id="41" name="TextBox 40">
+            <a:extLst>
+              <a:ext uri="{FF2B5EF4-FFF2-40B4-BE49-F238E27FC236}">
+                <a16:creationId xmlns:a16="http://schemas.microsoft.com/office/drawing/2014/main" id="{305113CA-9D37-4F92-A337-0B733077AA2A}"/>
+              </a:ext>
+            </a:extLst>
+          </p:cNvPr>
+          <p:cNvSpPr txBox="1"/>
+          <p:nvPr/>
+        </p:nvSpPr>
+        <p:spPr>
+          <a:xfrm>
+            <a:off x="6561502" y="4305380"/>
+            <a:ext cx="1215717" cy="303481"/>
+          </a:xfrm>
+          <a:prstGeom prst="rect">
+            <a:avLst/>
+          </a:prstGeom>
+          <a:noFill/>
+        </p:spPr>
+        <p:txBody>
+          <a:bodyPr wrap="none" rtlCol="0">
+            <a:spAutoFit/>
+          </a:bodyPr>
+          <a:lstStyle/>
+          <a:p>
+            <a:r>
+              <a:rPr lang="en-US" sz="1372" b="1" i="1" dirty="0">
+                <a:solidFill>
+                  <a:srgbClr val="7030A0"/>
+                </a:solidFill>
+              </a:rPr>
+              <a:t>&lt;router-view&gt;</a:t>
+            </a:r>
+          </a:p>
+        </p:txBody>
+      </p:sp>
+      <p:sp>
+        <p:nvSpPr>
+          <p:cNvPr id="42" name="Rounded Rectangle 48">
+            <a:extLst>
+              <a:ext uri="{FF2B5EF4-FFF2-40B4-BE49-F238E27FC236}">
+                <a16:creationId xmlns:a16="http://schemas.microsoft.com/office/drawing/2014/main" id="{EA28F26F-7756-4798-BE1C-9E0D1B76C575}"/>
+              </a:ext>
+            </a:extLst>
+          </p:cNvPr>
+          <p:cNvSpPr/>
+          <p:nvPr/>
+        </p:nvSpPr>
+        <p:spPr>
+          <a:xfrm>
+            <a:off x="6217868" y="4170157"/>
+            <a:ext cx="1866945" cy="584334"/>
+          </a:xfrm>
+          <a:prstGeom prst="roundRect">
+            <a:avLst/>
+          </a:prstGeom>
+          <a:noFill/>
+          <a:ln>
+            <a:solidFill>
+              <a:srgbClr val="7030A0"/>
+            </a:solidFill>
+            <a:prstDash val="lgDash"/>
+          </a:ln>
+        </p:spPr>
+        <p:style>
+          <a:lnRef idx="2">
+            <a:schemeClr val="accent1">
+              <a:shade val="50000"/>
+            </a:schemeClr>
+          </a:lnRef>
+          <a:fillRef idx="1">
+            <a:schemeClr val="accent1"/>
+          </a:fillRef>
+          <a:effectRef idx="0">
+            <a:schemeClr val="accent1"/>
+          </a:effectRef>
+          <a:fontRef idx="minor">
+            <a:schemeClr val="lt1"/>
+          </a:fontRef>
+        </p:style>
+        <p:txBody>
+          <a:bodyPr rtlCol="0" anchor="ctr"/>
+          <a:lstStyle/>
+          <a:p>
+            <a:pPr algn="ctr"/>
+            <a:endParaRPr lang="en-US" sz="1372"/>
+          </a:p>
+        </p:txBody>
+      </p:sp>
+      <p:sp>
+        <p:nvSpPr>
+          <p:cNvPr id="43" name="TextBox 42">
+            <a:extLst>
+              <a:ext uri="{FF2B5EF4-FFF2-40B4-BE49-F238E27FC236}">
+                <a16:creationId xmlns:a16="http://schemas.microsoft.com/office/drawing/2014/main" id="{C060CFE8-A079-4D4C-A270-CB31726133F1}"/>
+              </a:ext>
+            </a:extLst>
+          </p:cNvPr>
+          <p:cNvSpPr txBox="1"/>
+          <p:nvPr/>
+        </p:nvSpPr>
+        <p:spPr>
+          <a:xfrm>
+            <a:off x="8256742" y="4317805"/>
+            <a:ext cx="2229136" cy="303481"/>
+          </a:xfrm>
+          <a:prstGeom prst="rect">
+            <a:avLst/>
+          </a:prstGeom>
+          <a:noFill/>
+        </p:spPr>
+        <p:txBody>
+          <a:bodyPr wrap="none" rtlCol="0">
+            <a:spAutoFit/>
+          </a:bodyPr>
+          <a:lstStyle/>
+          <a:p>
+            <a:r>
+              <a:rPr lang="en-US" sz="1372" dirty="0"/>
+              <a:t>// </a:t>
+            </a:r>
+            <a:r>
+              <a:rPr lang="en-US" sz="1372" dirty="0" err="1"/>
+              <a:t>Vue</a:t>
+            </a:r>
+            <a:r>
+              <a:rPr lang="en-US" sz="1372" dirty="0"/>
+              <a:t> JS built-in component</a:t>
+            </a:r>
+            <a:endParaRPr lang="en-US" sz="1372" dirty="0">
+              <a:solidFill>
+                <a:srgbClr val="FF0000"/>
+              </a:solidFill>
+            </a:endParaRPr>
+          </a:p>
+        </p:txBody>
+      </p:sp>
+      <p:sp>
+        <p:nvSpPr>
+          <p:cNvPr id="44" name="TextBox 43">
+            <a:extLst>
+              <a:ext uri="{FF2B5EF4-FFF2-40B4-BE49-F238E27FC236}">
+                <a16:creationId xmlns:a16="http://schemas.microsoft.com/office/drawing/2014/main" id="{FD485E9F-51E3-4481-A5F6-1C097C2C4C4E}"/>
+              </a:ext>
+            </a:extLst>
+          </p:cNvPr>
+          <p:cNvSpPr txBox="1"/>
+          <p:nvPr/>
+        </p:nvSpPr>
+        <p:spPr>
+          <a:xfrm>
+            <a:off x="119555" y="1627265"/>
+            <a:ext cx="3384709" cy="303481"/>
+          </a:xfrm>
+          <a:prstGeom prst="rect">
+            <a:avLst/>
+          </a:prstGeom>
+          <a:noFill/>
+        </p:spPr>
+        <p:txBody>
+          <a:bodyPr wrap="none" rtlCol="0">
+            <a:spAutoFit/>
+          </a:bodyPr>
+          <a:lstStyle/>
+          <a:p>
+            <a:r>
+              <a:rPr lang="en-US" sz="1372" dirty="0"/>
+              <a:t>// A component with a list of student as data</a:t>
+            </a:r>
+          </a:p>
+        </p:txBody>
+      </p:sp>
+      <p:cxnSp>
+        <p:nvCxnSpPr>
+          <p:cNvPr id="45" name="Straight Connector 44">
+            <a:extLst>
+              <a:ext uri="{FF2B5EF4-FFF2-40B4-BE49-F238E27FC236}">
+                <a16:creationId xmlns:a16="http://schemas.microsoft.com/office/drawing/2014/main" id="{342B55E3-97DD-4154-9735-6D61AD688942}"/>
+              </a:ext>
+            </a:extLst>
+          </p:cNvPr>
+          <p:cNvCxnSpPr/>
+          <p:nvPr/>
+        </p:nvCxnSpPr>
+        <p:spPr>
+          <a:xfrm>
+            <a:off x="5733143" y="0"/>
+            <a:ext cx="29028" cy="6858000"/>
+          </a:xfrm>
+          <a:prstGeom prst="line">
+            <a:avLst/>
+          </a:prstGeom>
+        </p:spPr>
+        <p:style>
+          <a:lnRef idx="1">
+            <a:schemeClr val="accent1"/>
+          </a:lnRef>
+          <a:fillRef idx="0">
+            <a:schemeClr val="accent1"/>
+          </a:fillRef>
+          <a:effectRef idx="0">
+            <a:schemeClr val="accent1"/>
+          </a:effectRef>
+          <a:fontRef idx="minor">
+            <a:schemeClr val="tx1"/>
+          </a:fontRef>
+        </p:style>
+      </p:cxnSp>
     </p:spTree>
     <p:extLst>
       <p:ext uri="{BB962C8B-B14F-4D97-AF65-F5344CB8AC3E}">
-        <p14:creationId xmlns:p14="http://schemas.microsoft.com/office/powerpoint/2010/main" val="890173393"/>
+        <p14:creationId xmlns:p14="http://schemas.microsoft.com/office/powerpoint/2010/main" val="1010373446"/>
       </p:ext>
     </p:extLst>
   </p:cSld>

</xml_diff>

<commit_message>
#43 update CD for Event
</commit_message>
<xml_diff>
--- a/docs/COMPONENT-DIAGRAM.pptx
+++ b/docs/COMPONENT-DIAGRAM.pptx
@@ -7,6 +7,7 @@
   <p:sldIdLst>
     <p:sldId id="256" r:id="rId2"/>
     <p:sldId id="258" r:id="rId3"/>
+    <p:sldId id="259" r:id="rId4"/>
   </p:sldIdLst>
   <p:sldSz cx="12192000" cy="6858000"/>
   <p:notesSz cx="6858000" cy="9144000"/>
@@ -105,6 +106,11 @@
       </a:defRPr>
     </a:lvl9pPr>
   </p:defaultTextStyle>
+  <p:extLst>
+    <p:ext uri="{EFAFB233-063F-42B5-8137-9DF3F51BA10A}">
+      <p15:sldGuideLst xmlns:p15="http://schemas.microsoft.com/office/powerpoint/2012/main"/>
+    </p:ext>
+  </p:extLst>
 </p:presentation>
 </file>
 
@@ -150,10 +156,9 @@
           </a:lstStyle>
           <a:p>
             <a:r>
-              <a:rPr lang="en-US" smtClean="0"/>
+              <a:rPr lang="en-US"/>
               <a:t>Click to edit Master title style</a:t>
             </a:r>
-            <a:endParaRPr lang="en-US"/>
           </a:p>
         </p:txBody>
       </p:sp>
@@ -215,10 +220,9 @@
           </a:lstStyle>
           <a:p>
             <a:r>
-              <a:rPr lang="en-US" smtClean="0"/>
+              <a:rPr lang="en-US"/>
               <a:t>Click to edit Master subtitle style</a:t>
             </a:r>
-            <a:endParaRPr lang="en-US"/>
           </a:p>
         </p:txBody>
       </p:sp>
@@ -239,7 +243,7 @@
           <a:p>
             <a:fld id="{28BE630F-C39C-4DB9-8258-0B48CA067079}" type="datetimeFigureOut">
               <a:rPr lang="en-US" smtClean="0"/>
-              <a:t>11/25/2021</a:t>
+              <a:t>12/2/2021</a:t>
             </a:fld>
             <a:endParaRPr lang="en-US"/>
           </a:p>
@@ -333,10 +337,9 @@
           <a:lstStyle/>
           <a:p>
             <a:r>
-              <a:rPr lang="en-US" smtClean="0"/>
+              <a:rPr lang="en-US"/>
               <a:t>Click to edit Master title style</a:t>
             </a:r>
-            <a:endParaRPr lang="en-US"/>
           </a:p>
         </p:txBody>
       </p:sp>
@@ -357,38 +360,37 @@
           <a:p>
             <a:pPr lvl="0"/>
             <a:r>
-              <a:rPr lang="en-US" smtClean="0"/>
+              <a:rPr lang="en-US"/>
               <a:t>Click to edit Master text styles</a:t>
             </a:r>
           </a:p>
           <a:p>
             <a:pPr lvl="1"/>
             <a:r>
-              <a:rPr lang="en-US" smtClean="0"/>
+              <a:rPr lang="en-US"/>
               <a:t>Second level</a:t>
             </a:r>
           </a:p>
           <a:p>
             <a:pPr lvl="2"/>
             <a:r>
-              <a:rPr lang="en-US" smtClean="0"/>
+              <a:rPr lang="en-US"/>
               <a:t>Third level</a:t>
             </a:r>
           </a:p>
           <a:p>
             <a:pPr lvl="3"/>
             <a:r>
-              <a:rPr lang="en-US" smtClean="0"/>
+              <a:rPr lang="en-US"/>
               <a:t>Fourth level</a:t>
             </a:r>
           </a:p>
           <a:p>
             <a:pPr lvl="4"/>
             <a:r>
-              <a:rPr lang="en-US" smtClean="0"/>
+              <a:rPr lang="en-US"/>
               <a:t>Fifth level</a:t>
             </a:r>
-            <a:endParaRPr lang="en-US"/>
           </a:p>
         </p:txBody>
       </p:sp>
@@ -409,7 +411,7 @@
           <a:p>
             <a:fld id="{28BE630F-C39C-4DB9-8258-0B48CA067079}" type="datetimeFigureOut">
               <a:rPr lang="en-US" smtClean="0"/>
-              <a:t>11/25/2021</a:t>
+              <a:t>12/2/2021</a:t>
             </a:fld>
             <a:endParaRPr lang="en-US"/>
           </a:p>
@@ -508,10 +510,9 @@
           <a:lstStyle/>
           <a:p>
             <a:r>
-              <a:rPr lang="en-US" smtClean="0"/>
+              <a:rPr lang="en-US"/>
               <a:t>Click to edit Master title style</a:t>
             </a:r>
-            <a:endParaRPr lang="en-US"/>
           </a:p>
         </p:txBody>
       </p:sp>
@@ -537,38 +538,37 @@
           <a:p>
             <a:pPr lvl="0"/>
             <a:r>
-              <a:rPr lang="en-US" smtClean="0"/>
+              <a:rPr lang="en-US"/>
               <a:t>Click to edit Master text styles</a:t>
             </a:r>
           </a:p>
           <a:p>
             <a:pPr lvl="1"/>
             <a:r>
-              <a:rPr lang="en-US" smtClean="0"/>
+              <a:rPr lang="en-US"/>
               <a:t>Second level</a:t>
             </a:r>
           </a:p>
           <a:p>
             <a:pPr lvl="2"/>
             <a:r>
-              <a:rPr lang="en-US" smtClean="0"/>
+              <a:rPr lang="en-US"/>
               <a:t>Third level</a:t>
             </a:r>
           </a:p>
           <a:p>
             <a:pPr lvl="3"/>
             <a:r>
-              <a:rPr lang="en-US" smtClean="0"/>
+              <a:rPr lang="en-US"/>
               <a:t>Fourth level</a:t>
             </a:r>
           </a:p>
           <a:p>
             <a:pPr lvl="4"/>
             <a:r>
-              <a:rPr lang="en-US" smtClean="0"/>
+              <a:rPr lang="en-US"/>
               <a:t>Fifth level</a:t>
             </a:r>
-            <a:endParaRPr lang="en-US"/>
           </a:p>
         </p:txBody>
       </p:sp>
@@ -589,7 +589,7 @@
           <a:p>
             <a:fld id="{28BE630F-C39C-4DB9-8258-0B48CA067079}" type="datetimeFigureOut">
               <a:rPr lang="en-US" smtClean="0"/>
-              <a:t>11/25/2021</a:t>
+              <a:t>12/2/2021</a:t>
             </a:fld>
             <a:endParaRPr lang="en-US"/>
           </a:p>
@@ -683,10 +683,9 @@
           <a:lstStyle/>
           <a:p>
             <a:r>
-              <a:rPr lang="en-US" smtClean="0"/>
+              <a:rPr lang="en-US"/>
               <a:t>Click to edit Master title style</a:t>
             </a:r>
-            <a:endParaRPr lang="en-US"/>
           </a:p>
         </p:txBody>
       </p:sp>
@@ -707,38 +706,37 @@
           <a:p>
             <a:pPr lvl="0"/>
             <a:r>
-              <a:rPr lang="en-US" smtClean="0"/>
+              <a:rPr lang="en-US"/>
               <a:t>Click to edit Master text styles</a:t>
             </a:r>
           </a:p>
           <a:p>
             <a:pPr lvl="1"/>
             <a:r>
-              <a:rPr lang="en-US" smtClean="0"/>
+              <a:rPr lang="en-US"/>
               <a:t>Second level</a:t>
             </a:r>
           </a:p>
           <a:p>
             <a:pPr lvl="2"/>
             <a:r>
-              <a:rPr lang="en-US" smtClean="0"/>
+              <a:rPr lang="en-US"/>
               <a:t>Third level</a:t>
             </a:r>
           </a:p>
           <a:p>
             <a:pPr lvl="3"/>
             <a:r>
-              <a:rPr lang="en-US" smtClean="0"/>
+              <a:rPr lang="en-US"/>
               <a:t>Fourth level</a:t>
             </a:r>
           </a:p>
           <a:p>
             <a:pPr lvl="4"/>
             <a:r>
-              <a:rPr lang="en-US" smtClean="0"/>
+              <a:rPr lang="en-US"/>
               <a:t>Fifth level</a:t>
             </a:r>
-            <a:endParaRPr lang="en-US"/>
           </a:p>
         </p:txBody>
       </p:sp>
@@ -759,7 +757,7 @@
           <a:p>
             <a:fld id="{28BE630F-C39C-4DB9-8258-0B48CA067079}" type="datetimeFigureOut">
               <a:rPr lang="en-US" smtClean="0"/>
-              <a:t>11/25/2021</a:t>
+              <a:t>12/2/2021</a:t>
             </a:fld>
             <a:endParaRPr lang="en-US"/>
           </a:p>
@@ -862,10 +860,9 @@
           </a:lstStyle>
           <a:p>
             <a:r>
-              <a:rPr lang="en-US" smtClean="0"/>
+              <a:rPr lang="en-US"/>
               <a:t>Click to edit Master title style</a:t>
             </a:r>
-            <a:endParaRPr lang="en-US"/>
           </a:p>
         </p:txBody>
       </p:sp>
@@ -982,7 +979,7 @@
           <a:p>
             <a:pPr lvl="0"/>
             <a:r>
-              <a:rPr lang="en-US" smtClean="0"/>
+              <a:rPr lang="en-US"/>
               <a:t>Click to edit Master text styles</a:t>
             </a:r>
           </a:p>
@@ -1005,7 +1002,7 @@
           <a:p>
             <a:fld id="{28BE630F-C39C-4DB9-8258-0B48CA067079}" type="datetimeFigureOut">
               <a:rPr lang="en-US" smtClean="0"/>
-              <a:t>11/25/2021</a:t>
+              <a:t>12/2/2021</a:t>
             </a:fld>
             <a:endParaRPr lang="en-US"/>
           </a:p>
@@ -1099,10 +1096,9 @@
           <a:lstStyle/>
           <a:p>
             <a:r>
-              <a:rPr lang="en-US" smtClean="0"/>
+              <a:rPr lang="en-US"/>
               <a:t>Click to edit Master title style</a:t>
             </a:r>
-            <a:endParaRPr lang="en-US"/>
           </a:p>
         </p:txBody>
       </p:sp>
@@ -1128,38 +1124,37 @@
           <a:p>
             <a:pPr lvl="0"/>
             <a:r>
-              <a:rPr lang="en-US" smtClean="0"/>
+              <a:rPr lang="en-US"/>
               <a:t>Click to edit Master text styles</a:t>
             </a:r>
           </a:p>
           <a:p>
             <a:pPr lvl="1"/>
             <a:r>
-              <a:rPr lang="en-US" smtClean="0"/>
+              <a:rPr lang="en-US"/>
               <a:t>Second level</a:t>
             </a:r>
           </a:p>
           <a:p>
             <a:pPr lvl="2"/>
             <a:r>
-              <a:rPr lang="en-US" smtClean="0"/>
+              <a:rPr lang="en-US"/>
               <a:t>Third level</a:t>
             </a:r>
           </a:p>
           <a:p>
             <a:pPr lvl="3"/>
             <a:r>
-              <a:rPr lang="en-US" smtClean="0"/>
+              <a:rPr lang="en-US"/>
               <a:t>Fourth level</a:t>
             </a:r>
           </a:p>
           <a:p>
             <a:pPr lvl="4"/>
             <a:r>
-              <a:rPr lang="en-US" smtClean="0"/>
+              <a:rPr lang="en-US"/>
               <a:t>Fifth level</a:t>
             </a:r>
-            <a:endParaRPr lang="en-US"/>
           </a:p>
         </p:txBody>
       </p:sp>
@@ -1185,38 +1180,37 @@
           <a:p>
             <a:pPr lvl="0"/>
             <a:r>
-              <a:rPr lang="en-US" smtClean="0"/>
+              <a:rPr lang="en-US"/>
               <a:t>Click to edit Master text styles</a:t>
             </a:r>
           </a:p>
           <a:p>
             <a:pPr lvl="1"/>
             <a:r>
-              <a:rPr lang="en-US" smtClean="0"/>
+              <a:rPr lang="en-US"/>
               <a:t>Second level</a:t>
             </a:r>
           </a:p>
           <a:p>
             <a:pPr lvl="2"/>
             <a:r>
-              <a:rPr lang="en-US" smtClean="0"/>
+              <a:rPr lang="en-US"/>
               <a:t>Third level</a:t>
             </a:r>
           </a:p>
           <a:p>
             <a:pPr lvl="3"/>
             <a:r>
-              <a:rPr lang="en-US" smtClean="0"/>
+              <a:rPr lang="en-US"/>
               <a:t>Fourth level</a:t>
             </a:r>
           </a:p>
           <a:p>
             <a:pPr lvl="4"/>
             <a:r>
-              <a:rPr lang="en-US" smtClean="0"/>
+              <a:rPr lang="en-US"/>
               <a:t>Fifth level</a:t>
             </a:r>
-            <a:endParaRPr lang="en-US"/>
           </a:p>
         </p:txBody>
       </p:sp>
@@ -1237,7 +1231,7 @@
           <a:p>
             <a:fld id="{28BE630F-C39C-4DB9-8258-0B48CA067079}" type="datetimeFigureOut">
               <a:rPr lang="en-US" smtClean="0"/>
-              <a:t>11/25/2021</a:t>
+              <a:t>12/2/2021</a:t>
             </a:fld>
             <a:endParaRPr lang="en-US"/>
           </a:p>
@@ -1336,10 +1330,9 @@
           <a:lstStyle/>
           <a:p>
             <a:r>
-              <a:rPr lang="en-US" smtClean="0"/>
+              <a:rPr lang="en-US"/>
               <a:t>Click to edit Master title style</a:t>
             </a:r>
-            <a:endParaRPr lang="en-US"/>
           </a:p>
         </p:txBody>
       </p:sp>
@@ -1402,7 +1395,7 @@
           <a:p>
             <a:pPr lvl="0"/>
             <a:r>
-              <a:rPr lang="en-US" smtClean="0"/>
+              <a:rPr lang="en-US"/>
               <a:t>Click to edit Master text styles</a:t>
             </a:r>
           </a:p>
@@ -1430,38 +1423,37 @@
           <a:p>
             <a:pPr lvl="0"/>
             <a:r>
-              <a:rPr lang="en-US" smtClean="0"/>
+              <a:rPr lang="en-US"/>
               <a:t>Click to edit Master text styles</a:t>
             </a:r>
           </a:p>
           <a:p>
             <a:pPr lvl="1"/>
             <a:r>
-              <a:rPr lang="en-US" smtClean="0"/>
+              <a:rPr lang="en-US"/>
               <a:t>Second level</a:t>
             </a:r>
           </a:p>
           <a:p>
             <a:pPr lvl="2"/>
             <a:r>
-              <a:rPr lang="en-US" smtClean="0"/>
+              <a:rPr lang="en-US"/>
               <a:t>Third level</a:t>
             </a:r>
           </a:p>
           <a:p>
             <a:pPr lvl="3"/>
             <a:r>
-              <a:rPr lang="en-US" smtClean="0"/>
+              <a:rPr lang="en-US"/>
               <a:t>Fourth level</a:t>
             </a:r>
           </a:p>
           <a:p>
             <a:pPr lvl="4"/>
             <a:r>
-              <a:rPr lang="en-US" smtClean="0"/>
+              <a:rPr lang="en-US"/>
               <a:t>Fifth level</a:t>
             </a:r>
-            <a:endParaRPr lang="en-US"/>
           </a:p>
         </p:txBody>
       </p:sp>
@@ -1524,7 +1516,7 @@
           <a:p>
             <a:pPr lvl="0"/>
             <a:r>
-              <a:rPr lang="en-US" smtClean="0"/>
+              <a:rPr lang="en-US"/>
               <a:t>Click to edit Master text styles</a:t>
             </a:r>
           </a:p>
@@ -1552,38 +1544,37 @@
           <a:p>
             <a:pPr lvl="0"/>
             <a:r>
-              <a:rPr lang="en-US" smtClean="0"/>
+              <a:rPr lang="en-US"/>
               <a:t>Click to edit Master text styles</a:t>
             </a:r>
           </a:p>
           <a:p>
             <a:pPr lvl="1"/>
             <a:r>
-              <a:rPr lang="en-US" smtClean="0"/>
+              <a:rPr lang="en-US"/>
               <a:t>Second level</a:t>
             </a:r>
           </a:p>
           <a:p>
             <a:pPr lvl="2"/>
             <a:r>
-              <a:rPr lang="en-US" smtClean="0"/>
+              <a:rPr lang="en-US"/>
               <a:t>Third level</a:t>
             </a:r>
           </a:p>
           <a:p>
             <a:pPr lvl="3"/>
             <a:r>
-              <a:rPr lang="en-US" smtClean="0"/>
+              <a:rPr lang="en-US"/>
               <a:t>Fourth level</a:t>
             </a:r>
           </a:p>
           <a:p>
             <a:pPr lvl="4"/>
             <a:r>
-              <a:rPr lang="en-US" smtClean="0"/>
+              <a:rPr lang="en-US"/>
               <a:t>Fifth level</a:t>
             </a:r>
-            <a:endParaRPr lang="en-US"/>
           </a:p>
         </p:txBody>
       </p:sp>
@@ -1604,7 +1595,7 @@
           <a:p>
             <a:fld id="{28BE630F-C39C-4DB9-8258-0B48CA067079}" type="datetimeFigureOut">
               <a:rPr lang="en-US" smtClean="0"/>
-              <a:t>11/25/2021</a:t>
+              <a:t>12/2/2021</a:t>
             </a:fld>
             <a:endParaRPr lang="en-US"/>
           </a:p>
@@ -1698,10 +1689,9 @@
           <a:lstStyle/>
           <a:p>
             <a:r>
-              <a:rPr lang="en-US" smtClean="0"/>
+              <a:rPr lang="en-US"/>
               <a:t>Click to edit Master title style</a:t>
             </a:r>
-            <a:endParaRPr lang="en-US"/>
           </a:p>
         </p:txBody>
       </p:sp>
@@ -1722,7 +1712,7 @@
           <a:p>
             <a:fld id="{28BE630F-C39C-4DB9-8258-0B48CA067079}" type="datetimeFigureOut">
               <a:rPr lang="en-US" smtClean="0"/>
-              <a:t>11/25/2021</a:t>
+              <a:t>12/2/2021</a:t>
             </a:fld>
             <a:endParaRPr lang="en-US"/>
           </a:p>
@@ -1817,7 +1807,7 @@
           <a:p>
             <a:fld id="{28BE630F-C39C-4DB9-8258-0B48CA067079}" type="datetimeFigureOut">
               <a:rPr lang="en-US" smtClean="0"/>
-              <a:t>11/25/2021</a:t>
+              <a:t>12/2/2021</a:t>
             </a:fld>
             <a:endParaRPr lang="en-US"/>
           </a:p>
@@ -1920,10 +1910,9 @@
           </a:lstStyle>
           <a:p>
             <a:r>
-              <a:rPr lang="en-US" smtClean="0"/>
+              <a:rPr lang="en-US"/>
               <a:t>Click to edit Master title style</a:t>
             </a:r>
-            <a:endParaRPr lang="en-US"/>
           </a:p>
         </p:txBody>
       </p:sp>
@@ -1977,38 +1966,37 @@
           <a:p>
             <a:pPr lvl="0"/>
             <a:r>
-              <a:rPr lang="en-US" smtClean="0"/>
+              <a:rPr lang="en-US"/>
               <a:t>Click to edit Master text styles</a:t>
             </a:r>
           </a:p>
           <a:p>
             <a:pPr lvl="1"/>
             <a:r>
-              <a:rPr lang="en-US" smtClean="0"/>
+              <a:rPr lang="en-US"/>
               <a:t>Second level</a:t>
             </a:r>
           </a:p>
           <a:p>
             <a:pPr lvl="2"/>
             <a:r>
-              <a:rPr lang="en-US" smtClean="0"/>
+              <a:rPr lang="en-US"/>
               <a:t>Third level</a:t>
             </a:r>
           </a:p>
           <a:p>
             <a:pPr lvl="3"/>
             <a:r>
-              <a:rPr lang="en-US" smtClean="0"/>
+              <a:rPr lang="en-US"/>
               <a:t>Fourth level</a:t>
             </a:r>
           </a:p>
           <a:p>
             <a:pPr lvl="4"/>
             <a:r>
-              <a:rPr lang="en-US" smtClean="0"/>
+              <a:rPr lang="en-US"/>
               <a:t>Fifth level</a:t>
             </a:r>
-            <a:endParaRPr lang="en-US"/>
           </a:p>
         </p:txBody>
       </p:sp>
@@ -2071,7 +2059,7 @@
           <a:p>
             <a:pPr lvl="0"/>
             <a:r>
-              <a:rPr lang="en-US" smtClean="0"/>
+              <a:rPr lang="en-US"/>
               <a:t>Click to edit Master text styles</a:t>
             </a:r>
           </a:p>
@@ -2094,7 +2082,7 @@
           <a:p>
             <a:fld id="{28BE630F-C39C-4DB9-8258-0B48CA067079}" type="datetimeFigureOut">
               <a:rPr lang="en-US" smtClean="0"/>
-              <a:t>11/25/2021</a:t>
+              <a:t>12/2/2021</a:t>
             </a:fld>
             <a:endParaRPr lang="en-US"/>
           </a:p>
@@ -2197,10 +2185,9 @@
           </a:lstStyle>
           <a:p>
             <a:r>
-              <a:rPr lang="en-US" smtClean="0"/>
+              <a:rPr lang="en-US"/>
               <a:t>Click to edit Master title style</a:t>
             </a:r>
-            <a:endParaRPr lang="en-US"/>
           </a:p>
         </p:txBody>
       </p:sp>
@@ -2324,7 +2311,7 @@
           <a:p>
             <a:pPr lvl="0"/>
             <a:r>
-              <a:rPr lang="en-US" smtClean="0"/>
+              <a:rPr lang="en-US"/>
               <a:t>Click to edit Master text styles</a:t>
             </a:r>
           </a:p>
@@ -2347,7 +2334,7 @@
           <a:p>
             <a:fld id="{28BE630F-C39C-4DB9-8258-0B48CA067079}" type="datetimeFigureOut">
               <a:rPr lang="en-US" smtClean="0"/>
-              <a:t>11/25/2021</a:t>
+              <a:t>12/2/2021</a:t>
             </a:fld>
             <a:endParaRPr lang="en-US"/>
           </a:p>
@@ -2456,10 +2443,9 @@
           <a:lstStyle/>
           <a:p>
             <a:r>
-              <a:rPr lang="en-US" smtClean="0"/>
+              <a:rPr lang="en-US"/>
               <a:t>Click to edit Master title style</a:t>
             </a:r>
-            <a:endParaRPr lang="en-US"/>
           </a:p>
         </p:txBody>
       </p:sp>
@@ -2490,38 +2476,37 @@
           <a:p>
             <a:pPr lvl="0"/>
             <a:r>
-              <a:rPr lang="en-US" smtClean="0"/>
+              <a:rPr lang="en-US"/>
               <a:t>Click to edit Master text styles</a:t>
             </a:r>
           </a:p>
           <a:p>
             <a:pPr lvl="1"/>
             <a:r>
-              <a:rPr lang="en-US" smtClean="0"/>
+              <a:rPr lang="en-US"/>
               <a:t>Second level</a:t>
             </a:r>
           </a:p>
           <a:p>
             <a:pPr lvl="2"/>
             <a:r>
-              <a:rPr lang="en-US" smtClean="0"/>
+              <a:rPr lang="en-US"/>
               <a:t>Third level</a:t>
             </a:r>
           </a:p>
           <a:p>
             <a:pPr lvl="3"/>
             <a:r>
-              <a:rPr lang="en-US" smtClean="0"/>
+              <a:rPr lang="en-US"/>
               <a:t>Fourth level</a:t>
             </a:r>
           </a:p>
           <a:p>
             <a:pPr lvl="4"/>
             <a:r>
-              <a:rPr lang="en-US" smtClean="0"/>
+              <a:rPr lang="en-US"/>
               <a:t>Fifth level</a:t>
             </a:r>
-            <a:endParaRPr lang="en-US"/>
           </a:p>
         </p:txBody>
       </p:sp>
@@ -2560,7 +2545,7 @@
           <a:p>
             <a:fld id="{28BE630F-C39C-4DB9-8258-0B48CA067079}" type="datetimeFigureOut">
               <a:rPr lang="en-US" smtClean="0"/>
-              <a:t>11/25/2021</a:t>
+              <a:t>12/2/2021</a:t>
             </a:fld>
             <a:endParaRPr lang="en-US"/>
           </a:p>
@@ -3261,7 +3246,7 @@
         </p:nvSpPr>
         <p:spPr>
           <a:xfrm>
-            <a:off x="523323" y="309043"/>
+            <a:off x="523323" y="282539"/>
             <a:ext cx="1650319" cy="1166483"/>
           </a:xfrm>
           <a:prstGeom prst="roundRect">
@@ -3323,10 +3308,9 @@
           <a:lstStyle/>
           <a:p>
             <a:r>
-              <a:rPr lang="en-US" sz="1372" dirty="0" smtClean="0"/>
+              <a:rPr lang="en-US" sz="1372" dirty="0"/>
               <a:t>Students[]</a:t>
             </a:r>
-            <a:endParaRPr lang="en-US" sz="1372" dirty="0"/>
           </a:p>
         </p:txBody>
       </p:sp>
@@ -3353,10 +3337,9 @@
           <a:lstStyle/>
           <a:p>
             <a:r>
-              <a:rPr lang="en-US" sz="1372" dirty="0" smtClean="0"/>
+              <a:rPr lang="en-US" sz="1372" dirty="0"/>
               <a:t>// A component with a list of student as data</a:t>
             </a:r>
-            <a:endParaRPr lang="en-US" sz="1372" dirty="0"/>
           </a:p>
         </p:txBody>
       </p:sp>
@@ -3463,10 +3446,9 @@
           <a:lstStyle/>
           <a:p>
             <a:r>
-              <a:rPr lang="en-US" sz="1372" dirty="0" smtClean="0"/>
+              <a:rPr lang="en-US" sz="1372" dirty="0"/>
               <a:t>Students[]</a:t>
             </a:r>
-            <a:endParaRPr lang="en-US" sz="1372" dirty="0"/>
           </a:p>
         </p:txBody>
       </p:sp>
@@ -3493,11 +3475,11 @@
           <a:lstStyle/>
           <a:p>
             <a:r>
-              <a:rPr lang="en-US" sz="1372" dirty="0" smtClean="0"/>
+              <a:rPr lang="en-US" sz="1372" dirty="0"/>
               <a:t>// </a:t>
             </a:r>
             <a:r>
-              <a:rPr lang="en-US" sz="1372" dirty="0" smtClean="0">
+              <a:rPr lang="en-US" sz="1372" dirty="0">
                 <a:solidFill>
                   <a:srgbClr val="FF0000"/>
                 </a:solidFill>
@@ -3505,22 +3487,17 @@
               <a:t>app</a:t>
             </a:r>
             <a:r>
-              <a:rPr lang="en-US" sz="1372" dirty="0" smtClean="0"/>
+              <a:rPr lang="en-US" sz="1372" dirty="0"/>
               <a:t> send student to </a:t>
             </a:r>
             <a:r>
-              <a:rPr lang="en-US" sz="1372" dirty="0" smtClean="0">
+              <a:rPr lang="en-US" sz="1372" dirty="0">
                 <a:solidFill>
                   <a:srgbClr val="FF0000"/>
                 </a:solidFill>
               </a:rPr>
               <a:t>card </a:t>
             </a:r>
-            <a:endParaRPr lang="en-US" sz="1372" dirty="0">
-              <a:solidFill>
-                <a:srgbClr val="FF0000"/>
-              </a:solidFill>
-            </a:endParaRPr>
           </a:p>
         </p:txBody>
       </p:sp>
@@ -3547,18 +3524,13 @@
           <a:lstStyle/>
           <a:p>
             <a:r>
-              <a:rPr lang="en-US" sz="1372" b="1" i="1" dirty="0" smtClean="0">
+              <a:rPr lang="en-US" sz="1372" b="1" i="1" dirty="0">
                 <a:solidFill>
                   <a:srgbClr val="FF0000"/>
                 </a:solidFill>
               </a:rPr>
               <a:t>&lt;parent&gt;</a:t>
             </a:r>
-            <a:endParaRPr lang="en-US" sz="1372" b="1" i="1" dirty="0">
-              <a:solidFill>
-                <a:srgbClr val="FF0000"/>
-              </a:solidFill>
-            </a:endParaRPr>
           </a:p>
         </p:txBody>
       </p:sp>
@@ -3632,10 +3604,9 @@
           <a:lstStyle/>
           <a:p>
             <a:r>
-              <a:rPr lang="en-US" sz="1372" dirty="0" smtClean="0"/>
+              <a:rPr lang="en-US" sz="1372" dirty="0"/>
               <a:t>Students[]</a:t>
             </a:r>
-            <a:endParaRPr lang="en-US" sz="1372" dirty="0"/>
           </a:p>
         </p:txBody>
       </p:sp>
@@ -3662,11 +3633,11 @@
           <a:lstStyle/>
           <a:p>
             <a:r>
-              <a:rPr lang="en-US" sz="1372" dirty="0" smtClean="0"/>
+              <a:rPr lang="en-US" sz="1372" dirty="0"/>
               <a:t>// </a:t>
             </a:r>
             <a:r>
-              <a:rPr lang="en-US" sz="1372" dirty="0" smtClean="0">
+              <a:rPr lang="en-US" sz="1372" dirty="0">
                 <a:solidFill>
                   <a:srgbClr val="FF0000"/>
                 </a:solidFill>
@@ -3674,22 +3645,17 @@
               <a:t>from</a:t>
             </a:r>
             <a:r>
-              <a:rPr lang="en-US" sz="1372" dirty="0" smtClean="0"/>
+              <a:rPr lang="en-US" sz="1372" dirty="0"/>
               <a:t> send the event validated to </a:t>
             </a:r>
             <a:r>
-              <a:rPr lang="en-US" sz="1372" dirty="0" smtClean="0">
+              <a:rPr lang="en-US" sz="1372" dirty="0">
                 <a:solidFill>
                   <a:srgbClr val="FF0000"/>
                 </a:solidFill>
               </a:rPr>
               <a:t>parent</a:t>
             </a:r>
-            <a:endParaRPr lang="en-US" sz="1372" dirty="0">
-              <a:solidFill>
-                <a:srgbClr val="FF0000"/>
-              </a:solidFill>
-            </a:endParaRPr>
           </a:p>
         </p:txBody>
       </p:sp>
@@ -3748,7 +3714,7 @@
         </p:nvSpPr>
         <p:spPr>
           <a:xfrm>
-            <a:off x="3418703" y="2992027"/>
+            <a:off x="3458459" y="2912514"/>
             <a:ext cx="926857" cy="303481"/>
           </a:xfrm>
           <a:prstGeom prst="rect">
@@ -3763,10 +3729,9 @@
           <a:lstStyle/>
           <a:p>
             <a:r>
-              <a:rPr lang="en-US" sz="1372" dirty="0" smtClean="0"/>
+              <a:rPr lang="en-US" sz="1372" dirty="0"/>
               <a:t>Students[]</a:t>
             </a:r>
-            <a:endParaRPr lang="en-US" sz="1372" dirty="0"/>
           </a:p>
         </p:txBody>
       </p:sp>
@@ -3793,18 +3758,13 @@
           <a:lstStyle/>
           <a:p>
             <a:r>
-              <a:rPr lang="en-US" sz="1372" b="1" i="1" dirty="0" smtClean="0">
+              <a:rPr lang="en-US" sz="1372" b="1" i="1" dirty="0">
                 <a:solidFill>
                   <a:srgbClr val="FF0000"/>
                 </a:solidFill>
               </a:rPr>
               <a:t>&lt;from&gt;</a:t>
             </a:r>
-            <a:endParaRPr lang="en-US" sz="1372" b="1" i="1" dirty="0">
-              <a:solidFill>
-                <a:srgbClr val="FF0000"/>
-              </a:solidFill>
-            </a:endParaRPr>
           </a:p>
         </p:txBody>
       </p:sp>
@@ -3878,10 +3838,9 @@
           <a:lstStyle/>
           <a:p>
             <a:r>
-              <a:rPr lang="en-US" sz="1372" dirty="0" smtClean="0"/>
+              <a:rPr lang="en-US" sz="1372" dirty="0"/>
               <a:t>Students[]</a:t>
             </a:r>
-            <a:endParaRPr lang="en-US" sz="1372" dirty="0"/>
           </a:p>
         </p:txBody>
       </p:sp>
@@ -3956,10 +3915,9 @@
           <a:lstStyle/>
           <a:p>
             <a:r>
-              <a:rPr lang="en-US" sz="1372" dirty="0" smtClean="0"/>
+              <a:rPr lang="en-US" sz="1372" dirty="0"/>
               <a:t>student</a:t>
             </a:r>
-            <a:endParaRPr lang="en-US" sz="1372" dirty="0"/>
           </a:p>
         </p:txBody>
       </p:sp>
@@ -3986,18 +3944,13 @@
           <a:lstStyle/>
           <a:p>
             <a:r>
-              <a:rPr lang="en-US" sz="1372" b="1" dirty="0" smtClean="0">
+              <a:rPr lang="en-US" sz="1372" b="1" dirty="0">
                 <a:solidFill>
                   <a:schemeClr val="accent6"/>
                 </a:solidFill>
               </a:rPr>
               <a:t>PROPS</a:t>
             </a:r>
-            <a:endParaRPr lang="en-US" sz="1372" b="1" dirty="0">
-              <a:solidFill>
-                <a:schemeClr val="accent6"/>
-              </a:solidFill>
-            </a:endParaRPr>
           </a:p>
         </p:txBody>
       </p:sp>
@@ -4024,18 +3977,13 @@
           <a:lstStyle/>
           <a:p>
             <a:r>
-              <a:rPr lang="en-US" sz="1372" b="1" i="1" dirty="0" smtClean="0">
+              <a:rPr lang="en-US" sz="1372" b="1" i="1" dirty="0">
                 <a:solidFill>
                   <a:srgbClr val="FF0000"/>
                 </a:solidFill>
               </a:rPr>
               <a:t>&lt;card&gt;</a:t>
             </a:r>
-            <a:endParaRPr lang="en-US" sz="1372" b="1" i="1" dirty="0">
-              <a:solidFill>
-                <a:srgbClr val="FF0000"/>
-              </a:solidFill>
-            </a:endParaRPr>
           </a:p>
         </p:txBody>
       </p:sp>
@@ -4110,7 +4058,7 @@
           <a:lstStyle/>
           <a:p>
             <a:r>
-              <a:rPr lang="en-US" sz="1372" dirty="0" err="1" smtClean="0"/>
+              <a:rPr lang="en-US" sz="1372" dirty="0" err="1"/>
               <a:t>valided</a:t>
             </a:r>
             <a:endParaRPr lang="en-US" sz="1372" dirty="0"/>
@@ -4140,18 +4088,13 @@
           <a:lstStyle/>
           <a:p>
             <a:r>
-              <a:rPr lang="en-US" sz="1372" b="1" dirty="0" smtClean="0">
+              <a:rPr lang="en-US" sz="1372" b="1" dirty="0">
                 <a:solidFill>
                   <a:srgbClr val="FF0000"/>
                 </a:solidFill>
               </a:rPr>
               <a:t>EMIT</a:t>
             </a:r>
-            <a:endParaRPr lang="en-US" sz="1372" b="1" dirty="0">
-              <a:solidFill>
-                <a:srgbClr val="FF0000"/>
-              </a:solidFill>
-            </a:endParaRPr>
           </a:p>
         </p:txBody>
       </p:sp>
@@ -4288,10 +4231,9 @@
           <a:lstStyle/>
           <a:p>
             <a:r>
-              <a:rPr lang="en-US" sz="1372" dirty="0" smtClean="0"/>
+              <a:rPr lang="en-US" sz="1372" dirty="0"/>
               <a:t>Students[]</a:t>
             </a:r>
-            <a:endParaRPr lang="en-US" sz="1372" dirty="0"/>
           </a:p>
         </p:txBody>
       </p:sp>
@@ -4318,11 +4260,11 @@
           <a:lstStyle/>
           <a:p>
             <a:r>
-              <a:rPr lang="en-US" sz="1372" dirty="0" smtClean="0"/>
+              <a:rPr lang="en-US" sz="1372" dirty="0"/>
               <a:t>// </a:t>
             </a:r>
             <a:r>
-              <a:rPr lang="en-US" sz="1372" dirty="0" smtClean="0">
+              <a:rPr lang="en-US" sz="1372" dirty="0">
                 <a:solidFill>
                   <a:srgbClr val="FF0000"/>
                 </a:solidFill>
@@ -4330,7 +4272,7 @@
               <a:t>app</a:t>
             </a:r>
             <a:r>
-              <a:rPr lang="en-US" sz="1372" dirty="0" smtClean="0"/>
+              <a:rPr lang="en-US" sz="1372" dirty="0"/>
               <a:t>  provides students to anymore</a:t>
             </a:r>
             <a:endParaRPr lang="en-US" sz="1372" dirty="0">
@@ -4411,10 +4353,9 @@
           <a:lstStyle/>
           <a:p>
             <a:r>
-              <a:rPr lang="en-US" sz="1372" dirty="0" smtClean="0"/>
+              <a:rPr lang="en-US" sz="1372" dirty="0"/>
               <a:t>Students[]</a:t>
             </a:r>
-            <a:endParaRPr lang="en-US" sz="1372" dirty="0"/>
           </a:p>
         </p:txBody>
       </p:sp>
@@ -4441,18 +4382,13 @@
           <a:lstStyle/>
           <a:p>
             <a:r>
-              <a:rPr lang="en-US" sz="1372" b="1" i="1" dirty="0" smtClean="0">
+              <a:rPr lang="en-US" sz="1372" b="1" i="1" dirty="0">
                 <a:solidFill>
                   <a:srgbClr val="FF0000"/>
                 </a:solidFill>
               </a:rPr>
               <a:t>&lt;dialog&gt;</a:t>
             </a:r>
-            <a:endParaRPr lang="en-US" sz="1372" b="1" i="1" dirty="0">
-              <a:solidFill>
-                <a:srgbClr val="FF0000"/>
-              </a:solidFill>
-            </a:endParaRPr>
           </a:p>
         </p:txBody>
       </p:sp>
@@ -4560,10 +4496,9 @@
           <a:lstStyle/>
           <a:p>
             <a:r>
-              <a:rPr lang="en-US" sz="1372" dirty="0" smtClean="0"/>
+              <a:rPr lang="en-US" sz="1372" dirty="0"/>
               <a:t>Students[]</a:t>
             </a:r>
-            <a:endParaRPr lang="en-US" sz="1372" dirty="0"/>
           </a:p>
         </p:txBody>
       </p:sp>
@@ -4638,18 +4573,13 @@
           <a:lstStyle/>
           <a:p>
             <a:r>
-              <a:rPr lang="en-US" sz="1372" b="1" dirty="0" smtClean="0">
+              <a:rPr lang="en-US" sz="1372" b="1" dirty="0">
                 <a:solidFill>
                   <a:schemeClr val="accent4"/>
                 </a:solidFill>
               </a:rPr>
               <a:t>INJECT</a:t>
             </a:r>
-            <a:endParaRPr lang="en-US" sz="1372" b="1" dirty="0">
-              <a:solidFill>
-                <a:schemeClr val="accent4"/>
-              </a:solidFill>
-            </a:endParaRPr>
           </a:p>
         </p:txBody>
       </p:sp>
@@ -4676,10 +4606,9 @@
           <a:lstStyle/>
           <a:p>
             <a:r>
-              <a:rPr lang="en-US" sz="1372" dirty="0" smtClean="0"/>
+              <a:rPr lang="en-US" sz="1372" dirty="0"/>
               <a:t>Students[]</a:t>
             </a:r>
-            <a:endParaRPr lang="en-US" sz="1372" dirty="0"/>
           </a:p>
         </p:txBody>
       </p:sp>
@@ -4706,11 +4635,11 @@
           <a:lstStyle/>
           <a:p>
             <a:r>
-              <a:rPr lang="en-US" sz="1372" dirty="0" smtClean="0"/>
+              <a:rPr lang="en-US" sz="1372" dirty="0"/>
               <a:t>// </a:t>
             </a:r>
             <a:r>
-              <a:rPr lang="en-US" sz="1372" dirty="0" smtClean="0">
+              <a:rPr lang="en-US" sz="1372" dirty="0">
                 <a:solidFill>
                   <a:srgbClr val="FF0000"/>
                 </a:solidFill>
@@ -4718,7 +4647,7 @@
               <a:t>dialog </a:t>
             </a:r>
             <a:r>
-              <a:rPr lang="en-US" sz="1372" dirty="0" smtClean="0"/>
+              <a:rPr lang="en-US" sz="1372" dirty="0"/>
               <a:t> gets students from a provider</a:t>
             </a:r>
             <a:endParaRPr lang="en-US" sz="1372" dirty="0">
@@ -4832,15 +4761,15 @@
           <a:lstStyle/>
           <a:p>
             <a:r>
-              <a:rPr lang="en-US" sz="1372" dirty="0" smtClean="0"/>
+              <a:rPr lang="en-US" sz="1372" dirty="0"/>
               <a:t>// </a:t>
             </a:r>
             <a:r>
-              <a:rPr lang="en-US" sz="1372" dirty="0" err="1" smtClean="0"/>
+              <a:rPr lang="en-US" sz="1372" dirty="0" err="1"/>
               <a:t>Vue</a:t>
             </a:r>
             <a:r>
-              <a:rPr lang="en-US" sz="1372" dirty="0" smtClean="0"/>
+              <a:rPr lang="en-US" sz="1372" dirty="0"/>
               <a:t> JS built-in component</a:t>
             </a:r>
             <a:endParaRPr lang="en-US" sz="1372" dirty="0">
@@ -4855,6 +4784,1863 @@
     <p:extLst>
       <p:ext uri="{BB962C8B-B14F-4D97-AF65-F5344CB8AC3E}">
         <p14:creationId xmlns:p14="http://schemas.microsoft.com/office/powerpoint/2010/main" val="3109588190"/>
+      </p:ext>
+    </p:extLst>
+  </p:cSld>
+  <p:clrMapOvr>
+    <a:masterClrMapping/>
+  </p:clrMapOvr>
+</p:sld>
+</file>
+
+<file path=ppt/slides/slide3.xml><?xml version="1.0" encoding="utf-8"?>
+<p:sld xmlns:a="http://schemas.openxmlformats.org/drawingml/2006/main" xmlns:r="http://schemas.openxmlformats.org/officeDocument/2006/relationships" xmlns:p="http://schemas.openxmlformats.org/presentationml/2006/main">
+  <p:cSld>
+    <p:spTree>
+      <p:nvGrpSpPr>
+        <p:cNvPr id="1" name=""/>
+        <p:cNvGrpSpPr/>
+        <p:nvPr/>
+      </p:nvGrpSpPr>
+      <p:grpSpPr>
+        <a:xfrm>
+          <a:off x="0" y="0"/>
+          <a:ext cx="0" cy="0"/>
+          <a:chOff x="0" y="0"/>
+          <a:chExt cx="0" cy="0"/>
+        </a:xfrm>
+      </p:grpSpPr>
+      <p:sp>
+        <p:nvSpPr>
+          <p:cNvPr id="4" name="TextBox 3">
+            <a:extLst>
+              <a:ext uri="{FF2B5EF4-FFF2-40B4-BE49-F238E27FC236}">
+                <a16:creationId xmlns:a16="http://schemas.microsoft.com/office/drawing/2014/main" id="{F603D8F1-08EF-4443-9F17-275E6EDFE94D}"/>
+              </a:ext>
+            </a:extLst>
+          </p:cNvPr>
+          <p:cNvSpPr txBox="1"/>
+          <p:nvPr/>
+        </p:nvSpPr>
+        <p:spPr>
+          <a:xfrm>
+            <a:off x="1009380" y="479624"/>
+            <a:ext cx="639919" cy="303481"/>
+          </a:xfrm>
+          <a:prstGeom prst="rect">
+            <a:avLst/>
+          </a:prstGeom>
+          <a:noFill/>
+        </p:spPr>
+        <p:txBody>
+          <a:bodyPr wrap="none" rtlCol="0">
+            <a:spAutoFit/>
+          </a:bodyPr>
+          <a:lstStyle/>
+          <a:p>
+            <a:r>
+              <a:rPr lang="en-US" sz="1372" b="1" i="1" dirty="0">
+                <a:solidFill>
+                  <a:srgbClr val="FF0000"/>
+                </a:solidFill>
+              </a:rPr>
+              <a:t>&lt;app&gt;</a:t>
+            </a:r>
+          </a:p>
+        </p:txBody>
+      </p:sp>
+      <p:sp>
+        <p:nvSpPr>
+          <p:cNvPr id="5" name="Rounded Rectangle 4">
+            <a:extLst>
+              <a:ext uri="{FF2B5EF4-FFF2-40B4-BE49-F238E27FC236}">
+                <a16:creationId xmlns:a16="http://schemas.microsoft.com/office/drawing/2014/main" id="{AECBDDFC-704F-4D47-861E-4627B16C1267}"/>
+              </a:ext>
+            </a:extLst>
+          </p:cNvPr>
+          <p:cNvSpPr/>
+          <p:nvPr/>
+        </p:nvSpPr>
+        <p:spPr>
+          <a:xfrm>
+            <a:off x="523323" y="282539"/>
+            <a:ext cx="1650319" cy="1166483"/>
+          </a:xfrm>
+          <a:prstGeom prst="roundRect">
+            <a:avLst/>
+          </a:prstGeom>
+          <a:noFill/>
+          <a:ln>
+            <a:solidFill>
+              <a:srgbClr val="FF0000"/>
+            </a:solidFill>
+            <a:prstDash val="lgDash"/>
+          </a:ln>
+        </p:spPr>
+        <p:style>
+          <a:lnRef idx="2">
+            <a:schemeClr val="accent1">
+              <a:shade val="50000"/>
+            </a:schemeClr>
+          </a:lnRef>
+          <a:fillRef idx="1">
+            <a:schemeClr val="accent1"/>
+          </a:fillRef>
+          <a:effectRef idx="0">
+            <a:schemeClr val="accent1"/>
+          </a:effectRef>
+          <a:fontRef idx="minor">
+            <a:schemeClr val="lt1"/>
+          </a:fontRef>
+        </p:style>
+        <p:txBody>
+          <a:bodyPr rtlCol="0" anchor="ctr"/>
+          <a:lstStyle/>
+          <a:p>
+            <a:pPr algn="ctr"/>
+            <a:endParaRPr lang="en-US" sz="1372"/>
+          </a:p>
+        </p:txBody>
+      </p:sp>
+      <p:sp>
+        <p:nvSpPr>
+          <p:cNvPr id="6" name="TextBox 5">
+            <a:extLst>
+              <a:ext uri="{FF2B5EF4-FFF2-40B4-BE49-F238E27FC236}">
+                <a16:creationId xmlns:a16="http://schemas.microsoft.com/office/drawing/2014/main" id="{21ED7FC0-EB76-4812-8A1D-4F713A4B3A31}"/>
+              </a:ext>
+            </a:extLst>
+          </p:cNvPr>
+          <p:cNvSpPr txBox="1"/>
+          <p:nvPr/>
+        </p:nvSpPr>
+        <p:spPr>
+          <a:xfrm>
+            <a:off x="885053" y="892284"/>
+            <a:ext cx="762325" cy="303481"/>
+          </a:xfrm>
+          <a:prstGeom prst="rect">
+            <a:avLst/>
+          </a:prstGeom>
+          <a:noFill/>
+        </p:spPr>
+        <p:txBody>
+          <a:bodyPr wrap="none" rtlCol="0">
+            <a:spAutoFit/>
+          </a:bodyPr>
+          <a:lstStyle/>
+          <a:p>
+            <a:r>
+              <a:rPr lang="en-US" sz="1372" dirty="0"/>
+              <a:t>Events[]</a:t>
+            </a:r>
+          </a:p>
+        </p:txBody>
+      </p:sp>
+      <p:sp>
+        <p:nvSpPr>
+          <p:cNvPr id="7" name="TextBox 6">
+            <a:extLst>
+              <a:ext uri="{FF2B5EF4-FFF2-40B4-BE49-F238E27FC236}">
+                <a16:creationId xmlns:a16="http://schemas.microsoft.com/office/drawing/2014/main" id="{2C01FD8A-77C6-4BE9-BA6A-60695FF603E6}"/>
+              </a:ext>
+            </a:extLst>
+          </p:cNvPr>
+          <p:cNvSpPr txBox="1"/>
+          <p:nvPr/>
+        </p:nvSpPr>
+        <p:spPr>
+          <a:xfrm>
+            <a:off x="1009380" y="2556074"/>
+            <a:ext cx="639919" cy="303481"/>
+          </a:xfrm>
+          <a:prstGeom prst="rect">
+            <a:avLst/>
+          </a:prstGeom>
+          <a:noFill/>
+        </p:spPr>
+        <p:txBody>
+          <a:bodyPr wrap="none" rtlCol="0">
+            <a:spAutoFit/>
+          </a:bodyPr>
+          <a:lstStyle/>
+          <a:p>
+            <a:r>
+              <a:rPr lang="en-US" sz="1372" b="1" i="1" dirty="0">
+                <a:solidFill>
+                  <a:srgbClr val="FF0000"/>
+                </a:solidFill>
+              </a:rPr>
+              <a:t>&lt;app&gt;</a:t>
+            </a:r>
+          </a:p>
+        </p:txBody>
+      </p:sp>
+      <p:sp>
+        <p:nvSpPr>
+          <p:cNvPr id="8" name="Rounded Rectangle 8">
+            <a:extLst>
+              <a:ext uri="{FF2B5EF4-FFF2-40B4-BE49-F238E27FC236}">
+                <a16:creationId xmlns:a16="http://schemas.microsoft.com/office/drawing/2014/main" id="{5984B409-21D7-4717-A495-F99B1FC32C44}"/>
+              </a:ext>
+            </a:extLst>
+          </p:cNvPr>
+          <p:cNvSpPr/>
+          <p:nvPr/>
+        </p:nvSpPr>
+        <p:spPr>
+          <a:xfrm>
+            <a:off x="523323" y="2385493"/>
+            <a:ext cx="1650319" cy="1166483"/>
+          </a:xfrm>
+          <a:prstGeom prst="roundRect">
+            <a:avLst/>
+          </a:prstGeom>
+          <a:noFill/>
+          <a:ln>
+            <a:solidFill>
+              <a:srgbClr val="FF0000"/>
+            </a:solidFill>
+            <a:prstDash val="lgDash"/>
+          </a:ln>
+        </p:spPr>
+        <p:style>
+          <a:lnRef idx="2">
+            <a:schemeClr val="accent1">
+              <a:shade val="50000"/>
+            </a:schemeClr>
+          </a:lnRef>
+          <a:fillRef idx="1">
+            <a:schemeClr val="accent1"/>
+          </a:fillRef>
+          <a:effectRef idx="0">
+            <a:schemeClr val="accent1"/>
+          </a:effectRef>
+          <a:fontRef idx="minor">
+            <a:schemeClr val="lt1"/>
+          </a:fontRef>
+        </p:style>
+        <p:txBody>
+          <a:bodyPr rtlCol="0" anchor="ctr"/>
+          <a:lstStyle/>
+          <a:p>
+            <a:pPr algn="ctr"/>
+            <a:endParaRPr lang="en-US" sz="1372"/>
+          </a:p>
+        </p:txBody>
+      </p:sp>
+      <p:sp>
+        <p:nvSpPr>
+          <p:cNvPr id="9" name="TextBox 8">
+            <a:extLst>
+              <a:ext uri="{FF2B5EF4-FFF2-40B4-BE49-F238E27FC236}">
+                <a16:creationId xmlns:a16="http://schemas.microsoft.com/office/drawing/2014/main" id="{F28F50CC-A10C-4D74-8764-49F22B341157}"/>
+              </a:ext>
+            </a:extLst>
+          </p:cNvPr>
+          <p:cNvSpPr txBox="1"/>
+          <p:nvPr/>
+        </p:nvSpPr>
+        <p:spPr>
+          <a:xfrm>
+            <a:off x="885053" y="2968734"/>
+            <a:ext cx="762325" cy="303481"/>
+          </a:xfrm>
+          <a:prstGeom prst="rect">
+            <a:avLst/>
+          </a:prstGeom>
+          <a:noFill/>
+        </p:spPr>
+        <p:txBody>
+          <a:bodyPr wrap="none" rtlCol="0">
+            <a:spAutoFit/>
+          </a:bodyPr>
+          <a:lstStyle/>
+          <a:p>
+            <a:r>
+              <a:rPr lang="en-US" sz="1372" dirty="0"/>
+              <a:t>Events[]</a:t>
+            </a:r>
+          </a:p>
+        </p:txBody>
+      </p:sp>
+      <p:sp>
+        <p:nvSpPr>
+          <p:cNvPr id="10" name="TextBox 9">
+            <a:extLst>
+              <a:ext uri="{FF2B5EF4-FFF2-40B4-BE49-F238E27FC236}">
+                <a16:creationId xmlns:a16="http://schemas.microsoft.com/office/drawing/2014/main" id="{4A07FDCD-08F5-4A0B-ABDB-FB2831955B94}"/>
+              </a:ext>
+            </a:extLst>
+          </p:cNvPr>
+          <p:cNvSpPr txBox="1"/>
+          <p:nvPr/>
+        </p:nvSpPr>
+        <p:spPr>
+          <a:xfrm>
+            <a:off x="464251" y="3703715"/>
+            <a:ext cx="2183996" cy="303481"/>
+          </a:xfrm>
+          <a:prstGeom prst="rect">
+            <a:avLst/>
+          </a:prstGeom>
+          <a:noFill/>
+        </p:spPr>
+        <p:txBody>
+          <a:bodyPr wrap="none" rtlCol="0">
+            <a:spAutoFit/>
+          </a:bodyPr>
+          <a:lstStyle/>
+          <a:p>
+            <a:r>
+              <a:rPr lang="en-US" sz="1372" dirty="0"/>
+              <a:t>// </a:t>
+            </a:r>
+            <a:r>
+              <a:rPr lang="en-US" sz="1372" dirty="0">
+                <a:solidFill>
+                  <a:srgbClr val="FF0000"/>
+                </a:solidFill>
+              </a:rPr>
+              <a:t>app</a:t>
+            </a:r>
+            <a:r>
+              <a:rPr lang="en-US" sz="1372" dirty="0"/>
+              <a:t> send student to </a:t>
+            </a:r>
+            <a:r>
+              <a:rPr lang="en-US" sz="1372" dirty="0">
+                <a:solidFill>
+                  <a:srgbClr val="FF0000"/>
+                </a:solidFill>
+              </a:rPr>
+              <a:t>card </a:t>
+            </a:r>
+          </a:p>
+        </p:txBody>
+      </p:sp>
+      <p:sp>
+        <p:nvSpPr>
+          <p:cNvPr id="11" name="TextBox 10">
+            <a:extLst>
+              <a:ext uri="{FF2B5EF4-FFF2-40B4-BE49-F238E27FC236}">
+                <a16:creationId xmlns:a16="http://schemas.microsoft.com/office/drawing/2014/main" id="{8F9A62E3-3FD7-4862-8D55-5360353FFB08}"/>
+              </a:ext>
+            </a:extLst>
+          </p:cNvPr>
+          <p:cNvSpPr txBox="1"/>
+          <p:nvPr/>
+        </p:nvSpPr>
+        <p:spPr>
+          <a:xfrm>
+            <a:off x="929930" y="4751361"/>
+            <a:ext cx="848309" cy="303481"/>
+          </a:xfrm>
+          <a:prstGeom prst="rect">
+            <a:avLst/>
+          </a:prstGeom>
+          <a:noFill/>
+        </p:spPr>
+        <p:txBody>
+          <a:bodyPr wrap="none" rtlCol="0">
+            <a:spAutoFit/>
+          </a:bodyPr>
+          <a:lstStyle/>
+          <a:p>
+            <a:r>
+              <a:rPr lang="en-US" sz="1372" b="1" i="1" dirty="0">
+                <a:solidFill>
+                  <a:srgbClr val="FF0000"/>
+                </a:solidFill>
+              </a:rPr>
+              <a:t>&lt;parent&gt;</a:t>
+            </a:r>
+          </a:p>
+        </p:txBody>
+      </p:sp>
+      <p:sp>
+        <p:nvSpPr>
+          <p:cNvPr id="12" name="Rounded Rectangle 12">
+            <a:extLst>
+              <a:ext uri="{FF2B5EF4-FFF2-40B4-BE49-F238E27FC236}">
+                <a16:creationId xmlns:a16="http://schemas.microsoft.com/office/drawing/2014/main" id="{10C24EC5-4E49-4585-8FDF-ACE40734C13B}"/>
+              </a:ext>
+            </a:extLst>
+          </p:cNvPr>
+          <p:cNvSpPr/>
+          <p:nvPr/>
+        </p:nvSpPr>
+        <p:spPr>
+          <a:xfrm>
+            <a:off x="523323" y="4632524"/>
+            <a:ext cx="1650319" cy="1166483"/>
+          </a:xfrm>
+          <a:prstGeom prst="roundRect">
+            <a:avLst/>
+          </a:prstGeom>
+          <a:noFill/>
+          <a:ln>
+            <a:solidFill>
+              <a:srgbClr val="FF0000"/>
+            </a:solidFill>
+            <a:prstDash val="lgDash"/>
+          </a:ln>
+        </p:spPr>
+        <p:style>
+          <a:lnRef idx="2">
+            <a:schemeClr val="accent1">
+              <a:shade val="50000"/>
+            </a:schemeClr>
+          </a:lnRef>
+          <a:fillRef idx="1">
+            <a:schemeClr val="accent1"/>
+          </a:fillRef>
+          <a:effectRef idx="0">
+            <a:schemeClr val="accent1"/>
+          </a:effectRef>
+          <a:fontRef idx="minor">
+            <a:schemeClr val="lt1"/>
+          </a:fontRef>
+        </p:style>
+        <p:txBody>
+          <a:bodyPr rtlCol="0" anchor="ctr"/>
+          <a:lstStyle/>
+          <a:p>
+            <a:pPr algn="ctr"/>
+            <a:endParaRPr lang="en-US" sz="1372"/>
+          </a:p>
+        </p:txBody>
+      </p:sp>
+      <p:sp>
+        <p:nvSpPr>
+          <p:cNvPr id="13" name="TextBox 12">
+            <a:extLst>
+              <a:ext uri="{FF2B5EF4-FFF2-40B4-BE49-F238E27FC236}">
+                <a16:creationId xmlns:a16="http://schemas.microsoft.com/office/drawing/2014/main" id="{2861285A-F449-4BAB-848D-211DDB9D5552}"/>
+              </a:ext>
+            </a:extLst>
+          </p:cNvPr>
+          <p:cNvSpPr txBox="1"/>
+          <p:nvPr/>
+        </p:nvSpPr>
+        <p:spPr>
+          <a:xfrm>
+            <a:off x="885053" y="5215765"/>
+            <a:ext cx="762325" cy="303481"/>
+          </a:xfrm>
+          <a:prstGeom prst="rect">
+            <a:avLst/>
+          </a:prstGeom>
+          <a:noFill/>
+        </p:spPr>
+        <p:txBody>
+          <a:bodyPr wrap="none" rtlCol="0">
+            <a:spAutoFit/>
+          </a:bodyPr>
+          <a:lstStyle/>
+          <a:p>
+            <a:r>
+              <a:rPr lang="en-US" sz="1372" dirty="0"/>
+              <a:t>Events[]</a:t>
+            </a:r>
+          </a:p>
+        </p:txBody>
+      </p:sp>
+      <p:sp>
+        <p:nvSpPr>
+          <p:cNvPr id="14" name="TextBox 13">
+            <a:extLst>
+              <a:ext uri="{FF2B5EF4-FFF2-40B4-BE49-F238E27FC236}">
+                <a16:creationId xmlns:a16="http://schemas.microsoft.com/office/drawing/2014/main" id="{67CC9793-504B-4339-85E3-E3EBD0C5FE65}"/>
+              </a:ext>
+            </a:extLst>
+          </p:cNvPr>
+          <p:cNvSpPr txBox="1"/>
+          <p:nvPr/>
+        </p:nvSpPr>
+        <p:spPr>
+          <a:xfrm>
+            <a:off x="394083" y="6064417"/>
+            <a:ext cx="3216522" cy="303481"/>
+          </a:xfrm>
+          <a:prstGeom prst="rect">
+            <a:avLst/>
+          </a:prstGeom>
+          <a:noFill/>
+        </p:spPr>
+        <p:txBody>
+          <a:bodyPr wrap="none" rtlCol="0">
+            <a:spAutoFit/>
+          </a:bodyPr>
+          <a:lstStyle/>
+          <a:p>
+            <a:r>
+              <a:rPr lang="en-US" sz="1372" dirty="0"/>
+              <a:t>// </a:t>
+            </a:r>
+            <a:r>
+              <a:rPr lang="en-US" sz="1372" dirty="0">
+                <a:solidFill>
+                  <a:srgbClr val="FF0000"/>
+                </a:solidFill>
+              </a:rPr>
+              <a:t>from</a:t>
+            </a:r>
+            <a:r>
+              <a:rPr lang="en-US" sz="1372" dirty="0"/>
+              <a:t> send the event validated to </a:t>
+            </a:r>
+            <a:r>
+              <a:rPr lang="en-US" sz="1372" dirty="0">
+                <a:solidFill>
+                  <a:srgbClr val="FF0000"/>
+                </a:solidFill>
+              </a:rPr>
+              <a:t>parent</a:t>
+            </a:r>
+          </a:p>
+        </p:txBody>
+      </p:sp>
+      <p:sp>
+        <p:nvSpPr>
+          <p:cNvPr id="15" name="Rounded Rectangle 16">
+            <a:extLst>
+              <a:ext uri="{FF2B5EF4-FFF2-40B4-BE49-F238E27FC236}">
+                <a16:creationId xmlns:a16="http://schemas.microsoft.com/office/drawing/2014/main" id="{3F82F921-2F1B-460E-B619-CE94DFD8296B}"/>
+              </a:ext>
+            </a:extLst>
+          </p:cNvPr>
+          <p:cNvSpPr/>
+          <p:nvPr/>
+        </p:nvSpPr>
+        <p:spPr>
+          <a:xfrm>
+            <a:off x="3056973" y="2408786"/>
+            <a:ext cx="1650319" cy="1166483"/>
+          </a:xfrm>
+          <a:prstGeom prst="roundRect">
+            <a:avLst/>
+          </a:prstGeom>
+          <a:noFill/>
+          <a:ln>
+            <a:solidFill>
+              <a:srgbClr val="FF0000"/>
+            </a:solidFill>
+            <a:prstDash val="lgDash"/>
+          </a:ln>
+        </p:spPr>
+        <p:style>
+          <a:lnRef idx="2">
+            <a:schemeClr val="accent1">
+              <a:shade val="50000"/>
+            </a:schemeClr>
+          </a:lnRef>
+          <a:fillRef idx="1">
+            <a:schemeClr val="accent1"/>
+          </a:fillRef>
+          <a:effectRef idx="0">
+            <a:schemeClr val="accent1"/>
+          </a:effectRef>
+          <a:fontRef idx="minor">
+            <a:schemeClr val="lt1"/>
+          </a:fontRef>
+        </p:style>
+        <p:txBody>
+          <a:bodyPr rtlCol="0" anchor="ctr"/>
+          <a:lstStyle/>
+          <a:p>
+            <a:pPr algn="ctr"/>
+            <a:endParaRPr lang="en-US" sz="1372"/>
+          </a:p>
+        </p:txBody>
+      </p:sp>
+      <p:sp>
+        <p:nvSpPr>
+          <p:cNvPr id="16" name="TextBox 15">
+            <a:extLst>
+              <a:ext uri="{FF2B5EF4-FFF2-40B4-BE49-F238E27FC236}">
+                <a16:creationId xmlns:a16="http://schemas.microsoft.com/office/drawing/2014/main" id="{6B6A179B-3BA4-4771-96A7-50B411075F6D}"/>
+              </a:ext>
+            </a:extLst>
+          </p:cNvPr>
+          <p:cNvSpPr txBox="1"/>
+          <p:nvPr/>
+        </p:nvSpPr>
+        <p:spPr>
+          <a:xfrm>
+            <a:off x="3458459" y="2912514"/>
+            <a:ext cx="762325" cy="303481"/>
+          </a:xfrm>
+          <a:prstGeom prst="rect">
+            <a:avLst/>
+          </a:prstGeom>
+          <a:noFill/>
+        </p:spPr>
+        <p:txBody>
+          <a:bodyPr wrap="none" rtlCol="0">
+            <a:spAutoFit/>
+          </a:bodyPr>
+          <a:lstStyle/>
+          <a:p>
+            <a:r>
+              <a:rPr lang="en-US" sz="1372" dirty="0"/>
+              <a:t>Events[]</a:t>
+            </a:r>
+          </a:p>
+        </p:txBody>
+      </p:sp>
+      <p:sp>
+        <p:nvSpPr>
+          <p:cNvPr id="17" name="TextBox 16">
+            <a:extLst>
+              <a:ext uri="{FF2B5EF4-FFF2-40B4-BE49-F238E27FC236}">
+                <a16:creationId xmlns:a16="http://schemas.microsoft.com/office/drawing/2014/main" id="{885C61FA-3FD2-4114-AC30-D26143615622}"/>
+              </a:ext>
+            </a:extLst>
+          </p:cNvPr>
+          <p:cNvSpPr txBox="1"/>
+          <p:nvPr/>
+        </p:nvSpPr>
+        <p:spPr>
+          <a:xfrm>
+            <a:off x="3463716" y="4744084"/>
+            <a:ext cx="1174168" cy="303481"/>
+          </a:xfrm>
+          <a:prstGeom prst="rect">
+            <a:avLst/>
+          </a:prstGeom>
+          <a:noFill/>
+        </p:spPr>
+        <p:txBody>
+          <a:bodyPr wrap="none" rtlCol="0">
+            <a:spAutoFit/>
+          </a:bodyPr>
+          <a:lstStyle/>
+          <a:p>
+            <a:r>
+              <a:rPr lang="en-US" sz="1372" b="1" i="1" dirty="0">
+                <a:solidFill>
+                  <a:srgbClr val="FF0000"/>
+                </a:solidFill>
+              </a:rPr>
+              <a:t>&lt;event-form&gt;</a:t>
+            </a:r>
+          </a:p>
+        </p:txBody>
+      </p:sp>
+      <p:sp>
+        <p:nvSpPr>
+          <p:cNvPr id="18" name="Rounded Rectangle 19">
+            <a:extLst>
+              <a:ext uri="{FF2B5EF4-FFF2-40B4-BE49-F238E27FC236}">
+                <a16:creationId xmlns:a16="http://schemas.microsoft.com/office/drawing/2014/main" id="{4A62E5E1-EBA4-4FD0-8F8D-FCDE381FC4C6}"/>
+              </a:ext>
+            </a:extLst>
+          </p:cNvPr>
+          <p:cNvSpPr/>
+          <p:nvPr/>
+        </p:nvSpPr>
+        <p:spPr>
+          <a:xfrm>
+            <a:off x="3180026" y="4608861"/>
+            <a:ext cx="1650319" cy="1166483"/>
+          </a:xfrm>
+          <a:prstGeom prst="roundRect">
+            <a:avLst/>
+          </a:prstGeom>
+          <a:noFill/>
+          <a:ln>
+            <a:solidFill>
+              <a:srgbClr val="FF0000"/>
+            </a:solidFill>
+            <a:prstDash val="lgDash"/>
+          </a:ln>
+        </p:spPr>
+        <p:style>
+          <a:lnRef idx="2">
+            <a:schemeClr val="accent1">
+              <a:shade val="50000"/>
+            </a:schemeClr>
+          </a:lnRef>
+          <a:fillRef idx="1">
+            <a:schemeClr val="accent1"/>
+          </a:fillRef>
+          <a:effectRef idx="0">
+            <a:schemeClr val="accent1"/>
+          </a:effectRef>
+          <a:fontRef idx="minor">
+            <a:schemeClr val="lt1"/>
+          </a:fontRef>
+        </p:style>
+        <p:txBody>
+          <a:bodyPr rtlCol="0" anchor="ctr"/>
+          <a:lstStyle/>
+          <a:p>
+            <a:pPr algn="ctr"/>
+            <a:endParaRPr lang="en-US" sz="1372"/>
+          </a:p>
+        </p:txBody>
+      </p:sp>
+      <p:sp>
+        <p:nvSpPr>
+          <p:cNvPr id="19" name="TextBox 18">
+            <a:extLst>
+              <a:ext uri="{FF2B5EF4-FFF2-40B4-BE49-F238E27FC236}">
+                <a16:creationId xmlns:a16="http://schemas.microsoft.com/office/drawing/2014/main" id="{AD9DFF90-40BF-48BB-9835-46540EB06982}"/>
+              </a:ext>
+            </a:extLst>
+          </p:cNvPr>
+          <p:cNvSpPr txBox="1"/>
+          <p:nvPr/>
+        </p:nvSpPr>
+        <p:spPr>
+          <a:xfrm>
+            <a:off x="3541756" y="5192102"/>
+            <a:ext cx="762325" cy="303481"/>
+          </a:xfrm>
+          <a:prstGeom prst="rect">
+            <a:avLst/>
+          </a:prstGeom>
+          <a:noFill/>
+        </p:spPr>
+        <p:txBody>
+          <a:bodyPr wrap="none" rtlCol="0">
+            <a:spAutoFit/>
+          </a:bodyPr>
+          <a:lstStyle/>
+          <a:p>
+            <a:r>
+              <a:rPr lang="en-US" sz="1372" dirty="0"/>
+              <a:t>Events[]</a:t>
+            </a:r>
+          </a:p>
+        </p:txBody>
+      </p:sp>
+      <p:sp>
+        <p:nvSpPr>
+          <p:cNvPr id="20" name="Right Arrow 21">
+            <a:extLst>
+              <a:ext uri="{FF2B5EF4-FFF2-40B4-BE49-F238E27FC236}">
+                <a16:creationId xmlns:a16="http://schemas.microsoft.com/office/drawing/2014/main" id="{1AE346E5-C89E-44CF-BA1B-48EF9EAA99C9}"/>
+              </a:ext>
+            </a:extLst>
+          </p:cNvPr>
+          <p:cNvSpPr/>
+          <p:nvPr/>
+        </p:nvSpPr>
+        <p:spPr>
+          <a:xfrm>
+            <a:off x="2197551" y="2768367"/>
+            <a:ext cx="696809" cy="333683"/>
+          </a:xfrm>
+          <a:prstGeom prst="rightArrow">
+            <a:avLst/>
+          </a:prstGeom>
+          <a:solidFill>
+            <a:schemeClr val="accent6"/>
+          </a:solidFill>
+        </p:spPr>
+        <p:style>
+          <a:lnRef idx="2">
+            <a:schemeClr val="accent1">
+              <a:shade val="50000"/>
+            </a:schemeClr>
+          </a:lnRef>
+          <a:fillRef idx="1">
+            <a:schemeClr val="accent1"/>
+          </a:fillRef>
+          <a:effectRef idx="0">
+            <a:schemeClr val="accent1"/>
+          </a:effectRef>
+          <a:fontRef idx="minor">
+            <a:schemeClr val="lt1"/>
+          </a:fontRef>
+        </p:style>
+        <p:txBody>
+          <a:bodyPr rot="0" spcFirstLastPara="0" vertOverflow="overflow" horzOverflow="overflow" vert="horz" wrap="square" lIns="69681" tIns="34840" rIns="69681" bIns="34840" numCol="1" spcCol="0" rtlCol="0" fromWordArt="0" anchor="ctr" anchorCtr="0" forceAA="0" compatLnSpc="1">
+            <a:prstTxWarp prst="textNoShape">
+              <a:avLst/>
+            </a:prstTxWarp>
+            <a:noAutofit/>
+          </a:bodyPr>
+          <a:lstStyle/>
+          <a:p>
+            <a:pPr algn="ctr"/>
+            <a:endParaRPr lang="en-US" sz="1372"/>
+          </a:p>
+        </p:txBody>
+      </p:sp>
+      <p:sp>
+        <p:nvSpPr>
+          <p:cNvPr id="21" name="TextBox 20">
+            <a:extLst>
+              <a:ext uri="{FF2B5EF4-FFF2-40B4-BE49-F238E27FC236}">
+                <a16:creationId xmlns:a16="http://schemas.microsoft.com/office/drawing/2014/main" id="{26AA752D-49DB-4177-AF62-D293FC172DBA}"/>
+              </a:ext>
+            </a:extLst>
+          </p:cNvPr>
+          <p:cNvSpPr txBox="1"/>
+          <p:nvPr/>
+        </p:nvSpPr>
+        <p:spPr>
+          <a:xfrm>
+            <a:off x="2169858" y="3120474"/>
+            <a:ext cx="584391" cy="303481"/>
+          </a:xfrm>
+          <a:prstGeom prst="rect">
+            <a:avLst/>
+          </a:prstGeom>
+          <a:noFill/>
+        </p:spPr>
+        <p:txBody>
+          <a:bodyPr wrap="none" rtlCol="0">
+            <a:spAutoFit/>
+          </a:bodyPr>
+          <a:lstStyle/>
+          <a:p>
+            <a:r>
+              <a:rPr lang="en-US" sz="1372" dirty="0"/>
+              <a:t>Event</a:t>
+            </a:r>
+          </a:p>
+        </p:txBody>
+      </p:sp>
+      <p:sp>
+        <p:nvSpPr>
+          <p:cNvPr id="22" name="TextBox 21">
+            <a:extLst>
+              <a:ext uri="{FF2B5EF4-FFF2-40B4-BE49-F238E27FC236}">
+                <a16:creationId xmlns:a16="http://schemas.microsoft.com/office/drawing/2014/main" id="{BFB16E60-D49E-453C-8642-6DE51DB34CEF}"/>
+              </a:ext>
+            </a:extLst>
+          </p:cNvPr>
+          <p:cNvSpPr txBox="1"/>
+          <p:nvPr/>
+        </p:nvSpPr>
+        <p:spPr>
+          <a:xfrm>
+            <a:off x="2188492" y="2550268"/>
+            <a:ext cx="670248" cy="303481"/>
+          </a:xfrm>
+          <a:prstGeom prst="rect">
+            <a:avLst/>
+          </a:prstGeom>
+          <a:noFill/>
+        </p:spPr>
+        <p:txBody>
+          <a:bodyPr wrap="none" rtlCol="0">
+            <a:spAutoFit/>
+          </a:bodyPr>
+          <a:lstStyle/>
+          <a:p>
+            <a:r>
+              <a:rPr lang="en-US" sz="1372" b="1" dirty="0">
+                <a:solidFill>
+                  <a:schemeClr val="accent6"/>
+                </a:solidFill>
+              </a:rPr>
+              <a:t>PROPS</a:t>
+            </a:r>
+          </a:p>
+        </p:txBody>
+      </p:sp>
+      <p:sp>
+        <p:nvSpPr>
+          <p:cNvPr id="23" name="TextBox 22">
+            <a:extLst>
+              <a:ext uri="{FF2B5EF4-FFF2-40B4-BE49-F238E27FC236}">
+                <a16:creationId xmlns:a16="http://schemas.microsoft.com/office/drawing/2014/main" id="{52B88FF8-B492-4024-A72C-09F3B513FC0F}"/>
+              </a:ext>
+            </a:extLst>
+          </p:cNvPr>
+          <p:cNvSpPr txBox="1"/>
+          <p:nvPr/>
+        </p:nvSpPr>
+        <p:spPr>
+          <a:xfrm>
+            <a:off x="3562171" y="2587817"/>
+            <a:ext cx="1142044" cy="303481"/>
+          </a:xfrm>
+          <a:prstGeom prst="rect">
+            <a:avLst/>
+          </a:prstGeom>
+          <a:noFill/>
+        </p:spPr>
+        <p:txBody>
+          <a:bodyPr wrap="none" rtlCol="0">
+            <a:spAutoFit/>
+          </a:bodyPr>
+          <a:lstStyle/>
+          <a:p>
+            <a:r>
+              <a:rPr lang="en-US" sz="1372" b="1" i="1" dirty="0">
+                <a:solidFill>
+                  <a:srgbClr val="FF0000"/>
+                </a:solidFill>
+              </a:rPr>
+              <a:t>&lt;event-card&gt;</a:t>
+            </a:r>
+          </a:p>
+        </p:txBody>
+      </p:sp>
+      <p:sp>
+        <p:nvSpPr>
+          <p:cNvPr id="24" name="Right Arrow 25">
+            <a:extLst>
+              <a:ext uri="{FF2B5EF4-FFF2-40B4-BE49-F238E27FC236}">
+                <a16:creationId xmlns:a16="http://schemas.microsoft.com/office/drawing/2014/main" id="{14FB65C7-2CAB-47C0-A4C1-61260D11309F}"/>
+              </a:ext>
+            </a:extLst>
+          </p:cNvPr>
+          <p:cNvSpPr/>
+          <p:nvPr/>
+        </p:nvSpPr>
+        <p:spPr>
+          <a:xfrm flipH="1">
+            <a:off x="2387600" y="5000637"/>
+            <a:ext cx="792424" cy="400041"/>
+          </a:xfrm>
+          <a:prstGeom prst="rightArrow">
+            <a:avLst/>
+          </a:prstGeom>
+          <a:solidFill>
+            <a:srgbClr val="FF0000"/>
+          </a:solidFill>
+        </p:spPr>
+        <p:style>
+          <a:lnRef idx="2">
+            <a:schemeClr val="accent1">
+              <a:shade val="50000"/>
+            </a:schemeClr>
+          </a:lnRef>
+          <a:fillRef idx="1">
+            <a:schemeClr val="accent1"/>
+          </a:fillRef>
+          <a:effectRef idx="0">
+            <a:schemeClr val="accent1"/>
+          </a:effectRef>
+          <a:fontRef idx="minor">
+            <a:schemeClr val="lt1"/>
+          </a:fontRef>
+        </p:style>
+        <p:txBody>
+          <a:bodyPr rot="0" spcFirstLastPara="0" vertOverflow="overflow" horzOverflow="overflow" vert="horz" wrap="square" lIns="69681" tIns="34840" rIns="69681" bIns="34840" numCol="1" spcCol="0" rtlCol="0" fromWordArt="0" anchor="ctr" anchorCtr="0" forceAA="0" compatLnSpc="1">
+            <a:prstTxWarp prst="textNoShape">
+              <a:avLst/>
+            </a:prstTxWarp>
+            <a:noAutofit/>
+          </a:bodyPr>
+          <a:lstStyle/>
+          <a:p>
+            <a:pPr algn="ctr"/>
+            <a:endParaRPr lang="en-US" sz="1372"/>
+          </a:p>
+        </p:txBody>
+      </p:sp>
+      <p:sp>
+        <p:nvSpPr>
+          <p:cNvPr id="25" name="TextBox 24">
+            <a:extLst>
+              <a:ext uri="{FF2B5EF4-FFF2-40B4-BE49-F238E27FC236}">
+                <a16:creationId xmlns:a16="http://schemas.microsoft.com/office/drawing/2014/main" id="{DCC24B8B-B5D8-45EA-BD56-5C727002CD7E}"/>
+              </a:ext>
+            </a:extLst>
+          </p:cNvPr>
+          <p:cNvSpPr txBox="1"/>
+          <p:nvPr/>
+        </p:nvSpPr>
+        <p:spPr>
+          <a:xfrm>
+            <a:off x="2523616" y="5336639"/>
+            <a:ext cx="701474" cy="303481"/>
+          </a:xfrm>
+          <a:prstGeom prst="rect">
+            <a:avLst/>
+          </a:prstGeom>
+          <a:noFill/>
+        </p:spPr>
+        <p:txBody>
+          <a:bodyPr wrap="none" rtlCol="0">
+            <a:spAutoFit/>
+          </a:bodyPr>
+          <a:lstStyle/>
+          <a:p>
+            <a:r>
+              <a:rPr lang="en-US" sz="1372" dirty="0" err="1"/>
+              <a:t>valided</a:t>
+            </a:r>
+            <a:endParaRPr lang="en-US" sz="1372" dirty="0"/>
+          </a:p>
+        </p:txBody>
+      </p:sp>
+      <p:sp>
+        <p:nvSpPr>
+          <p:cNvPr id="26" name="TextBox 25">
+            <a:extLst>
+              <a:ext uri="{FF2B5EF4-FFF2-40B4-BE49-F238E27FC236}">
+                <a16:creationId xmlns:a16="http://schemas.microsoft.com/office/drawing/2014/main" id="{DEC490E0-F349-4269-B29E-D5427C91AE10}"/>
+              </a:ext>
+            </a:extLst>
+          </p:cNvPr>
+          <p:cNvSpPr txBox="1"/>
+          <p:nvPr/>
+        </p:nvSpPr>
+        <p:spPr>
+          <a:xfrm>
+            <a:off x="2574806" y="4621286"/>
+            <a:ext cx="558166" cy="303481"/>
+          </a:xfrm>
+          <a:prstGeom prst="rect">
+            <a:avLst/>
+          </a:prstGeom>
+          <a:noFill/>
+        </p:spPr>
+        <p:txBody>
+          <a:bodyPr wrap="none" rtlCol="0">
+            <a:spAutoFit/>
+          </a:bodyPr>
+          <a:lstStyle/>
+          <a:p>
+            <a:r>
+              <a:rPr lang="en-US" sz="1372" b="1" dirty="0">
+                <a:solidFill>
+                  <a:srgbClr val="FF0000"/>
+                </a:solidFill>
+              </a:rPr>
+              <a:t>EMIT</a:t>
+            </a:r>
+          </a:p>
+        </p:txBody>
+      </p:sp>
+      <p:sp>
+        <p:nvSpPr>
+          <p:cNvPr id="27" name="TextBox 26">
+            <a:extLst>
+              <a:ext uri="{FF2B5EF4-FFF2-40B4-BE49-F238E27FC236}">
+                <a16:creationId xmlns:a16="http://schemas.microsoft.com/office/drawing/2014/main" id="{E5A6B4D5-31FE-4678-B125-54A638CA0E0D}"/>
+              </a:ext>
+            </a:extLst>
+          </p:cNvPr>
+          <p:cNvSpPr txBox="1"/>
+          <p:nvPr/>
+        </p:nvSpPr>
+        <p:spPr>
+          <a:xfrm>
+            <a:off x="6720447" y="481416"/>
+            <a:ext cx="639919" cy="303481"/>
+          </a:xfrm>
+          <a:prstGeom prst="rect">
+            <a:avLst/>
+          </a:prstGeom>
+          <a:noFill/>
+        </p:spPr>
+        <p:txBody>
+          <a:bodyPr wrap="none" rtlCol="0">
+            <a:spAutoFit/>
+          </a:bodyPr>
+          <a:lstStyle/>
+          <a:p>
+            <a:r>
+              <a:rPr lang="en-US" sz="1372" b="1" i="1" dirty="0">
+                <a:solidFill>
+                  <a:srgbClr val="FF0000"/>
+                </a:solidFill>
+              </a:rPr>
+              <a:t>&lt;app&gt;</a:t>
+            </a:r>
+          </a:p>
+        </p:txBody>
+      </p:sp>
+      <p:sp>
+        <p:nvSpPr>
+          <p:cNvPr id="28" name="Rounded Rectangle 31">
+            <a:extLst>
+              <a:ext uri="{FF2B5EF4-FFF2-40B4-BE49-F238E27FC236}">
+                <a16:creationId xmlns:a16="http://schemas.microsoft.com/office/drawing/2014/main" id="{3DDA17AA-AEA5-4451-A024-305A338C5E18}"/>
+              </a:ext>
+            </a:extLst>
+          </p:cNvPr>
+          <p:cNvSpPr/>
+          <p:nvPr/>
+        </p:nvSpPr>
+        <p:spPr>
+          <a:xfrm>
+            <a:off x="6234390" y="310835"/>
+            <a:ext cx="1650319" cy="1166483"/>
+          </a:xfrm>
+          <a:prstGeom prst="roundRect">
+            <a:avLst/>
+          </a:prstGeom>
+          <a:noFill/>
+          <a:ln>
+            <a:solidFill>
+              <a:srgbClr val="FF0000"/>
+            </a:solidFill>
+            <a:prstDash val="lgDash"/>
+          </a:ln>
+        </p:spPr>
+        <p:style>
+          <a:lnRef idx="2">
+            <a:schemeClr val="accent1">
+              <a:shade val="50000"/>
+            </a:schemeClr>
+          </a:lnRef>
+          <a:fillRef idx="1">
+            <a:schemeClr val="accent1"/>
+          </a:fillRef>
+          <a:effectRef idx="0">
+            <a:schemeClr val="accent1"/>
+          </a:effectRef>
+          <a:fontRef idx="minor">
+            <a:schemeClr val="lt1"/>
+          </a:fontRef>
+        </p:style>
+        <p:txBody>
+          <a:bodyPr rtlCol="0" anchor="ctr"/>
+          <a:lstStyle/>
+          <a:p>
+            <a:pPr algn="ctr"/>
+            <a:endParaRPr lang="en-US" sz="1372"/>
+          </a:p>
+        </p:txBody>
+      </p:sp>
+      <p:sp>
+        <p:nvSpPr>
+          <p:cNvPr id="29" name="TextBox 28">
+            <a:extLst>
+              <a:ext uri="{FF2B5EF4-FFF2-40B4-BE49-F238E27FC236}">
+                <a16:creationId xmlns:a16="http://schemas.microsoft.com/office/drawing/2014/main" id="{B032FF65-07A2-499A-9575-36A5730BD3E7}"/>
+              </a:ext>
+            </a:extLst>
+          </p:cNvPr>
+          <p:cNvSpPr txBox="1"/>
+          <p:nvPr/>
+        </p:nvSpPr>
+        <p:spPr>
+          <a:xfrm>
+            <a:off x="6596120" y="894076"/>
+            <a:ext cx="762325" cy="303481"/>
+          </a:xfrm>
+          <a:prstGeom prst="rect">
+            <a:avLst/>
+          </a:prstGeom>
+          <a:noFill/>
+        </p:spPr>
+        <p:txBody>
+          <a:bodyPr wrap="none" rtlCol="0">
+            <a:spAutoFit/>
+          </a:bodyPr>
+          <a:lstStyle/>
+          <a:p>
+            <a:r>
+              <a:rPr lang="en-US" sz="1372" dirty="0"/>
+              <a:t>Events[]</a:t>
+            </a:r>
+          </a:p>
+        </p:txBody>
+      </p:sp>
+      <p:sp>
+        <p:nvSpPr>
+          <p:cNvPr id="30" name="TextBox 29">
+            <a:extLst>
+              <a:ext uri="{FF2B5EF4-FFF2-40B4-BE49-F238E27FC236}">
+                <a16:creationId xmlns:a16="http://schemas.microsoft.com/office/drawing/2014/main" id="{A43B898F-1933-40A0-AF61-6ECFE0627369}"/>
+              </a:ext>
+            </a:extLst>
+          </p:cNvPr>
+          <p:cNvSpPr txBox="1"/>
+          <p:nvPr/>
+        </p:nvSpPr>
+        <p:spPr>
+          <a:xfrm>
+            <a:off x="6234390" y="1613780"/>
+            <a:ext cx="2858411" cy="303481"/>
+          </a:xfrm>
+          <a:prstGeom prst="rect">
+            <a:avLst/>
+          </a:prstGeom>
+          <a:noFill/>
+        </p:spPr>
+        <p:txBody>
+          <a:bodyPr wrap="none" rtlCol="0">
+            <a:spAutoFit/>
+          </a:bodyPr>
+          <a:lstStyle/>
+          <a:p>
+            <a:r>
+              <a:rPr lang="en-US" sz="1372" dirty="0"/>
+              <a:t>// </a:t>
+            </a:r>
+            <a:r>
+              <a:rPr lang="en-US" sz="1372" dirty="0">
+                <a:solidFill>
+                  <a:srgbClr val="FF0000"/>
+                </a:solidFill>
+              </a:rPr>
+              <a:t>app</a:t>
+            </a:r>
+            <a:r>
+              <a:rPr lang="en-US" sz="1372" dirty="0"/>
+              <a:t>  provides students to anymore</a:t>
+            </a:r>
+            <a:endParaRPr lang="en-US" sz="1372" dirty="0">
+              <a:solidFill>
+                <a:srgbClr val="FF0000"/>
+              </a:solidFill>
+            </a:endParaRPr>
+          </a:p>
+        </p:txBody>
+      </p:sp>
+      <p:sp>
+        <p:nvSpPr>
+          <p:cNvPr id="31" name="Rounded Rectangle 34">
+            <a:extLst>
+              <a:ext uri="{FF2B5EF4-FFF2-40B4-BE49-F238E27FC236}">
+                <a16:creationId xmlns:a16="http://schemas.microsoft.com/office/drawing/2014/main" id="{71A78962-D323-4DA7-BD16-EA69A6DFE80D}"/>
+              </a:ext>
+            </a:extLst>
+          </p:cNvPr>
+          <p:cNvSpPr/>
+          <p:nvPr/>
+        </p:nvSpPr>
+        <p:spPr>
+          <a:xfrm>
+            <a:off x="9792269" y="2129025"/>
+            <a:ext cx="1650319" cy="1166483"/>
+          </a:xfrm>
+          <a:prstGeom prst="roundRect">
+            <a:avLst/>
+          </a:prstGeom>
+          <a:noFill/>
+          <a:ln>
+            <a:solidFill>
+              <a:srgbClr val="FF0000"/>
+            </a:solidFill>
+            <a:prstDash val="lgDash"/>
+          </a:ln>
+        </p:spPr>
+        <p:style>
+          <a:lnRef idx="2">
+            <a:schemeClr val="accent1">
+              <a:shade val="50000"/>
+            </a:schemeClr>
+          </a:lnRef>
+          <a:fillRef idx="1">
+            <a:schemeClr val="accent1"/>
+          </a:fillRef>
+          <a:effectRef idx="0">
+            <a:schemeClr val="accent1"/>
+          </a:effectRef>
+          <a:fontRef idx="minor">
+            <a:schemeClr val="lt1"/>
+          </a:fontRef>
+        </p:style>
+        <p:txBody>
+          <a:bodyPr rtlCol="0" anchor="ctr"/>
+          <a:lstStyle/>
+          <a:p>
+            <a:pPr algn="ctr"/>
+            <a:endParaRPr lang="en-US" sz="1372"/>
+          </a:p>
+        </p:txBody>
+      </p:sp>
+      <p:sp>
+        <p:nvSpPr>
+          <p:cNvPr id="32" name="TextBox 31">
+            <a:extLst>
+              <a:ext uri="{FF2B5EF4-FFF2-40B4-BE49-F238E27FC236}">
+                <a16:creationId xmlns:a16="http://schemas.microsoft.com/office/drawing/2014/main" id="{9AD87C48-555C-41CE-A5EB-0A9F751EFC1D}"/>
+              </a:ext>
+            </a:extLst>
+          </p:cNvPr>
+          <p:cNvSpPr txBox="1"/>
+          <p:nvPr/>
+        </p:nvSpPr>
+        <p:spPr>
+          <a:xfrm>
+            <a:off x="10153999" y="2712266"/>
+            <a:ext cx="762325" cy="303481"/>
+          </a:xfrm>
+          <a:prstGeom prst="rect">
+            <a:avLst/>
+          </a:prstGeom>
+          <a:noFill/>
+        </p:spPr>
+        <p:txBody>
+          <a:bodyPr wrap="none" rtlCol="0">
+            <a:spAutoFit/>
+          </a:bodyPr>
+          <a:lstStyle/>
+          <a:p>
+            <a:r>
+              <a:rPr lang="en-US" sz="1372" dirty="0"/>
+              <a:t>Events[]</a:t>
+            </a:r>
+          </a:p>
+        </p:txBody>
+      </p:sp>
+      <p:sp>
+        <p:nvSpPr>
+          <p:cNvPr id="33" name="TextBox 32">
+            <a:extLst>
+              <a:ext uri="{FF2B5EF4-FFF2-40B4-BE49-F238E27FC236}">
+                <a16:creationId xmlns:a16="http://schemas.microsoft.com/office/drawing/2014/main" id="{F990A852-5C56-4224-BE32-243CDA6EC202}"/>
+              </a:ext>
+            </a:extLst>
+          </p:cNvPr>
+          <p:cNvSpPr txBox="1"/>
+          <p:nvPr/>
+        </p:nvSpPr>
+        <p:spPr>
+          <a:xfrm>
+            <a:off x="10016532" y="2324576"/>
+            <a:ext cx="1166088" cy="303481"/>
+          </a:xfrm>
+          <a:prstGeom prst="rect">
+            <a:avLst/>
+          </a:prstGeom>
+          <a:noFill/>
+        </p:spPr>
+        <p:txBody>
+          <a:bodyPr wrap="none" rtlCol="0">
+            <a:spAutoFit/>
+          </a:bodyPr>
+          <a:lstStyle/>
+          <a:p>
+            <a:r>
+              <a:rPr lang="en-US" sz="1372" b="1" i="1" dirty="0">
+                <a:solidFill>
+                  <a:srgbClr val="FF0000"/>
+                </a:solidFill>
+              </a:rPr>
+              <a:t>&lt;event-view&gt;</a:t>
+            </a:r>
+          </a:p>
+        </p:txBody>
+      </p:sp>
+      <p:sp>
+        <p:nvSpPr>
+          <p:cNvPr id="34" name="Right Arrow 40">
+            <a:extLst>
+              <a:ext uri="{FF2B5EF4-FFF2-40B4-BE49-F238E27FC236}">
+                <a16:creationId xmlns:a16="http://schemas.microsoft.com/office/drawing/2014/main" id="{62EE12C7-CFC8-4C19-BA1B-36AA3458BD4E}"/>
+              </a:ext>
+            </a:extLst>
+          </p:cNvPr>
+          <p:cNvSpPr/>
+          <p:nvPr/>
+        </p:nvSpPr>
+        <p:spPr>
+          <a:xfrm>
+            <a:off x="7925935" y="727951"/>
+            <a:ext cx="696809" cy="333683"/>
+          </a:xfrm>
+          <a:prstGeom prst="rightArrow">
+            <a:avLst/>
+          </a:prstGeom>
+          <a:solidFill>
+            <a:srgbClr val="FFFF00"/>
+          </a:solidFill>
+        </p:spPr>
+        <p:style>
+          <a:lnRef idx="2">
+            <a:schemeClr val="accent1">
+              <a:shade val="50000"/>
+            </a:schemeClr>
+          </a:lnRef>
+          <a:fillRef idx="1">
+            <a:schemeClr val="accent1"/>
+          </a:fillRef>
+          <a:effectRef idx="0">
+            <a:schemeClr val="accent1"/>
+          </a:effectRef>
+          <a:fontRef idx="minor">
+            <a:schemeClr val="lt1"/>
+          </a:fontRef>
+        </p:style>
+        <p:txBody>
+          <a:bodyPr rot="0" spcFirstLastPara="0" vertOverflow="overflow" horzOverflow="overflow" vert="horz" wrap="square" lIns="69681" tIns="34840" rIns="69681" bIns="34840" numCol="1" spcCol="0" rtlCol="0" fromWordArt="0" anchor="ctr" anchorCtr="0" forceAA="0" compatLnSpc="1">
+            <a:prstTxWarp prst="textNoShape">
+              <a:avLst/>
+            </a:prstTxWarp>
+            <a:noAutofit/>
+          </a:bodyPr>
+          <a:lstStyle/>
+          <a:p>
+            <a:pPr algn="ctr"/>
+            <a:endParaRPr lang="en-US" sz="1372"/>
+          </a:p>
+        </p:txBody>
+      </p:sp>
+      <p:sp>
+        <p:nvSpPr>
+          <p:cNvPr id="35" name="TextBox 34">
+            <a:extLst>
+              <a:ext uri="{FF2B5EF4-FFF2-40B4-BE49-F238E27FC236}">
+                <a16:creationId xmlns:a16="http://schemas.microsoft.com/office/drawing/2014/main" id="{E93B8676-5F44-4FDE-BE80-8F8D45350188}"/>
+              </a:ext>
+            </a:extLst>
+          </p:cNvPr>
+          <p:cNvSpPr txBox="1"/>
+          <p:nvPr/>
+        </p:nvSpPr>
+        <p:spPr>
+          <a:xfrm>
+            <a:off x="7837364" y="509852"/>
+            <a:ext cx="838756" cy="303481"/>
+          </a:xfrm>
+          <a:prstGeom prst="rect">
+            <a:avLst/>
+          </a:prstGeom>
+          <a:noFill/>
+        </p:spPr>
+        <p:txBody>
+          <a:bodyPr wrap="none" rtlCol="0">
+            <a:spAutoFit/>
+          </a:bodyPr>
+          <a:lstStyle/>
+          <a:p>
+            <a:r>
+              <a:rPr lang="en-US" sz="1372" b="1" dirty="0">
+                <a:solidFill>
+                  <a:schemeClr val="accent4"/>
+                </a:solidFill>
+              </a:rPr>
+              <a:t>PROVIDE</a:t>
+            </a:r>
+          </a:p>
+        </p:txBody>
+      </p:sp>
+      <p:sp>
+        <p:nvSpPr>
+          <p:cNvPr id="36" name="TextBox 35">
+            <a:extLst>
+              <a:ext uri="{FF2B5EF4-FFF2-40B4-BE49-F238E27FC236}">
+                <a16:creationId xmlns:a16="http://schemas.microsoft.com/office/drawing/2014/main" id="{BEB0F35D-F1FB-4A43-B459-1FFB6F4662B0}"/>
+              </a:ext>
+            </a:extLst>
+          </p:cNvPr>
+          <p:cNvSpPr txBox="1"/>
+          <p:nvPr/>
+        </p:nvSpPr>
+        <p:spPr>
+          <a:xfrm>
+            <a:off x="7991050" y="1073307"/>
+            <a:ext cx="762325" cy="303481"/>
+          </a:xfrm>
+          <a:prstGeom prst="rect">
+            <a:avLst/>
+          </a:prstGeom>
+          <a:noFill/>
+        </p:spPr>
+        <p:txBody>
+          <a:bodyPr wrap="none" rtlCol="0">
+            <a:spAutoFit/>
+          </a:bodyPr>
+          <a:lstStyle/>
+          <a:p>
+            <a:r>
+              <a:rPr lang="en-US" sz="1372" dirty="0"/>
+              <a:t>Events[]</a:t>
+            </a:r>
+          </a:p>
+        </p:txBody>
+      </p:sp>
+      <p:sp>
+        <p:nvSpPr>
+          <p:cNvPr id="37" name="Right Arrow 43">
+            <a:extLst>
+              <a:ext uri="{FF2B5EF4-FFF2-40B4-BE49-F238E27FC236}">
+                <a16:creationId xmlns:a16="http://schemas.microsoft.com/office/drawing/2014/main" id="{36802B00-754D-413F-BE51-8EEC1E69D5D4}"/>
+              </a:ext>
+            </a:extLst>
+          </p:cNvPr>
+          <p:cNvSpPr/>
+          <p:nvPr/>
+        </p:nvSpPr>
+        <p:spPr>
+          <a:xfrm>
+            <a:off x="9056276" y="2542676"/>
+            <a:ext cx="696809" cy="333683"/>
+          </a:xfrm>
+          <a:prstGeom prst="rightArrow">
+            <a:avLst/>
+          </a:prstGeom>
+          <a:solidFill>
+            <a:srgbClr val="FFFF00"/>
+          </a:solidFill>
+        </p:spPr>
+        <p:style>
+          <a:lnRef idx="2">
+            <a:schemeClr val="accent1">
+              <a:shade val="50000"/>
+            </a:schemeClr>
+          </a:lnRef>
+          <a:fillRef idx="1">
+            <a:schemeClr val="accent1"/>
+          </a:fillRef>
+          <a:effectRef idx="0">
+            <a:schemeClr val="accent1"/>
+          </a:effectRef>
+          <a:fontRef idx="minor">
+            <a:schemeClr val="lt1"/>
+          </a:fontRef>
+        </p:style>
+        <p:txBody>
+          <a:bodyPr rot="0" spcFirstLastPara="0" vertOverflow="overflow" horzOverflow="overflow" vert="horz" wrap="square" lIns="69681" tIns="34840" rIns="69681" bIns="34840" numCol="1" spcCol="0" rtlCol="0" fromWordArt="0" anchor="ctr" anchorCtr="0" forceAA="0" compatLnSpc="1">
+            <a:prstTxWarp prst="textNoShape">
+              <a:avLst/>
+            </a:prstTxWarp>
+            <a:noAutofit/>
+          </a:bodyPr>
+          <a:lstStyle/>
+          <a:p>
+            <a:pPr algn="ctr"/>
+            <a:endParaRPr lang="en-US" sz="1372"/>
+          </a:p>
+        </p:txBody>
+      </p:sp>
+      <p:sp>
+        <p:nvSpPr>
+          <p:cNvPr id="38" name="TextBox 37">
+            <a:extLst>
+              <a:ext uri="{FF2B5EF4-FFF2-40B4-BE49-F238E27FC236}">
+                <a16:creationId xmlns:a16="http://schemas.microsoft.com/office/drawing/2014/main" id="{D64004A6-8FB7-4A6A-BC68-6E69536D243A}"/>
+              </a:ext>
+            </a:extLst>
+          </p:cNvPr>
+          <p:cNvSpPr txBox="1"/>
+          <p:nvPr/>
+        </p:nvSpPr>
+        <p:spPr>
+          <a:xfrm>
+            <a:off x="9126729" y="2324577"/>
+            <a:ext cx="668645" cy="303481"/>
+          </a:xfrm>
+          <a:prstGeom prst="rect">
+            <a:avLst/>
+          </a:prstGeom>
+          <a:noFill/>
+        </p:spPr>
+        <p:txBody>
+          <a:bodyPr wrap="none" rtlCol="0">
+            <a:spAutoFit/>
+          </a:bodyPr>
+          <a:lstStyle/>
+          <a:p>
+            <a:r>
+              <a:rPr lang="en-US" sz="1372" b="1" dirty="0">
+                <a:solidFill>
+                  <a:schemeClr val="accent4"/>
+                </a:solidFill>
+              </a:rPr>
+              <a:t>INJECT</a:t>
+            </a:r>
+          </a:p>
+        </p:txBody>
+      </p:sp>
+      <p:sp>
+        <p:nvSpPr>
+          <p:cNvPr id="39" name="TextBox 38">
+            <a:extLst>
+              <a:ext uri="{FF2B5EF4-FFF2-40B4-BE49-F238E27FC236}">
+                <a16:creationId xmlns:a16="http://schemas.microsoft.com/office/drawing/2014/main" id="{EC51937E-0894-4702-BAF9-DDC3613800B7}"/>
+              </a:ext>
+            </a:extLst>
+          </p:cNvPr>
+          <p:cNvSpPr txBox="1"/>
+          <p:nvPr/>
+        </p:nvSpPr>
+        <p:spPr>
+          <a:xfrm>
+            <a:off x="9077787" y="2891298"/>
+            <a:ext cx="762325" cy="303481"/>
+          </a:xfrm>
+          <a:prstGeom prst="rect">
+            <a:avLst/>
+          </a:prstGeom>
+          <a:noFill/>
+        </p:spPr>
+        <p:txBody>
+          <a:bodyPr wrap="none" rtlCol="0">
+            <a:spAutoFit/>
+          </a:bodyPr>
+          <a:lstStyle/>
+          <a:p>
+            <a:r>
+              <a:rPr lang="en-US" sz="1372" dirty="0"/>
+              <a:t>Events[]</a:t>
+            </a:r>
+          </a:p>
+        </p:txBody>
+      </p:sp>
+      <p:sp>
+        <p:nvSpPr>
+          <p:cNvPr id="40" name="TextBox 39">
+            <a:extLst>
+              <a:ext uri="{FF2B5EF4-FFF2-40B4-BE49-F238E27FC236}">
+                <a16:creationId xmlns:a16="http://schemas.microsoft.com/office/drawing/2014/main" id="{88F645A0-03D0-44F6-890E-FB056E5D46D4}"/>
+              </a:ext>
+            </a:extLst>
+          </p:cNvPr>
+          <p:cNvSpPr txBox="1"/>
+          <p:nvPr/>
+        </p:nvSpPr>
+        <p:spPr>
+          <a:xfrm>
+            <a:off x="8917907" y="3423528"/>
+            <a:ext cx="2987100" cy="303481"/>
+          </a:xfrm>
+          <a:prstGeom prst="rect">
+            <a:avLst/>
+          </a:prstGeom>
+          <a:noFill/>
+        </p:spPr>
+        <p:txBody>
+          <a:bodyPr wrap="none" rtlCol="0">
+            <a:spAutoFit/>
+          </a:bodyPr>
+          <a:lstStyle/>
+          <a:p>
+            <a:r>
+              <a:rPr lang="en-US" sz="1372" dirty="0"/>
+              <a:t>// </a:t>
+            </a:r>
+            <a:r>
+              <a:rPr lang="en-US" sz="1372" dirty="0">
+                <a:solidFill>
+                  <a:srgbClr val="FF0000"/>
+                </a:solidFill>
+              </a:rPr>
+              <a:t>dialog </a:t>
+            </a:r>
+            <a:r>
+              <a:rPr lang="en-US" sz="1372" dirty="0"/>
+              <a:t> gets students from a provider</a:t>
+            </a:r>
+            <a:endParaRPr lang="en-US" sz="1372" dirty="0">
+              <a:solidFill>
+                <a:srgbClr val="FF0000"/>
+              </a:solidFill>
+            </a:endParaRPr>
+          </a:p>
+        </p:txBody>
+      </p:sp>
+      <p:sp>
+        <p:nvSpPr>
+          <p:cNvPr id="41" name="TextBox 40">
+            <a:extLst>
+              <a:ext uri="{FF2B5EF4-FFF2-40B4-BE49-F238E27FC236}">
+                <a16:creationId xmlns:a16="http://schemas.microsoft.com/office/drawing/2014/main" id="{305113CA-9D37-4F92-A337-0B733077AA2A}"/>
+              </a:ext>
+            </a:extLst>
+          </p:cNvPr>
+          <p:cNvSpPr txBox="1"/>
+          <p:nvPr/>
+        </p:nvSpPr>
+        <p:spPr>
+          <a:xfrm>
+            <a:off x="6561502" y="4305380"/>
+            <a:ext cx="1215717" cy="303481"/>
+          </a:xfrm>
+          <a:prstGeom prst="rect">
+            <a:avLst/>
+          </a:prstGeom>
+          <a:noFill/>
+        </p:spPr>
+        <p:txBody>
+          <a:bodyPr wrap="none" rtlCol="0">
+            <a:spAutoFit/>
+          </a:bodyPr>
+          <a:lstStyle/>
+          <a:p>
+            <a:r>
+              <a:rPr lang="en-US" sz="1372" b="1" i="1" dirty="0">
+                <a:solidFill>
+                  <a:srgbClr val="7030A0"/>
+                </a:solidFill>
+              </a:rPr>
+              <a:t>&lt;router-view&gt;</a:t>
+            </a:r>
+          </a:p>
+        </p:txBody>
+      </p:sp>
+      <p:sp>
+        <p:nvSpPr>
+          <p:cNvPr id="42" name="Rounded Rectangle 48">
+            <a:extLst>
+              <a:ext uri="{FF2B5EF4-FFF2-40B4-BE49-F238E27FC236}">
+                <a16:creationId xmlns:a16="http://schemas.microsoft.com/office/drawing/2014/main" id="{EA28F26F-7756-4798-BE1C-9E0D1B76C575}"/>
+              </a:ext>
+            </a:extLst>
+          </p:cNvPr>
+          <p:cNvSpPr/>
+          <p:nvPr/>
+        </p:nvSpPr>
+        <p:spPr>
+          <a:xfrm>
+            <a:off x="6217868" y="4170157"/>
+            <a:ext cx="1866945" cy="584334"/>
+          </a:xfrm>
+          <a:prstGeom prst="roundRect">
+            <a:avLst/>
+          </a:prstGeom>
+          <a:noFill/>
+          <a:ln>
+            <a:solidFill>
+              <a:srgbClr val="7030A0"/>
+            </a:solidFill>
+            <a:prstDash val="lgDash"/>
+          </a:ln>
+        </p:spPr>
+        <p:style>
+          <a:lnRef idx="2">
+            <a:schemeClr val="accent1">
+              <a:shade val="50000"/>
+            </a:schemeClr>
+          </a:lnRef>
+          <a:fillRef idx="1">
+            <a:schemeClr val="accent1"/>
+          </a:fillRef>
+          <a:effectRef idx="0">
+            <a:schemeClr val="accent1"/>
+          </a:effectRef>
+          <a:fontRef idx="minor">
+            <a:schemeClr val="lt1"/>
+          </a:fontRef>
+        </p:style>
+        <p:txBody>
+          <a:bodyPr rtlCol="0" anchor="ctr"/>
+          <a:lstStyle/>
+          <a:p>
+            <a:pPr algn="ctr"/>
+            <a:endParaRPr lang="en-US" sz="1372"/>
+          </a:p>
+        </p:txBody>
+      </p:sp>
+      <p:sp>
+        <p:nvSpPr>
+          <p:cNvPr id="43" name="TextBox 42">
+            <a:extLst>
+              <a:ext uri="{FF2B5EF4-FFF2-40B4-BE49-F238E27FC236}">
+                <a16:creationId xmlns:a16="http://schemas.microsoft.com/office/drawing/2014/main" id="{C060CFE8-A079-4D4C-A270-CB31726133F1}"/>
+              </a:ext>
+            </a:extLst>
+          </p:cNvPr>
+          <p:cNvSpPr txBox="1"/>
+          <p:nvPr/>
+        </p:nvSpPr>
+        <p:spPr>
+          <a:xfrm>
+            <a:off x="8256742" y="4317805"/>
+            <a:ext cx="2229136" cy="303481"/>
+          </a:xfrm>
+          <a:prstGeom prst="rect">
+            <a:avLst/>
+          </a:prstGeom>
+          <a:noFill/>
+        </p:spPr>
+        <p:txBody>
+          <a:bodyPr wrap="none" rtlCol="0">
+            <a:spAutoFit/>
+          </a:bodyPr>
+          <a:lstStyle/>
+          <a:p>
+            <a:r>
+              <a:rPr lang="en-US" sz="1372" dirty="0"/>
+              <a:t>// </a:t>
+            </a:r>
+            <a:r>
+              <a:rPr lang="en-US" sz="1372" dirty="0" err="1"/>
+              <a:t>Vue</a:t>
+            </a:r>
+            <a:r>
+              <a:rPr lang="en-US" sz="1372" dirty="0"/>
+              <a:t> JS built-in component</a:t>
+            </a:r>
+            <a:endParaRPr lang="en-US" sz="1372" dirty="0">
+              <a:solidFill>
+                <a:srgbClr val="FF0000"/>
+              </a:solidFill>
+            </a:endParaRPr>
+          </a:p>
+        </p:txBody>
+      </p:sp>
+      <p:sp>
+        <p:nvSpPr>
+          <p:cNvPr id="44" name="TextBox 43">
+            <a:extLst>
+              <a:ext uri="{FF2B5EF4-FFF2-40B4-BE49-F238E27FC236}">
+                <a16:creationId xmlns:a16="http://schemas.microsoft.com/office/drawing/2014/main" id="{FD485E9F-51E3-4481-A5F6-1C097C2C4C4E}"/>
+              </a:ext>
+            </a:extLst>
+          </p:cNvPr>
+          <p:cNvSpPr txBox="1"/>
+          <p:nvPr/>
+        </p:nvSpPr>
+        <p:spPr>
+          <a:xfrm>
+            <a:off x="119555" y="1627265"/>
+            <a:ext cx="3384709" cy="303481"/>
+          </a:xfrm>
+          <a:prstGeom prst="rect">
+            <a:avLst/>
+          </a:prstGeom>
+          <a:noFill/>
+        </p:spPr>
+        <p:txBody>
+          <a:bodyPr wrap="none" rtlCol="0">
+            <a:spAutoFit/>
+          </a:bodyPr>
+          <a:lstStyle/>
+          <a:p>
+            <a:r>
+              <a:rPr lang="en-US" sz="1372" dirty="0"/>
+              <a:t>// A component with a list of student as data</a:t>
+            </a:r>
+          </a:p>
+        </p:txBody>
+      </p:sp>
+      <p:cxnSp>
+        <p:nvCxnSpPr>
+          <p:cNvPr id="45" name="Straight Connector 44">
+            <a:extLst>
+              <a:ext uri="{FF2B5EF4-FFF2-40B4-BE49-F238E27FC236}">
+                <a16:creationId xmlns:a16="http://schemas.microsoft.com/office/drawing/2014/main" id="{342B55E3-97DD-4154-9735-6D61AD688942}"/>
+              </a:ext>
+            </a:extLst>
+          </p:cNvPr>
+          <p:cNvCxnSpPr/>
+          <p:nvPr/>
+        </p:nvCxnSpPr>
+        <p:spPr>
+          <a:xfrm>
+            <a:off x="5733143" y="0"/>
+            <a:ext cx="29028" cy="6858000"/>
+          </a:xfrm>
+          <a:prstGeom prst="line">
+            <a:avLst/>
+          </a:prstGeom>
+        </p:spPr>
+        <p:style>
+          <a:lnRef idx="1">
+            <a:schemeClr val="accent1"/>
+          </a:lnRef>
+          <a:fillRef idx="0">
+            <a:schemeClr val="accent1"/>
+          </a:fillRef>
+          <a:effectRef idx="0">
+            <a:schemeClr val="accent1"/>
+          </a:effectRef>
+          <a:fontRef idx="minor">
+            <a:schemeClr val="tx1"/>
+          </a:fontRef>
+        </p:style>
+      </p:cxnSp>
+    </p:spTree>
+    <p:extLst>
+      <p:ext uri="{BB962C8B-B14F-4D97-AF65-F5344CB8AC3E}">
+        <p14:creationId xmlns:p14="http://schemas.microsoft.com/office/powerpoint/2010/main" val="1010373446"/>
       </p:ext>
     </p:extLst>
   </p:cSld>

</xml_diff>